<commit_message>
Fixed Combined Drum does not sounding properly.
</commit_message>
<xml_diff>
--- a/src/mamidimemo/Data/Images.pptx
+++ b/src/mamidimemo/Data/Images.pptx
@@ -5,7 +5,7 @@
     <p:sldMasterId id="2147483648" r:id="rId1"/>
   </p:sldMasterIdLst>
   <p:notesMasterIdLst>
-    <p:notesMasterId r:id="rId10"/>
+    <p:notesMasterId r:id="rId11"/>
   </p:notesMasterIdLst>
   <p:sldIdLst>
     <p:sldId id="256" r:id="rId2"/>
@@ -16,6 +16,7 @@
     <p:sldId id="262" r:id="rId7"/>
     <p:sldId id="263" r:id="rId8"/>
     <p:sldId id="257" r:id="rId9"/>
+    <p:sldId id="264" r:id="rId10"/>
   </p:sldIdLst>
   <p:sldSz cx="12192000" cy="6858000"/>
   <p:notesSz cx="6858000" cy="9144000"/>
@@ -204,7 +205,7 @@
           <a:p>
             <a:fld id="{FD0ADE19-EE5F-4EAE-BCEC-0B5F9244BB48}" type="datetimeFigureOut">
               <a:rPr kumimoji="1" lang="ja-JP" altLang="en-US" smtClean="0"/>
-              <a:t>2020/3/21</a:t>
+              <a:t>2020/10/19</a:t>
             </a:fld>
             <a:endParaRPr kumimoji="1" lang="ja-JP" altLang="en-US"/>
           </a:p>
@@ -734,7 +735,7 @@
           <a:p>
             <a:fld id="{B7E48A73-9369-4B88-BBE6-B1D33CBD5F01}" type="datetimeFigureOut">
               <a:rPr kumimoji="1" lang="ja-JP" altLang="en-US" smtClean="0"/>
-              <a:t>2020/3/21</a:t>
+              <a:t>2020/10/19</a:t>
             </a:fld>
             <a:endParaRPr kumimoji="1" lang="ja-JP" altLang="en-US"/>
           </a:p>
@@ -964,7 +965,7 @@
           <a:p>
             <a:fld id="{B7E48A73-9369-4B88-BBE6-B1D33CBD5F01}" type="datetimeFigureOut">
               <a:rPr kumimoji="1" lang="ja-JP" altLang="en-US" smtClean="0"/>
-              <a:t>2020/3/21</a:t>
+              <a:t>2020/10/19</a:t>
             </a:fld>
             <a:endParaRPr kumimoji="1" lang="ja-JP" altLang="en-US"/>
           </a:p>
@@ -1204,7 +1205,7 @@
           <a:p>
             <a:fld id="{B7E48A73-9369-4B88-BBE6-B1D33CBD5F01}" type="datetimeFigureOut">
               <a:rPr kumimoji="1" lang="ja-JP" altLang="en-US" smtClean="0"/>
-              <a:t>2020/3/21</a:t>
+              <a:t>2020/10/19</a:t>
             </a:fld>
             <a:endParaRPr kumimoji="1" lang="ja-JP" altLang="en-US"/>
           </a:p>
@@ -1434,7 +1435,7 @@
           <a:p>
             <a:fld id="{B7E48A73-9369-4B88-BBE6-B1D33CBD5F01}" type="datetimeFigureOut">
               <a:rPr kumimoji="1" lang="ja-JP" altLang="en-US" smtClean="0"/>
-              <a:t>2020/3/21</a:t>
+              <a:t>2020/10/19</a:t>
             </a:fld>
             <a:endParaRPr kumimoji="1" lang="ja-JP" altLang="en-US"/>
           </a:p>
@@ -1709,7 +1710,7 @@
           <a:p>
             <a:fld id="{B7E48A73-9369-4B88-BBE6-B1D33CBD5F01}" type="datetimeFigureOut">
               <a:rPr kumimoji="1" lang="ja-JP" altLang="en-US" smtClean="0"/>
-              <a:t>2020/3/21</a:t>
+              <a:t>2020/10/19</a:t>
             </a:fld>
             <a:endParaRPr kumimoji="1" lang="ja-JP" altLang="en-US"/>
           </a:p>
@@ -2038,7 +2039,7 @@
           <a:p>
             <a:fld id="{B7E48A73-9369-4B88-BBE6-B1D33CBD5F01}" type="datetimeFigureOut">
               <a:rPr kumimoji="1" lang="ja-JP" altLang="en-US" smtClean="0"/>
-              <a:t>2020/3/21</a:t>
+              <a:t>2020/10/19</a:t>
             </a:fld>
             <a:endParaRPr kumimoji="1" lang="ja-JP" altLang="en-US"/>
           </a:p>
@@ -2514,7 +2515,7 @@
           <a:p>
             <a:fld id="{B7E48A73-9369-4B88-BBE6-B1D33CBD5F01}" type="datetimeFigureOut">
               <a:rPr kumimoji="1" lang="ja-JP" altLang="en-US" smtClean="0"/>
-              <a:t>2020/3/21</a:t>
+              <a:t>2020/10/19</a:t>
             </a:fld>
             <a:endParaRPr kumimoji="1" lang="ja-JP" altLang="en-US"/>
           </a:p>
@@ -2655,7 +2656,7 @@
           <a:p>
             <a:fld id="{B7E48A73-9369-4B88-BBE6-B1D33CBD5F01}" type="datetimeFigureOut">
               <a:rPr kumimoji="1" lang="ja-JP" altLang="en-US" smtClean="0"/>
-              <a:t>2020/3/21</a:t>
+              <a:t>2020/10/19</a:t>
             </a:fld>
             <a:endParaRPr kumimoji="1" lang="ja-JP" altLang="en-US"/>
           </a:p>
@@ -2768,7 +2769,7 @@
           <a:p>
             <a:fld id="{B7E48A73-9369-4B88-BBE6-B1D33CBD5F01}" type="datetimeFigureOut">
               <a:rPr kumimoji="1" lang="ja-JP" altLang="en-US" smtClean="0"/>
-              <a:t>2020/3/21</a:t>
+              <a:t>2020/10/19</a:t>
             </a:fld>
             <a:endParaRPr kumimoji="1" lang="ja-JP" altLang="en-US"/>
           </a:p>
@@ -3111,7 +3112,7 @@
           <a:p>
             <a:fld id="{B7E48A73-9369-4B88-BBE6-B1D33CBD5F01}" type="datetimeFigureOut">
               <a:rPr kumimoji="1" lang="ja-JP" altLang="en-US" smtClean="0"/>
-              <a:t>2020/3/21</a:t>
+              <a:t>2020/10/19</a:t>
             </a:fld>
             <a:endParaRPr kumimoji="1" lang="ja-JP" altLang="en-US"/>
           </a:p>
@@ -3399,7 +3400,7 @@
           <a:p>
             <a:fld id="{B7E48A73-9369-4B88-BBE6-B1D33CBD5F01}" type="datetimeFigureOut">
               <a:rPr kumimoji="1" lang="ja-JP" altLang="en-US" smtClean="0"/>
-              <a:t>2020/3/21</a:t>
+              <a:t>2020/10/19</a:t>
             </a:fld>
             <a:endParaRPr kumimoji="1" lang="ja-JP" altLang="en-US"/>
           </a:p>
@@ -3672,7 +3673,7 @@
           <a:p>
             <a:fld id="{B7E48A73-9369-4B88-BBE6-B1D33CBD5F01}" type="datetimeFigureOut">
               <a:rPr kumimoji="1" lang="ja-JP" altLang="en-US" smtClean="0"/>
-              <a:t>2020/3/21</a:t>
+              <a:t>2020/10/19</a:t>
             </a:fld>
             <a:endParaRPr kumimoji="1" lang="ja-JP" altLang="en-US"/>
           </a:p>
@@ -41242,6 +41243,416 @@
 </p:sld>
 </file>
 
+<file path=ppt/slides/slide9.xml><?xml version="1.0" encoding="utf-8"?>
+<p:sld xmlns:a="http://schemas.openxmlformats.org/drawingml/2006/main" xmlns:r="http://schemas.openxmlformats.org/officeDocument/2006/relationships" xmlns:p="http://schemas.openxmlformats.org/presentationml/2006/main">
+  <p:cSld>
+    <p:spTree>
+      <p:nvGrpSpPr>
+        <p:cNvPr id="1" name=""/>
+        <p:cNvGrpSpPr/>
+        <p:nvPr/>
+      </p:nvGrpSpPr>
+      <p:grpSpPr>
+        <a:xfrm>
+          <a:off x="0" y="0"/>
+          <a:ext cx="0" cy="0"/>
+          <a:chOff x="0" y="0"/>
+          <a:chExt cx="0" cy="0"/>
+        </a:xfrm>
+      </p:grpSpPr>
+      <p:pic>
+        <p:nvPicPr>
+          <p:cNvPr id="1028" name="Picture 4" descr="Creative | Brands of the World™ | Download vector logos and logotypes">
+            <a:extLst>
+              <a:ext uri="{FF2B5EF4-FFF2-40B4-BE49-F238E27FC236}">
+                <a16:creationId xmlns:a16="http://schemas.microsoft.com/office/drawing/2014/main" id="{60992B12-CDE7-4E90-8D20-B7E06C0E27DA}"/>
+              </a:ext>
+            </a:extLst>
+          </p:cNvPr>
+          <p:cNvPicPr>
+            <a:picLocks noChangeAspect="1" noChangeArrowheads="1"/>
+          </p:cNvPicPr>
+          <p:nvPr/>
+        </p:nvPicPr>
+        <p:blipFill>
+          <a:blip r:embed="rId2">
+            <a:extLst>
+              <a:ext uri="{28A0092B-C50C-407E-A947-70E740481C1C}">
+                <a14:useLocalDpi xmlns:a14="http://schemas.microsoft.com/office/drawing/2010/main" val="0"/>
+              </a:ext>
+            </a:extLst>
+          </a:blip>
+          <a:srcRect/>
+          <a:stretch>
+            <a:fillRect/>
+          </a:stretch>
+        </p:blipFill>
+        <p:spPr bwMode="auto">
+          <a:xfrm>
+            <a:off x="3406988" y="2651082"/>
+            <a:ext cx="4673380" cy="4673380"/>
+          </a:xfrm>
+          <a:prstGeom prst="rect">
+            <a:avLst/>
+          </a:prstGeom>
+          <a:noFill/>
+          <a:extLst>
+            <a:ext uri="{909E8E84-426E-40DD-AFC4-6F175D3DCCD1}">
+              <a14:hiddenFill xmlns:a14="http://schemas.microsoft.com/office/drawing/2010/main">
+                <a:solidFill>
+                  <a:srgbClr val="FFFFFF"/>
+                </a:solidFill>
+              </a14:hiddenFill>
+            </a:ext>
+          </a:extLst>
+        </p:spPr>
+      </p:pic>
+      <p:pic>
+        <p:nvPicPr>
+          <p:cNvPr id="1030" name="Picture 6" descr="Creative SoundBlaster AWE32 for PC-9800">
+            <a:extLst>
+              <a:ext uri="{FF2B5EF4-FFF2-40B4-BE49-F238E27FC236}">
+                <a16:creationId xmlns:a16="http://schemas.microsoft.com/office/drawing/2014/main" id="{E0CA8219-032F-4F6B-8C72-A4E194A08150}"/>
+              </a:ext>
+            </a:extLst>
+          </p:cNvPr>
+          <p:cNvPicPr>
+            <a:picLocks noChangeAspect="1" noChangeArrowheads="1"/>
+          </p:cNvPicPr>
+          <p:nvPr/>
+        </p:nvPicPr>
+        <p:blipFill>
+          <a:blip r:embed="rId3">
+            <a:extLst>
+              <a:ext uri="{28A0092B-C50C-407E-A947-70E740481C1C}">
+                <a14:useLocalDpi xmlns:a14="http://schemas.microsoft.com/office/drawing/2010/main" val="0"/>
+              </a:ext>
+            </a:extLst>
+          </a:blip>
+          <a:srcRect/>
+          <a:stretch>
+            <a:fillRect/>
+          </a:stretch>
+        </p:blipFill>
+        <p:spPr bwMode="auto">
+          <a:xfrm>
+            <a:off x="176934" y="4681783"/>
+            <a:ext cx="2647950" cy="1724025"/>
+          </a:xfrm>
+          <a:prstGeom prst="rect">
+            <a:avLst/>
+          </a:prstGeom>
+          <a:noFill/>
+          <a:extLst>
+            <a:ext uri="{909E8E84-426E-40DD-AFC4-6F175D3DCCD1}">
+              <a14:hiddenFill xmlns:a14="http://schemas.microsoft.com/office/drawing/2010/main">
+                <a:solidFill>
+                  <a:srgbClr val="FFFFFF"/>
+                </a:solidFill>
+              </a14:hiddenFill>
+            </a:ext>
+          </a:extLst>
+        </p:spPr>
+      </p:pic>
+      <p:pic>
+        <p:nvPicPr>
+          <p:cNvPr id="1032" name="Picture 8" descr="The New Creative Labs Sound Blaster Drivers Collection. (Updated 6th Jan.  2014) \ VOGONS">
+            <a:extLst>
+              <a:ext uri="{FF2B5EF4-FFF2-40B4-BE49-F238E27FC236}">
+                <a16:creationId xmlns:a16="http://schemas.microsoft.com/office/drawing/2014/main" id="{E1777545-106A-4BA5-97E9-12147CB91424}"/>
+              </a:ext>
+            </a:extLst>
+          </p:cNvPr>
+          <p:cNvPicPr>
+            <a:picLocks noChangeAspect="1" noChangeArrowheads="1"/>
+          </p:cNvPicPr>
+          <p:nvPr/>
+        </p:nvPicPr>
+        <p:blipFill>
+          <a:blip r:embed="rId4">
+            <a:extLst>
+              <a:ext uri="{28A0092B-C50C-407E-A947-70E740481C1C}">
+                <a14:useLocalDpi xmlns:a14="http://schemas.microsoft.com/office/drawing/2010/main" val="0"/>
+              </a:ext>
+            </a:extLst>
+          </a:blip>
+          <a:srcRect/>
+          <a:stretch>
+            <a:fillRect/>
+          </a:stretch>
+        </p:blipFill>
+        <p:spPr bwMode="auto">
+          <a:xfrm>
+            <a:off x="4639469" y="170191"/>
+            <a:ext cx="4752975" cy="2352675"/>
+          </a:xfrm>
+          <a:prstGeom prst="rect">
+            <a:avLst/>
+          </a:prstGeom>
+          <a:noFill/>
+          <a:extLst>
+            <a:ext uri="{909E8E84-426E-40DD-AFC4-6F175D3DCCD1}">
+              <a14:hiddenFill xmlns:a14="http://schemas.microsoft.com/office/drawing/2010/main">
+                <a:solidFill>
+                  <a:srgbClr val="FFFFFF"/>
+                </a:solidFill>
+              </a14:hiddenFill>
+            </a:ext>
+          </a:extLst>
+        </p:spPr>
+      </p:pic>
+      <p:sp>
+        <p:nvSpPr>
+          <p:cNvPr id="4" name="テキスト ボックス 3">
+            <a:extLst>
+              <a:ext uri="{FF2B5EF4-FFF2-40B4-BE49-F238E27FC236}">
+                <a16:creationId xmlns:a16="http://schemas.microsoft.com/office/drawing/2014/main" id="{DA82D649-EFEB-470C-B5E6-7A7584AC2CC6}"/>
+              </a:ext>
+            </a:extLst>
+          </p:cNvPr>
+          <p:cNvSpPr txBox="1"/>
+          <p:nvPr/>
+        </p:nvSpPr>
+        <p:spPr>
+          <a:xfrm>
+            <a:off x="4639469" y="177880"/>
+            <a:ext cx="4745110" cy="1242973"/>
+          </a:xfrm>
+          <a:prstGeom prst="rect">
+            <a:avLst/>
+          </a:prstGeom>
+          <a:solidFill>
+            <a:srgbClr val="F1AF01"/>
+          </a:solidFill>
+          <a:ln w="38100">
+            <a:solidFill>
+              <a:schemeClr val="tx1"/>
+            </a:solidFill>
+          </a:ln>
+        </p:spPr>
+        <p:txBody>
+          <a:bodyPr wrap="none" lIns="0" tIns="0" rIns="0" bIns="0" rtlCol="0" anchor="ctr">
+            <a:noAutofit/>
+          </a:bodyPr>
+          <a:lstStyle/>
+          <a:p>
+            <a:pPr algn="ctr"/>
+            <a:r>
+              <a:rPr kumimoji="1" lang="en-US" altLang="ja-JP" sz="10500" dirty="0">
+                <a:solidFill>
+                  <a:srgbClr val="363C92"/>
+                </a:solidFill>
+                <a:latin typeface="Arial Black" panose="020B0A04020102020204" pitchFamily="34" charset="0"/>
+              </a:rPr>
+              <a:t>YMF</a:t>
+            </a:r>
+            <a:endParaRPr kumimoji="1" lang="ja-JP" altLang="en-US" sz="10500" dirty="0">
+              <a:solidFill>
+                <a:srgbClr val="363C92"/>
+              </a:solidFill>
+              <a:latin typeface="Arial Black" panose="020B0A04020102020204" pitchFamily="34" charset="0"/>
+            </a:endParaRPr>
+          </a:p>
+        </p:txBody>
+      </p:sp>
+      <p:sp>
+        <p:nvSpPr>
+          <p:cNvPr id="9" name="テキスト ボックス 8">
+            <a:extLst>
+              <a:ext uri="{FF2B5EF4-FFF2-40B4-BE49-F238E27FC236}">
+                <a16:creationId xmlns:a16="http://schemas.microsoft.com/office/drawing/2014/main" id="{C531683E-4F99-444B-B3FA-18047B1A104E}"/>
+              </a:ext>
+            </a:extLst>
+          </p:cNvPr>
+          <p:cNvSpPr txBox="1"/>
+          <p:nvPr/>
+        </p:nvSpPr>
+        <p:spPr>
+          <a:xfrm>
+            <a:off x="4639469" y="1424789"/>
+            <a:ext cx="4745110" cy="1075523"/>
+          </a:xfrm>
+          <a:prstGeom prst="rect">
+            <a:avLst/>
+          </a:prstGeom>
+          <a:solidFill>
+            <a:schemeClr val="tx1"/>
+          </a:solidFill>
+          <a:ln w="38100">
+            <a:solidFill>
+              <a:schemeClr val="tx1"/>
+            </a:solidFill>
+          </a:ln>
+        </p:spPr>
+        <p:txBody>
+          <a:bodyPr wrap="none" lIns="0" tIns="0" rIns="0" bIns="0" rtlCol="0" anchor="ctr">
+            <a:noAutofit/>
+          </a:bodyPr>
+          <a:lstStyle/>
+          <a:p>
+            <a:pPr algn="r"/>
+            <a:r>
+              <a:rPr kumimoji="1" lang="en-US" altLang="ja-JP" sz="13800" dirty="0">
+                <a:ln w="15875">
+                  <a:noFill/>
+                </a:ln>
+                <a:gradFill>
+                  <a:gsLst>
+                    <a:gs pos="20000">
+                      <a:schemeClr val="accent4">
+                        <a:lumMod val="75000"/>
+                      </a:schemeClr>
+                    </a:gs>
+                    <a:gs pos="39000">
+                      <a:schemeClr val="accent4">
+                        <a:lumMod val="20000"/>
+                        <a:lumOff val="80000"/>
+                      </a:schemeClr>
+                    </a:gs>
+                    <a:gs pos="80000">
+                      <a:schemeClr val="accent4">
+                        <a:lumMod val="75000"/>
+                      </a:schemeClr>
+                    </a:gs>
+                  </a:gsLst>
+                  <a:lin ang="5400000" scaled="0"/>
+                </a:gradFill>
+                <a:latin typeface="Blackadder ITC" panose="04020505051007020D02" pitchFamily="82" charset="0"/>
+              </a:rPr>
+              <a:t>! </a:t>
+            </a:r>
+            <a:endParaRPr kumimoji="1" lang="ja-JP" altLang="en-US" sz="10500" dirty="0">
+              <a:ln w="15875">
+                <a:noFill/>
+              </a:ln>
+              <a:gradFill>
+                <a:gsLst>
+                  <a:gs pos="20000">
+                    <a:schemeClr val="accent4">
+                      <a:lumMod val="75000"/>
+                    </a:schemeClr>
+                  </a:gs>
+                  <a:gs pos="39000">
+                    <a:schemeClr val="accent4">
+                      <a:lumMod val="20000"/>
+                      <a:lumOff val="80000"/>
+                    </a:schemeClr>
+                  </a:gs>
+                  <a:gs pos="80000">
+                    <a:schemeClr val="accent4">
+                      <a:lumMod val="75000"/>
+                    </a:schemeClr>
+                  </a:gs>
+                </a:gsLst>
+                <a:lin ang="5400000" scaled="0"/>
+              </a:gradFill>
+              <a:latin typeface="Blackadder ITC" panose="04020505051007020D02" pitchFamily="82" charset="0"/>
+            </a:endParaRPr>
+          </a:p>
+        </p:txBody>
+      </p:sp>
+      <p:pic>
+        <p:nvPicPr>
+          <p:cNvPr id="5" name="図 4">
+            <a:extLst>
+              <a:ext uri="{FF2B5EF4-FFF2-40B4-BE49-F238E27FC236}">
+                <a16:creationId xmlns:a16="http://schemas.microsoft.com/office/drawing/2014/main" id="{C8EA855E-9794-4373-8DDE-7FD80ED20D90}"/>
+              </a:ext>
+            </a:extLst>
+          </p:cNvPr>
+          <p:cNvPicPr>
+            <a:picLocks noChangeAspect="1"/>
+          </p:cNvPicPr>
+          <p:nvPr/>
+        </p:nvPicPr>
+        <p:blipFill>
+          <a:blip r:embed="rId5"/>
+          <a:stretch>
+            <a:fillRect/>
+          </a:stretch>
+        </p:blipFill>
+        <p:spPr>
+          <a:xfrm>
+            <a:off x="1035157" y="3120611"/>
+            <a:ext cx="5673796" cy="1166909"/>
+          </a:xfrm>
+          <a:prstGeom prst="rect">
+            <a:avLst/>
+          </a:prstGeom>
+        </p:spPr>
+      </p:pic>
+      <p:pic>
+        <p:nvPicPr>
+          <p:cNvPr id="7" name="図 6">
+            <a:extLst>
+              <a:ext uri="{FF2B5EF4-FFF2-40B4-BE49-F238E27FC236}">
+                <a16:creationId xmlns:a16="http://schemas.microsoft.com/office/drawing/2014/main" id="{3F98B607-4DD7-420B-A505-F634DB78405C}"/>
+              </a:ext>
+            </a:extLst>
+          </p:cNvPr>
+          <p:cNvPicPr>
+            <a:picLocks noChangeAspect="1"/>
+          </p:cNvPicPr>
+          <p:nvPr/>
+        </p:nvPicPr>
+        <p:blipFill rotWithShape="1">
+          <a:blip r:embed="rId6"/>
+          <a:srcRect l="2094" t="9919" r="6710" b="9612"/>
+          <a:stretch/>
+        </p:blipFill>
+        <p:spPr>
+          <a:xfrm>
+            <a:off x="5804004" y="1544889"/>
+            <a:ext cx="2573234" cy="865478"/>
+          </a:xfrm>
+          <a:prstGeom prst="rect">
+            <a:avLst/>
+          </a:prstGeom>
+        </p:spPr>
+      </p:pic>
+      <p:pic>
+        <p:nvPicPr>
+          <p:cNvPr id="16" name="図 15">
+            <a:extLst>
+              <a:ext uri="{FF2B5EF4-FFF2-40B4-BE49-F238E27FC236}">
+                <a16:creationId xmlns:a16="http://schemas.microsoft.com/office/drawing/2014/main" id="{47A24C3F-6445-42F9-818D-CD102F3E9726}"/>
+              </a:ext>
+            </a:extLst>
+          </p:cNvPr>
+          <p:cNvPicPr>
+            <a:picLocks noChangeAspect="1"/>
+          </p:cNvPicPr>
+          <p:nvPr/>
+        </p:nvPicPr>
+        <p:blipFill>
+          <a:blip r:embed="rId7"/>
+          <a:stretch>
+            <a:fillRect/>
+          </a:stretch>
+        </p:blipFill>
+        <p:spPr>
+          <a:xfrm>
+            <a:off x="1944892" y="969287"/>
+            <a:ext cx="805081" cy="491028"/>
+          </a:xfrm>
+          <a:prstGeom prst="rect">
+            <a:avLst/>
+          </a:prstGeom>
+        </p:spPr>
+      </p:pic>
+    </p:spTree>
+    <p:extLst>
+      <p:ext uri="{BB962C8B-B14F-4D97-AF65-F5344CB8AC3E}">
+        <p14:creationId xmlns:p14="http://schemas.microsoft.com/office/powerpoint/2010/main" val="784136640"/>
+      </p:ext>
+    </p:extLst>
+  </p:cSld>
+  <p:clrMapOvr>
+    <a:masterClrMapping/>
+  </p:clrMapOvr>
+</p:sld>
+</file>
+
 <file path=ppt/theme/theme1.xml><?xml version="1.0" encoding="utf-8"?>
 <a:theme xmlns:a="http://schemas.openxmlformats.org/drawingml/2006/main" name="Office テーマ">
   <a:themeElements>

</xml_diff>

<commit_message>
Added YM2608 Chip ADPCM-B
</commit_message>
<xml_diff>
--- a/src/mamidimemo/Data/Images.pptx
+++ b/src/mamidimemo/Data/Images.pptx
@@ -5,7 +5,7 @@
     <p:sldMasterId id="2147483648" r:id="rId1"/>
   </p:sldMasterIdLst>
   <p:notesMasterIdLst>
-    <p:notesMasterId r:id="rId11"/>
+    <p:notesMasterId r:id="rId12"/>
   </p:notesMasterIdLst>
   <p:sldIdLst>
     <p:sldId id="256" r:id="rId2"/>
@@ -17,6 +17,7 @@
     <p:sldId id="263" r:id="rId8"/>
     <p:sldId id="257" r:id="rId9"/>
     <p:sldId id="264" r:id="rId10"/>
+    <p:sldId id="265" r:id="rId11"/>
   </p:sldIdLst>
   <p:sldSz cx="12192000" cy="6858000"/>
   <p:notesSz cx="6858000" cy="9144000"/>
@@ -205,7 +206,7 @@
           <a:p>
             <a:fld id="{FD0ADE19-EE5F-4EAE-BCEC-0B5F9244BB48}" type="datetimeFigureOut">
               <a:rPr kumimoji="1" lang="ja-JP" altLang="en-US" smtClean="0"/>
-              <a:t>2020/10/19</a:t>
+              <a:t>2020/11/23</a:t>
             </a:fld>
             <a:endParaRPr kumimoji="1" lang="ja-JP" altLang="en-US"/>
           </a:p>
@@ -735,7 +736,7 @@
           <a:p>
             <a:fld id="{B7E48A73-9369-4B88-BBE6-B1D33CBD5F01}" type="datetimeFigureOut">
               <a:rPr kumimoji="1" lang="ja-JP" altLang="en-US" smtClean="0"/>
-              <a:t>2020/10/19</a:t>
+              <a:t>2020/11/23</a:t>
             </a:fld>
             <a:endParaRPr kumimoji="1" lang="ja-JP" altLang="en-US"/>
           </a:p>
@@ -965,7 +966,7 @@
           <a:p>
             <a:fld id="{B7E48A73-9369-4B88-BBE6-B1D33CBD5F01}" type="datetimeFigureOut">
               <a:rPr kumimoji="1" lang="ja-JP" altLang="en-US" smtClean="0"/>
-              <a:t>2020/10/19</a:t>
+              <a:t>2020/11/23</a:t>
             </a:fld>
             <a:endParaRPr kumimoji="1" lang="ja-JP" altLang="en-US"/>
           </a:p>
@@ -1205,7 +1206,7 @@
           <a:p>
             <a:fld id="{B7E48A73-9369-4B88-BBE6-B1D33CBD5F01}" type="datetimeFigureOut">
               <a:rPr kumimoji="1" lang="ja-JP" altLang="en-US" smtClean="0"/>
-              <a:t>2020/10/19</a:t>
+              <a:t>2020/11/23</a:t>
             </a:fld>
             <a:endParaRPr kumimoji="1" lang="ja-JP" altLang="en-US"/>
           </a:p>
@@ -1435,7 +1436,7 @@
           <a:p>
             <a:fld id="{B7E48A73-9369-4B88-BBE6-B1D33CBD5F01}" type="datetimeFigureOut">
               <a:rPr kumimoji="1" lang="ja-JP" altLang="en-US" smtClean="0"/>
-              <a:t>2020/10/19</a:t>
+              <a:t>2020/11/23</a:t>
             </a:fld>
             <a:endParaRPr kumimoji="1" lang="ja-JP" altLang="en-US"/>
           </a:p>
@@ -1710,7 +1711,7 @@
           <a:p>
             <a:fld id="{B7E48A73-9369-4B88-BBE6-B1D33CBD5F01}" type="datetimeFigureOut">
               <a:rPr kumimoji="1" lang="ja-JP" altLang="en-US" smtClean="0"/>
-              <a:t>2020/10/19</a:t>
+              <a:t>2020/11/23</a:t>
             </a:fld>
             <a:endParaRPr kumimoji="1" lang="ja-JP" altLang="en-US"/>
           </a:p>
@@ -2039,7 +2040,7 @@
           <a:p>
             <a:fld id="{B7E48A73-9369-4B88-BBE6-B1D33CBD5F01}" type="datetimeFigureOut">
               <a:rPr kumimoji="1" lang="ja-JP" altLang="en-US" smtClean="0"/>
-              <a:t>2020/10/19</a:t>
+              <a:t>2020/11/23</a:t>
             </a:fld>
             <a:endParaRPr kumimoji="1" lang="ja-JP" altLang="en-US"/>
           </a:p>
@@ -2515,7 +2516,7 @@
           <a:p>
             <a:fld id="{B7E48A73-9369-4B88-BBE6-B1D33CBD5F01}" type="datetimeFigureOut">
               <a:rPr kumimoji="1" lang="ja-JP" altLang="en-US" smtClean="0"/>
-              <a:t>2020/10/19</a:t>
+              <a:t>2020/11/23</a:t>
             </a:fld>
             <a:endParaRPr kumimoji="1" lang="ja-JP" altLang="en-US"/>
           </a:p>
@@ -2656,7 +2657,7 @@
           <a:p>
             <a:fld id="{B7E48A73-9369-4B88-BBE6-B1D33CBD5F01}" type="datetimeFigureOut">
               <a:rPr kumimoji="1" lang="ja-JP" altLang="en-US" smtClean="0"/>
-              <a:t>2020/10/19</a:t>
+              <a:t>2020/11/23</a:t>
             </a:fld>
             <a:endParaRPr kumimoji="1" lang="ja-JP" altLang="en-US"/>
           </a:p>
@@ -2769,7 +2770,7 @@
           <a:p>
             <a:fld id="{B7E48A73-9369-4B88-BBE6-B1D33CBD5F01}" type="datetimeFigureOut">
               <a:rPr kumimoji="1" lang="ja-JP" altLang="en-US" smtClean="0"/>
-              <a:t>2020/10/19</a:t>
+              <a:t>2020/11/23</a:t>
             </a:fld>
             <a:endParaRPr kumimoji="1" lang="ja-JP" altLang="en-US"/>
           </a:p>
@@ -3112,7 +3113,7 @@
           <a:p>
             <a:fld id="{B7E48A73-9369-4B88-BBE6-B1D33CBD5F01}" type="datetimeFigureOut">
               <a:rPr kumimoji="1" lang="ja-JP" altLang="en-US" smtClean="0"/>
-              <a:t>2020/10/19</a:t>
+              <a:t>2020/11/23</a:t>
             </a:fld>
             <a:endParaRPr kumimoji="1" lang="ja-JP" altLang="en-US"/>
           </a:p>
@@ -3400,7 +3401,7 @@
           <a:p>
             <a:fld id="{B7E48A73-9369-4B88-BBE6-B1D33CBD5F01}" type="datetimeFigureOut">
               <a:rPr kumimoji="1" lang="ja-JP" altLang="en-US" smtClean="0"/>
-              <a:t>2020/10/19</a:t>
+              <a:t>2020/11/23</a:t>
             </a:fld>
             <a:endParaRPr kumimoji="1" lang="ja-JP" altLang="en-US"/>
           </a:p>
@@ -3673,7 +3674,7 @@
           <a:p>
             <a:fld id="{B7E48A73-9369-4B88-BBE6-B1D33CBD5F01}" type="datetimeFigureOut">
               <a:rPr kumimoji="1" lang="ja-JP" altLang="en-US" smtClean="0"/>
-              <a:t>2020/10/19</a:t>
+              <a:t>2020/11/23</a:t>
             </a:fld>
             <a:endParaRPr kumimoji="1" lang="ja-JP" altLang="en-US"/>
           </a:p>
@@ -30272,6 +30273,152 @@
 </p:sld>
 </file>
 
+<file path=ppt/slides/slide10.xml><?xml version="1.0" encoding="utf-8"?>
+<p:sld xmlns:a="http://schemas.openxmlformats.org/drawingml/2006/main" xmlns:r="http://schemas.openxmlformats.org/officeDocument/2006/relationships" xmlns:p="http://schemas.openxmlformats.org/presentationml/2006/main">
+  <p:cSld>
+    <p:spTree>
+      <p:nvGrpSpPr>
+        <p:cNvPr id="1" name=""/>
+        <p:cNvGrpSpPr/>
+        <p:nvPr/>
+      </p:nvGrpSpPr>
+      <p:grpSpPr>
+        <a:xfrm>
+          <a:off x="0" y="0"/>
+          <a:ext cx="0" cy="0"/>
+          <a:chOff x="0" y="0"/>
+          <a:chExt cx="0" cy="0"/>
+        </a:xfrm>
+      </p:grpSpPr>
+      <p:sp>
+        <p:nvSpPr>
+          <p:cNvPr id="4" name="正方形/長方形 3">
+            <a:extLst>
+              <a:ext uri="{FF2B5EF4-FFF2-40B4-BE49-F238E27FC236}">
+                <a16:creationId xmlns:a16="http://schemas.microsoft.com/office/drawing/2014/main" id="{7E22A82D-94E5-442E-BA0E-94BDB357744B}"/>
+              </a:ext>
+            </a:extLst>
+          </p:cNvPr>
+          <p:cNvSpPr/>
+          <p:nvPr/>
+        </p:nvSpPr>
+        <p:spPr>
+          <a:xfrm>
+            <a:off x="1400580" y="2212841"/>
+            <a:ext cx="1853541" cy="523220"/>
+          </a:xfrm>
+          <a:prstGeom prst="rect">
+            <a:avLst/>
+          </a:prstGeom>
+          <a:solidFill>
+            <a:srgbClr val="0070C0"/>
+          </a:solidFill>
+        </p:spPr>
+        <p:txBody>
+          <a:bodyPr wrap="square">
+            <a:spAutoFit/>
+          </a:bodyPr>
+          <a:lstStyle/>
+          <a:p>
+            <a:pPr algn="ctr"/>
+            <a:r>
+              <a:rPr lang="en-US" altLang="ja-JP" sz="2800" dirty="0">
+                <a:solidFill>
+                  <a:srgbClr val="00B0F0"/>
+                </a:solidFill>
+                <a:latin typeface="Bauhaus 93" panose="04030905020B02020C02" pitchFamily="82" charset="0"/>
+                <a:ea typeface="ＭＳ Ｐゴシック" panose="020B0600070205080204" pitchFamily="50" charset="-128"/>
+              </a:rPr>
+              <a:t>YM-Ⅱ608</a:t>
+            </a:r>
+          </a:p>
+        </p:txBody>
+      </p:sp>
+      <p:sp>
+        <p:nvSpPr>
+          <p:cNvPr id="5" name="正方形/長方形 4">
+            <a:extLst>
+              <a:ext uri="{FF2B5EF4-FFF2-40B4-BE49-F238E27FC236}">
+                <a16:creationId xmlns:a16="http://schemas.microsoft.com/office/drawing/2014/main" id="{7618A33F-1FA2-493A-8561-1EFCCF3A3088}"/>
+              </a:ext>
+            </a:extLst>
+          </p:cNvPr>
+          <p:cNvSpPr/>
+          <p:nvPr/>
+        </p:nvSpPr>
+        <p:spPr>
+          <a:xfrm>
+            <a:off x="1359275" y="2166376"/>
+            <a:ext cx="1853541" cy="523220"/>
+          </a:xfrm>
+          <a:prstGeom prst="rect">
+            <a:avLst/>
+          </a:prstGeom>
+          <a:noFill/>
+        </p:spPr>
+        <p:txBody>
+          <a:bodyPr wrap="square">
+            <a:spAutoFit/>
+          </a:bodyPr>
+          <a:lstStyle/>
+          <a:p>
+            <a:pPr algn="ctr"/>
+            <a:r>
+              <a:rPr lang="en-US" altLang="ja-JP" sz="2800" dirty="0">
+                <a:solidFill>
+                  <a:schemeClr val="bg1"/>
+                </a:solidFill>
+                <a:latin typeface="Bauhaus 93" panose="04030905020B02020C02" pitchFamily="82" charset="0"/>
+                <a:ea typeface="ＭＳ Ｐゴシック" panose="020B0600070205080204" pitchFamily="50" charset="-128"/>
+              </a:rPr>
+              <a:t>YM-Ⅱ608</a:t>
+            </a:r>
+          </a:p>
+        </p:txBody>
+      </p:sp>
+      <p:pic>
+        <p:nvPicPr>
+          <p:cNvPr id="8" name="図 7">
+            <a:extLst>
+              <a:ext uri="{FF2B5EF4-FFF2-40B4-BE49-F238E27FC236}">
+                <a16:creationId xmlns:a16="http://schemas.microsoft.com/office/drawing/2014/main" id="{6E16CAE2-1D0E-4380-BD41-A44D38B7B00F}"/>
+              </a:ext>
+            </a:extLst>
+          </p:cNvPr>
+          <p:cNvPicPr>
+            <a:picLocks noChangeAspect="1"/>
+          </p:cNvPicPr>
+          <p:nvPr/>
+        </p:nvPicPr>
+        <p:blipFill>
+          <a:blip r:embed="rId2"/>
+          <a:stretch>
+            <a:fillRect/>
+          </a:stretch>
+        </p:blipFill>
+        <p:spPr>
+          <a:xfrm>
+            <a:off x="5111411" y="3529720"/>
+            <a:ext cx="745380" cy="313844"/>
+          </a:xfrm>
+          <a:prstGeom prst="rect">
+            <a:avLst/>
+          </a:prstGeom>
+        </p:spPr>
+      </p:pic>
+    </p:spTree>
+    <p:extLst>
+      <p:ext uri="{BB962C8B-B14F-4D97-AF65-F5344CB8AC3E}">
+        <p14:creationId xmlns:p14="http://schemas.microsoft.com/office/powerpoint/2010/main" val="925364325"/>
+      </p:ext>
+    </p:extLst>
+  </p:cSld>
+  <p:clrMapOvr>
+    <a:masterClrMapping/>
+  </p:clrMapOvr>
+</p:sld>
+</file>
+
 <file path=ppt/slides/slide2.xml><?xml version="1.0" encoding="utf-8"?>
 <p:sld xmlns:a="http://schemas.openxmlformats.org/drawingml/2006/main" xmlns:r="http://schemas.openxmlformats.org/officeDocument/2006/relationships" xmlns:p="http://schemas.openxmlformats.org/presentationml/2006/main">
   <p:cSld>

</xml_diff>

<commit_message>
v3.9.3.3 - Fixed crashing CM-32P. - Added YM2414(OPZ) as experimantal. And, added FITOM bank file reader as experimantal.
</commit_message>
<xml_diff>
--- a/src/mamidimemo/Data/Images.pptx
+++ b/src/mamidimemo/Data/Images.pptx
@@ -5,7 +5,7 @@
     <p:sldMasterId id="2147483648" r:id="rId1"/>
   </p:sldMasterIdLst>
   <p:notesMasterIdLst>
-    <p:notesMasterId r:id="rId16"/>
+    <p:notesMasterId r:id="rId18"/>
   </p:notesMasterIdLst>
   <p:sldIdLst>
     <p:sldId id="256" r:id="rId2"/>
@@ -22,6 +22,8 @@
     <p:sldId id="267" r:id="rId13"/>
     <p:sldId id="268" r:id="rId14"/>
     <p:sldId id="269" r:id="rId15"/>
+    <p:sldId id="270" r:id="rId16"/>
+    <p:sldId id="271" r:id="rId17"/>
   </p:sldIdLst>
   <p:sldSz cx="12192000" cy="6858000"/>
   <p:notesSz cx="6858000" cy="9144000"/>
@@ -210,7 +212,7 @@
           <a:p>
             <a:fld id="{FD0ADE19-EE5F-4EAE-BCEC-0B5F9244BB48}" type="datetimeFigureOut">
               <a:rPr kumimoji="1" lang="ja-JP" altLang="en-US" smtClean="0"/>
-              <a:t>2021/2/2</a:t>
+              <a:t>2021/10/5</a:t>
             </a:fld>
             <a:endParaRPr kumimoji="1" lang="ja-JP" altLang="en-US"/>
           </a:p>
@@ -740,7 +742,7 @@
           <a:p>
             <a:fld id="{B7E48A73-9369-4B88-BBE6-B1D33CBD5F01}" type="datetimeFigureOut">
               <a:rPr kumimoji="1" lang="ja-JP" altLang="en-US" smtClean="0"/>
-              <a:t>2021/2/2</a:t>
+              <a:t>2021/10/5</a:t>
             </a:fld>
             <a:endParaRPr kumimoji="1" lang="ja-JP" altLang="en-US"/>
           </a:p>
@@ -970,7 +972,7 @@
           <a:p>
             <a:fld id="{B7E48A73-9369-4B88-BBE6-B1D33CBD5F01}" type="datetimeFigureOut">
               <a:rPr kumimoji="1" lang="ja-JP" altLang="en-US" smtClean="0"/>
-              <a:t>2021/2/2</a:t>
+              <a:t>2021/10/5</a:t>
             </a:fld>
             <a:endParaRPr kumimoji="1" lang="ja-JP" altLang="en-US"/>
           </a:p>
@@ -1210,7 +1212,7 @@
           <a:p>
             <a:fld id="{B7E48A73-9369-4B88-BBE6-B1D33CBD5F01}" type="datetimeFigureOut">
               <a:rPr kumimoji="1" lang="ja-JP" altLang="en-US" smtClean="0"/>
-              <a:t>2021/2/2</a:t>
+              <a:t>2021/10/5</a:t>
             </a:fld>
             <a:endParaRPr kumimoji="1" lang="ja-JP" altLang="en-US"/>
           </a:p>
@@ -1440,7 +1442,7 @@
           <a:p>
             <a:fld id="{B7E48A73-9369-4B88-BBE6-B1D33CBD5F01}" type="datetimeFigureOut">
               <a:rPr kumimoji="1" lang="ja-JP" altLang="en-US" smtClean="0"/>
-              <a:t>2021/2/2</a:t>
+              <a:t>2021/10/5</a:t>
             </a:fld>
             <a:endParaRPr kumimoji="1" lang="ja-JP" altLang="en-US"/>
           </a:p>
@@ -1715,7 +1717,7 @@
           <a:p>
             <a:fld id="{B7E48A73-9369-4B88-BBE6-B1D33CBD5F01}" type="datetimeFigureOut">
               <a:rPr kumimoji="1" lang="ja-JP" altLang="en-US" smtClean="0"/>
-              <a:t>2021/2/2</a:t>
+              <a:t>2021/10/5</a:t>
             </a:fld>
             <a:endParaRPr kumimoji="1" lang="ja-JP" altLang="en-US"/>
           </a:p>
@@ -2044,7 +2046,7 @@
           <a:p>
             <a:fld id="{B7E48A73-9369-4B88-BBE6-B1D33CBD5F01}" type="datetimeFigureOut">
               <a:rPr kumimoji="1" lang="ja-JP" altLang="en-US" smtClean="0"/>
-              <a:t>2021/2/2</a:t>
+              <a:t>2021/10/5</a:t>
             </a:fld>
             <a:endParaRPr kumimoji="1" lang="ja-JP" altLang="en-US"/>
           </a:p>
@@ -2520,7 +2522,7 @@
           <a:p>
             <a:fld id="{B7E48A73-9369-4B88-BBE6-B1D33CBD5F01}" type="datetimeFigureOut">
               <a:rPr kumimoji="1" lang="ja-JP" altLang="en-US" smtClean="0"/>
-              <a:t>2021/2/2</a:t>
+              <a:t>2021/10/5</a:t>
             </a:fld>
             <a:endParaRPr kumimoji="1" lang="ja-JP" altLang="en-US"/>
           </a:p>
@@ -2661,7 +2663,7 @@
           <a:p>
             <a:fld id="{B7E48A73-9369-4B88-BBE6-B1D33CBD5F01}" type="datetimeFigureOut">
               <a:rPr kumimoji="1" lang="ja-JP" altLang="en-US" smtClean="0"/>
-              <a:t>2021/2/2</a:t>
+              <a:t>2021/10/5</a:t>
             </a:fld>
             <a:endParaRPr kumimoji="1" lang="ja-JP" altLang="en-US"/>
           </a:p>
@@ -2774,7 +2776,7 @@
           <a:p>
             <a:fld id="{B7E48A73-9369-4B88-BBE6-B1D33CBD5F01}" type="datetimeFigureOut">
               <a:rPr kumimoji="1" lang="ja-JP" altLang="en-US" smtClean="0"/>
-              <a:t>2021/2/2</a:t>
+              <a:t>2021/10/5</a:t>
             </a:fld>
             <a:endParaRPr kumimoji="1" lang="ja-JP" altLang="en-US"/>
           </a:p>
@@ -3117,7 +3119,7 @@
           <a:p>
             <a:fld id="{B7E48A73-9369-4B88-BBE6-B1D33CBD5F01}" type="datetimeFigureOut">
               <a:rPr kumimoji="1" lang="ja-JP" altLang="en-US" smtClean="0"/>
-              <a:t>2021/2/2</a:t>
+              <a:t>2021/10/5</a:t>
             </a:fld>
             <a:endParaRPr kumimoji="1" lang="ja-JP" altLang="en-US"/>
           </a:p>
@@ -3405,7 +3407,7 @@
           <a:p>
             <a:fld id="{B7E48A73-9369-4B88-BBE6-B1D33CBD5F01}" type="datetimeFigureOut">
               <a:rPr kumimoji="1" lang="ja-JP" altLang="en-US" smtClean="0"/>
-              <a:t>2021/2/2</a:t>
+              <a:t>2021/10/5</a:t>
             </a:fld>
             <a:endParaRPr kumimoji="1" lang="ja-JP" altLang="en-US"/>
           </a:p>
@@ -3678,7 +3680,7 @@
           <a:p>
             <a:fld id="{B7E48A73-9369-4B88-BBE6-B1D33CBD5F01}" type="datetimeFigureOut">
               <a:rPr kumimoji="1" lang="ja-JP" altLang="en-US" smtClean="0"/>
-              <a:t>2021/2/2</a:t>
+              <a:t>2021/10/5</a:t>
             </a:fld>
             <a:endParaRPr kumimoji="1" lang="ja-JP" altLang="en-US"/>
           </a:p>
@@ -31964,6 +31966,624 @@
 </p:sld>
 </file>
 
+<file path=ppt/slides/slide15.xml><?xml version="1.0" encoding="utf-8"?>
+<p:sld xmlns:a="http://schemas.openxmlformats.org/drawingml/2006/main" xmlns:r="http://schemas.openxmlformats.org/officeDocument/2006/relationships" xmlns:p="http://schemas.openxmlformats.org/presentationml/2006/main">
+  <p:cSld>
+    <p:spTree>
+      <p:nvGrpSpPr>
+        <p:cNvPr id="1" name=""/>
+        <p:cNvGrpSpPr/>
+        <p:nvPr/>
+      </p:nvGrpSpPr>
+      <p:grpSpPr>
+        <a:xfrm>
+          <a:off x="0" y="0"/>
+          <a:ext cx="0" cy="0"/>
+          <a:chOff x="0" y="0"/>
+          <a:chExt cx="0" cy="0"/>
+        </a:xfrm>
+      </p:grpSpPr>
+      <p:pic>
+        <p:nvPicPr>
+          <p:cNvPr id="6" name="図 5">
+            <a:extLst>
+              <a:ext uri="{FF2B5EF4-FFF2-40B4-BE49-F238E27FC236}">
+                <a16:creationId xmlns:a16="http://schemas.microsoft.com/office/drawing/2014/main" id="{4652BB12-6563-470A-9D25-FCF38D0EA3F2}"/>
+              </a:ext>
+            </a:extLst>
+          </p:cNvPr>
+          <p:cNvPicPr>
+            <a:picLocks noChangeAspect="1"/>
+          </p:cNvPicPr>
+          <p:nvPr/>
+        </p:nvPicPr>
+        <p:blipFill>
+          <a:blip r:embed="rId2">
+            <a:extLst>
+              <a:ext uri="{28A0092B-C50C-407E-A947-70E740481C1C}">
+                <a14:useLocalDpi xmlns:a14="http://schemas.microsoft.com/office/drawing/2010/main" val="0"/>
+              </a:ext>
+            </a:extLst>
+          </a:blip>
+          <a:stretch>
+            <a:fillRect/>
+          </a:stretch>
+        </p:blipFill>
+        <p:spPr>
+          <a:xfrm>
+            <a:off x="131762" y="433387"/>
+            <a:ext cx="4344727" cy="2995613"/>
+          </a:xfrm>
+          <a:prstGeom prst="rect">
+            <a:avLst/>
+          </a:prstGeom>
+          <a:scene3d>
+            <a:camera prst="perspectiveRelaxedModerately" fov="0">
+              <a:rot lat="0" lon="2400000" rev="0"/>
+            </a:camera>
+            <a:lightRig rig="threePt" dir="t"/>
+          </a:scene3d>
+          <a:sp3d z="38100"/>
+        </p:spPr>
+      </p:pic>
+      <p:pic>
+        <p:nvPicPr>
+          <p:cNvPr id="14" name="図 13">
+            <a:extLst>
+              <a:ext uri="{FF2B5EF4-FFF2-40B4-BE49-F238E27FC236}">
+                <a16:creationId xmlns:a16="http://schemas.microsoft.com/office/drawing/2014/main" id="{70383FC3-F748-44E9-8AAE-6D1172B5E590}"/>
+              </a:ext>
+            </a:extLst>
+          </p:cNvPr>
+          <p:cNvPicPr>
+            <a:picLocks noChangeAspect="1"/>
+          </p:cNvPicPr>
+          <p:nvPr/>
+        </p:nvPicPr>
+        <p:blipFill>
+          <a:blip r:embed="rId3">
+            <a:extLst>
+              <a:ext uri="{28A0092B-C50C-407E-A947-70E740481C1C}">
+                <a14:useLocalDpi xmlns:a14="http://schemas.microsoft.com/office/drawing/2010/main" val="0"/>
+              </a:ext>
+            </a:extLst>
+          </a:blip>
+          <a:stretch>
+            <a:fillRect/>
+          </a:stretch>
+        </p:blipFill>
+        <p:spPr>
+          <a:xfrm>
+            <a:off x="7488582" y="450481"/>
+            <a:ext cx="3908869" cy="2198739"/>
+          </a:xfrm>
+          <a:prstGeom prst="rect">
+            <a:avLst/>
+          </a:prstGeom>
+        </p:spPr>
+      </p:pic>
+      <p:grpSp>
+        <p:nvGrpSpPr>
+          <p:cNvPr id="23" name="グループ化 22">
+            <a:extLst>
+              <a:ext uri="{FF2B5EF4-FFF2-40B4-BE49-F238E27FC236}">
+                <a16:creationId xmlns:a16="http://schemas.microsoft.com/office/drawing/2014/main" id="{FDE64C05-EB6E-41C8-BD37-B5A09647A872}"/>
+              </a:ext>
+            </a:extLst>
+          </p:cNvPr>
+          <p:cNvGrpSpPr/>
+          <p:nvPr/>
+        </p:nvGrpSpPr>
+        <p:grpSpPr>
+          <a:xfrm>
+            <a:off x="5341385" y="1673958"/>
+            <a:ext cx="2086424" cy="975262"/>
+            <a:chOff x="5292276" y="199488"/>
+            <a:chExt cx="2086424" cy="975262"/>
+          </a:xfrm>
+        </p:grpSpPr>
+        <p:sp>
+          <p:nvSpPr>
+            <p:cNvPr id="9" name="四角形: 角を丸くする 8">
+              <a:extLst>
+                <a:ext uri="{FF2B5EF4-FFF2-40B4-BE49-F238E27FC236}">
+                  <a16:creationId xmlns:a16="http://schemas.microsoft.com/office/drawing/2014/main" id="{B9337319-BC26-453A-9BB6-FF91AB9A74A3}"/>
+                </a:ext>
+              </a:extLst>
+            </p:cNvPr>
+            <p:cNvSpPr/>
+            <p:nvPr/>
+          </p:nvSpPr>
+          <p:spPr>
+            <a:xfrm>
+              <a:off x="5292277" y="279400"/>
+              <a:ext cx="2086423" cy="895350"/>
+            </a:xfrm>
+            <a:prstGeom prst="roundRect">
+              <a:avLst/>
+            </a:prstGeom>
+            <a:solidFill>
+              <a:srgbClr val="DCE1DD"/>
+            </a:solidFill>
+            <a:ln>
+              <a:noFill/>
+            </a:ln>
+          </p:spPr>
+          <p:style>
+            <a:lnRef idx="2">
+              <a:schemeClr val="accent1">
+                <a:shade val="50000"/>
+              </a:schemeClr>
+            </a:lnRef>
+            <a:fillRef idx="1">
+              <a:schemeClr val="accent1"/>
+            </a:fillRef>
+            <a:effectRef idx="0">
+              <a:schemeClr val="accent1"/>
+            </a:effectRef>
+            <a:fontRef idx="minor">
+              <a:schemeClr val="lt1"/>
+            </a:fontRef>
+          </p:style>
+          <p:txBody>
+            <a:bodyPr rtlCol="0" anchor="ctr"/>
+            <a:lstStyle/>
+            <a:p>
+              <a:pPr algn="ctr"/>
+              <a:endParaRPr kumimoji="1" lang="ja-JP" altLang="en-US"/>
+            </a:p>
+          </p:txBody>
+        </p:sp>
+        <p:sp>
+          <p:nvSpPr>
+            <p:cNvPr id="10" name="正方形/長方形 9">
+              <a:extLst>
+                <a:ext uri="{FF2B5EF4-FFF2-40B4-BE49-F238E27FC236}">
+                  <a16:creationId xmlns:a16="http://schemas.microsoft.com/office/drawing/2014/main" id="{525A5634-3D01-48CF-B4C9-8CB8764D0FFC}"/>
+                </a:ext>
+              </a:extLst>
+            </p:cNvPr>
+            <p:cNvSpPr/>
+            <p:nvPr/>
+          </p:nvSpPr>
+          <p:spPr>
+            <a:xfrm>
+              <a:off x="5292276" y="199488"/>
+              <a:ext cx="2086423" cy="461665"/>
+            </a:xfrm>
+            <a:prstGeom prst="rect">
+              <a:avLst/>
+            </a:prstGeom>
+            <a:noFill/>
+          </p:spPr>
+          <p:txBody>
+            <a:bodyPr wrap="square">
+              <a:spAutoFit/>
+            </a:bodyPr>
+            <a:lstStyle/>
+            <a:p>
+              <a:pPr algn="ctr"/>
+              <a:r>
+                <a:rPr lang="en-US" altLang="ja-JP" sz="2400" spc="300" dirty="0">
+                  <a:latin typeface="Bahnschrift Condensed" panose="020B0502040204020203" pitchFamily="34" charset="0"/>
+                </a:rPr>
+                <a:t>YAMAHA</a:t>
+              </a:r>
+            </a:p>
+          </p:txBody>
+        </p:sp>
+        <p:sp>
+          <p:nvSpPr>
+            <p:cNvPr id="11" name="四角形: 角を丸くする 10">
+              <a:extLst>
+                <a:ext uri="{FF2B5EF4-FFF2-40B4-BE49-F238E27FC236}">
+                  <a16:creationId xmlns:a16="http://schemas.microsoft.com/office/drawing/2014/main" id="{FC4895D0-3785-40DE-BB4A-684DDD4756FB}"/>
+                </a:ext>
+              </a:extLst>
+            </p:cNvPr>
+            <p:cNvSpPr/>
+            <p:nvPr/>
+          </p:nvSpPr>
+          <p:spPr>
+            <a:xfrm>
+              <a:off x="5353051" y="587275"/>
+              <a:ext cx="1981200" cy="523581"/>
+            </a:xfrm>
+            <a:prstGeom prst="roundRect">
+              <a:avLst/>
+            </a:prstGeom>
+            <a:solidFill>
+              <a:srgbClr val="8FD9FC"/>
+            </a:solidFill>
+            <a:ln>
+              <a:noFill/>
+            </a:ln>
+          </p:spPr>
+          <p:style>
+            <a:lnRef idx="2">
+              <a:schemeClr val="accent1">
+                <a:shade val="50000"/>
+              </a:schemeClr>
+            </a:lnRef>
+            <a:fillRef idx="1">
+              <a:schemeClr val="accent1"/>
+            </a:fillRef>
+            <a:effectRef idx="0">
+              <a:schemeClr val="accent1"/>
+            </a:effectRef>
+            <a:fontRef idx="minor">
+              <a:schemeClr val="lt1"/>
+            </a:fontRef>
+          </p:style>
+          <p:txBody>
+            <a:bodyPr rtlCol="0" anchor="ctr"/>
+            <a:lstStyle/>
+            <a:p>
+              <a:pPr algn="ctr"/>
+              <a:endParaRPr kumimoji="1" lang="ja-JP" altLang="en-US"/>
+            </a:p>
+          </p:txBody>
+        </p:sp>
+        <p:pic>
+          <p:nvPicPr>
+            <p:cNvPr id="18" name="図 17">
+              <a:extLst>
+                <a:ext uri="{FF2B5EF4-FFF2-40B4-BE49-F238E27FC236}">
+                  <a16:creationId xmlns:a16="http://schemas.microsoft.com/office/drawing/2014/main" id="{3EC98136-1DE9-4622-A6A9-3D38787B0A85}"/>
+                </a:ext>
+              </a:extLst>
+            </p:cNvPr>
+            <p:cNvPicPr>
+              <a:picLocks noChangeAspect="1"/>
+            </p:cNvPicPr>
+            <p:nvPr/>
+          </p:nvPicPr>
+          <p:blipFill rotWithShape="1">
+            <a:blip r:embed="rId4">
+              <a:extLst>
+                <a:ext uri="{BEBA8EAE-BF5A-486C-A8C5-ECC9F3942E4B}">
+                  <a14:imgProps xmlns:a14="http://schemas.microsoft.com/office/drawing/2010/main">
+                    <a14:imgLayer r:embed="rId5">
+                      <a14:imgEffect>
+                        <a14:backgroundRemoval t="7902" b="90191" l="2333" r="90000">
+                          <a14:foregroundMark x1="49700" y1="25341" x2="49900" y2="85286"/>
+                          <a14:foregroundMark x1="50333" y1="10627" x2="50433" y2="31608"/>
+                          <a14:foregroundMark x1="50367" y1="90463" x2="50100" y2="63215"/>
+                          <a14:foregroundMark x1="45500" y1="12534" x2="40300" y2="11717"/>
+                          <a14:foregroundMark x1="40100" y1="14441" x2="39700" y2="48501"/>
+                          <a14:foregroundMark x1="40833" y1="47956" x2="45033" y2="48229"/>
+                          <a14:foregroundMark x1="45033" y1="48229" x2="46067" y2="79837"/>
+                          <a14:foregroundMark x1="46067" y1="79837" x2="41133" y2="88828"/>
+                          <a14:foregroundMark x1="36233" y1="16621" x2="36500" y2="81471"/>
+                          <a14:foregroundMark x1="20833" y1="19074" x2="20267" y2="29700"/>
+                          <a14:foregroundMark x1="26667" y1="7902" x2="28633" y2="7902"/>
+                          <a14:foregroundMark x1="2333" y1="19619" x2="2600" y2="32698"/>
+                        </a14:backgroundRemoval>
+                      </a14:imgEffect>
+                    </a14:imgLayer>
+                  </a14:imgProps>
+                </a:ext>
+                <a:ext uri="{28A0092B-C50C-407E-A947-70E740481C1C}">
+                  <a14:useLocalDpi xmlns:a14="http://schemas.microsoft.com/office/drawing/2010/main" val="0"/>
+                </a:ext>
+              </a:extLst>
+            </a:blip>
+            <a:srcRect r="48024"/>
+            <a:stretch/>
+          </p:blipFill>
+          <p:spPr>
+            <a:xfrm>
+              <a:off x="5419381" y="633445"/>
+              <a:ext cx="1832212" cy="431239"/>
+            </a:xfrm>
+            <a:prstGeom prst="rect">
+              <a:avLst/>
+            </a:prstGeom>
+          </p:spPr>
+        </p:pic>
+      </p:grpSp>
+      <p:pic>
+        <p:nvPicPr>
+          <p:cNvPr id="34" name="図 33">
+            <a:extLst>
+              <a:ext uri="{FF2B5EF4-FFF2-40B4-BE49-F238E27FC236}">
+                <a16:creationId xmlns:a16="http://schemas.microsoft.com/office/drawing/2014/main" id="{EF834C07-9371-42E3-8D6E-CE28BE26660B}"/>
+              </a:ext>
+            </a:extLst>
+          </p:cNvPr>
+          <p:cNvPicPr>
+            <a:picLocks noChangeAspect="1"/>
+          </p:cNvPicPr>
+          <p:nvPr/>
+        </p:nvPicPr>
+        <p:blipFill>
+          <a:blip r:embed="rId6"/>
+          <a:stretch>
+            <a:fillRect/>
+          </a:stretch>
+        </p:blipFill>
+        <p:spPr>
+          <a:xfrm>
+            <a:off x="5053494" y="3428999"/>
+            <a:ext cx="575782" cy="250853"/>
+          </a:xfrm>
+          <a:prstGeom prst="rect">
+            <a:avLst/>
+          </a:prstGeom>
+        </p:spPr>
+      </p:pic>
+      <p:pic>
+        <p:nvPicPr>
+          <p:cNvPr id="40" name="図 39">
+            <a:extLst>
+              <a:ext uri="{FF2B5EF4-FFF2-40B4-BE49-F238E27FC236}">
+                <a16:creationId xmlns:a16="http://schemas.microsoft.com/office/drawing/2014/main" id="{BEC96381-4B9A-403E-8574-09E597BDC553}"/>
+              </a:ext>
+            </a:extLst>
+          </p:cNvPr>
+          <p:cNvPicPr>
+            <a:picLocks noChangeAspect="1"/>
+          </p:cNvPicPr>
+          <p:nvPr/>
+        </p:nvPicPr>
+        <p:blipFill>
+          <a:blip r:embed="rId7"/>
+          <a:stretch>
+            <a:fillRect/>
+          </a:stretch>
+        </p:blipFill>
+        <p:spPr>
+          <a:xfrm>
+            <a:off x="5053493" y="3690255"/>
+            <a:ext cx="510665" cy="250853"/>
+          </a:xfrm>
+          <a:prstGeom prst="rect">
+            <a:avLst/>
+          </a:prstGeom>
+        </p:spPr>
+      </p:pic>
+    </p:spTree>
+    <p:extLst>
+      <p:ext uri="{BB962C8B-B14F-4D97-AF65-F5344CB8AC3E}">
+        <p14:creationId xmlns:p14="http://schemas.microsoft.com/office/powerpoint/2010/main" val="1880568065"/>
+      </p:ext>
+    </p:extLst>
+  </p:cSld>
+  <p:clrMapOvr>
+    <a:masterClrMapping/>
+  </p:clrMapOvr>
+</p:sld>
+</file>
+
+<file path=ppt/slides/slide16.xml><?xml version="1.0" encoding="utf-8"?>
+<p:sld xmlns:a="http://schemas.openxmlformats.org/drawingml/2006/main" xmlns:r="http://schemas.openxmlformats.org/officeDocument/2006/relationships" xmlns:p="http://schemas.openxmlformats.org/presentationml/2006/main">
+  <p:cSld>
+    <p:spTree>
+      <p:nvGrpSpPr>
+        <p:cNvPr id="1" name=""/>
+        <p:cNvGrpSpPr/>
+        <p:nvPr/>
+      </p:nvGrpSpPr>
+      <p:grpSpPr>
+        <a:xfrm>
+          <a:off x="0" y="0"/>
+          <a:ext cx="0" cy="0"/>
+          <a:chOff x="0" y="0"/>
+          <a:chExt cx="0" cy="0"/>
+        </a:xfrm>
+      </p:grpSpPr>
+      <p:sp>
+        <p:nvSpPr>
+          <p:cNvPr id="5" name="正方形/長方形 4">
+            <a:extLst>
+              <a:ext uri="{FF2B5EF4-FFF2-40B4-BE49-F238E27FC236}">
+                <a16:creationId xmlns:a16="http://schemas.microsoft.com/office/drawing/2014/main" id="{8291591B-C95C-4CC8-B9CA-692ACB4391B2}"/>
+              </a:ext>
+            </a:extLst>
+          </p:cNvPr>
+          <p:cNvSpPr/>
+          <p:nvPr/>
+        </p:nvSpPr>
+        <p:spPr>
+          <a:xfrm>
+            <a:off x="5341386" y="1753870"/>
+            <a:ext cx="2086423" cy="895350"/>
+          </a:xfrm>
+          <a:prstGeom prst="rect">
+            <a:avLst/>
+          </a:prstGeom>
+          <a:solidFill>
+            <a:srgbClr val="050504"/>
+          </a:solidFill>
+          <a:ln>
+            <a:noFill/>
+          </a:ln>
+        </p:spPr>
+        <p:style>
+          <a:lnRef idx="2">
+            <a:schemeClr val="accent1">
+              <a:shade val="50000"/>
+            </a:schemeClr>
+          </a:lnRef>
+          <a:fillRef idx="1">
+            <a:schemeClr val="accent1"/>
+          </a:fillRef>
+          <a:effectRef idx="0">
+            <a:schemeClr val="accent1"/>
+          </a:effectRef>
+          <a:fontRef idx="minor">
+            <a:schemeClr val="lt1"/>
+          </a:fontRef>
+        </p:style>
+        <p:txBody>
+          <a:bodyPr rtlCol="0" anchor="ctr"/>
+          <a:lstStyle/>
+          <a:p>
+            <a:pPr algn="ctr"/>
+            <a:endParaRPr kumimoji="1" lang="ja-JP" altLang="en-US"/>
+          </a:p>
+        </p:txBody>
+      </p:sp>
+      <p:sp>
+        <p:nvSpPr>
+          <p:cNvPr id="6" name="正方形/長方形 5">
+            <a:extLst>
+              <a:ext uri="{FF2B5EF4-FFF2-40B4-BE49-F238E27FC236}">
+                <a16:creationId xmlns:a16="http://schemas.microsoft.com/office/drawing/2014/main" id="{C498D819-E6E5-4E93-8821-5E80D5F517D5}"/>
+              </a:ext>
+            </a:extLst>
+          </p:cNvPr>
+          <p:cNvSpPr/>
+          <p:nvPr/>
+        </p:nvSpPr>
+        <p:spPr>
+          <a:xfrm>
+            <a:off x="5341385" y="1673958"/>
+            <a:ext cx="2086423" cy="461665"/>
+          </a:xfrm>
+          <a:prstGeom prst="rect">
+            <a:avLst/>
+          </a:prstGeom>
+          <a:noFill/>
+        </p:spPr>
+        <p:txBody>
+          <a:bodyPr wrap="square">
+            <a:spAutoFit/>
+          </a:bodyPr>
+          <a:lstStyle/>
+          <a:p>
+            <a:pPr algn="ctr"/>
+            <a:r>
+              <a:rPr lang="en-US" altLang="ja-JP" sz="2400" spc="300" dirty="0">
+                <a:solidFill>
+                  <a:srgbClr val="CDCDCD"/>
+                </a:solidFill>
+                <a:latin typeface="Bahnschrift Condensed" panose="020B0502040204020203" pitchFamily="34" charset="0"/>
+              </a:rPr>
+              <a:t>YAMAHA</a:t>
+            </a:r>
+          </a:p>
+        </p:txBody>
+      </p:sp>
+      <p:pic>
+        <p:nvPicPr>
+          <p:cNvPr id="10" name="図 9">
+            <a:extLst>
+              <a:ext uri="{FF2B5EF4-FFF2-40B4-BE49-F238E27FC236}">
+                <a16:creationId xmlns:a16="http://schemas.microsoft.com/office/drawing/2014/main" id="{3FE0F83A-0806-467D-BEC0-F819C6015AFF}"/>
+              </a:ext>
+            </a:extLst>
+          </p:cNvPr>
+          <p:cNvPicPr>
+            <a:picLocks noChangeAspect="1"/>
+          </p:cNvPicPr>
+          <p:nvPr/>
+        </p:nvPicPr>
+        <p:blipFill>
+          <a:blip r:embed="rId2"/>
+          <a:stretch>
+            <a:fillRect/>
+          </a:stretch>
+        </p:blipFill>
+        <p:spPr>
+          <a:xfrm rot="20832453">
+            <a:off x="2164829" y="1242710"/>
+            <a:ext cx="2924583" cy="1324160"/>
+          </a:xfrm>
+          <a:prstGeom prst="rect">
+            <a:avLst/>
+          </a:prstGeom>
+        </p:spPr>
+      </p:pic>
+      <p:pic>
+        <p:nvPicPr>
+          <p:cNvPr id="12" name="図 11">
+            <a:extLst>
+              <a:ext uri="{FF2B5EF4-FFF2-40B4-BE49-F238E27FC236}">
+                <a16:creationId xmlns:a16="http://schemas.microsoft.com/office/drawing/2014/main" id="{233C2B73-80C0-48ED-8211-8A89A2FDA65C}"/>
+              </a:ext>
+            </a:extLst>
+          </p:cNvPr>
+          <p:cNvPicPr>
+            <a:picLocks noChangeAspect="1"/>
+          </p:cNvPicPr>
+          <p:nvPr/>
+        </p:nvPicPr>
+        <p:blipFill rotWithShape="1">
+          <a:blip r:embed="rId3">
+            <a:clrChange>
+              <a:clrFrom>
+                <a:srgbClr val="FFFFFF"/>
+              </a:clrFrom>
+              <a:clrTo>
+                <a:srgbClr val="FFFFFF">
+                  <a:alpha val="0"/>
+                </a:srgbClr>
+              </a:clrTo>
+            </a:clrChange>
+            <a:lum bright="70000" contrast="-70000"/>
+            <a:extLst>
+              <a:ext uri="{28A0092B-C50C-407E-A947-70E740481C1C}">
+                <a14:useLocalDpi xmlns:a14="http://schemas.microsoft.com/office/drawing/2010/main" val="0"/>
+              </a:ext>
+            </a:extLst>
+          </a:blip>
+          <a:srcRect r="41157"/>
+          <a:stretch/>
+        </p:blipFill>
+        <p:spPr>
+          <a:xfrm>
+            <a:off x="5376310" y="2223629"/>
+            <a:ext cx="2035636" cy="217945"/>
+          </a:xfrm>
+          <a:prstGeom prst="rect">
+            <a:avLst/>
+          </a:prstGeom>
+        </p:spPr>
+      </p:pic>
+      <p:pic>
+        <p:nvPicPr>
+          <p:cNvPr id="20" name="図 19">
+            <a:extLst>
+              <a:ext uri="{FF2B5EF4-FFF2-40B4-BE49-F238E27FC236}">
+                <a16:creationId xmlns:a16="http://schemas.microsoft.com/office/drawing/2014/main" id="{59470B49-E0D8-47C2-9614-2C67DCA757F8}"/>
+              </a:ext>
+            </a:extLst>
+          </p:cNvPr>
+          <p:cNvPicPr>
+            <a:picLocks noChangeAspect="1"/>
+          </p:cNvPicPr>
+          <p:nvPr/>
+        </p:nvPicPr>
+        <p:blipFill>
+          <a:blip r:embed="rId4"/>
+          <a:stretch>
+            <a:fillRect/>
+          </a:stretch>
+        </p:blipFill>
+        <p:spPr>
+          <a:xfrm>
+            <a:off x="5053493" y="3708400"/>
+            <a:ext cx="473727" cy="232708"/>
+          </a:xfrm>
+          <a:prstGeom prst="rect">
+            <a:avLst/>
+          </a:prstGeom>
+        </p:spPr>
+      </p:pic>
+    </p:spTree>
+    <p:extLst>
+      <p:ext uri="{BB962C8B-B14F-4D97-AF65-F5344CB8AC3E}">
+        <p14:creationId xmlns:p14="http://schemas.microsoft.com/office/powerpoint/2010/main" val="2799603659"/>
+      </p:ext>
+    </p:extLst>
+  </p:cSld>
+  <p:clrMapOvr>
+    <a:masterClrMapping/>
+  </p:clrMapOvr>
+</p:sld>
+</file>
+
 <file path=ppt/slides/slide2.xml><?xml version="1.0" encoding="utf-8"?>
 <p:sld xmlns:a="http://schemas.openxmlformats.org/drawingml/2006/main" xmlns:r="http://schemas.openxmlformats.org/officeDocument/2006/relationships" xmlns:p="http://schemas.openxmlformats.org/presentationml/2006/main">
   <p:cSld>

</xml_diff>

<commit_message>
4.3.10.0 Added "FILT.Auto" property value for SID chips.
</commit_message>
<xml_diff>
--- a/src/mamidimemo/Data/Images.pptx
+++ b/src/mamidimemo/Data/Images.pptx
@@ -5,7 +5,7 @@
     <p:sldMasterId id="2147483648" r:id="rId1"/>
   </p:sldMasterIdLst>
   <p:notesMasterIdLst>
-    <p:notesMasterId r:id="rId18"/>
+    <p:notesMasterId r:id="rId19"/>
   </p:notesMasterIdLst>
   <p:sldIdLst>
     <p:sldId id="256" r:id="rId2"/>
@@ -24,6 +24,7 @@
     <p:sldId id="269" r:id="rId15"/>
     <p:sldId id="270" r:id="rId16"/>
     <p:sldId id="271" r:id="rId17"/>
+    <p:sldId id="272" r:id="rId18"/>
   </p:sldIdLst>
   <p:sldSz cx="12192000" cy="6858000"/>
   <p:notesSz cx="6858000" cy="9144000"/>
@@ -212,7 +213,7 @@
           <a:p>
             <a:fld id="{FD0ADE19-EE5F-4EAE-BCEC-0B5F9244BB48}" type="datetimeFigureOut">
               <a:rPr kumimoji="1" lang="ja-JP" altLang="en-US" smtClean="0"/>
-              <a:t>2022/7/23</a:t>
+              <a:t>2022/10/31</a:t>
             </a:fld>
             <a:endParaRPr kumimoji="1" lang="ja-JP" altLang="en-US"/>
           </a:p>
@@ -742,7 +743,7 @@
           <a:p>
             <a:fld id="{B7E48A73-9369-4B88-BBE6-B1D33CBD5F01}" type="datetimeFigureOut">
               <a:rPr kumimoji="1" lang="ja-JP" altLang="en-US" smtClean="0"/>
-              <a:t>2022/7/23</a:t>
+              <a:t>2022/10/31</a:t>
             </a:fld>
             <a:endParaRPr kumimoji="1" lang="ja-JP" altLang="en-US"/>
           </a:p>
@@ -972,7 +973,7 @@
           <a:p>
             <a:fld id="{B7E48A73-9369-4B88-BBE6-B1D33CBD5F01}" type="datetimeFigureOut">
               <a:rPr kumimoji="1" lang="ja-JP" altLang="en-US" smtClean="0"/>
-              <a:t>2022/7/23</a:t>
+              <a:t>2022/10/31</a:t>
             </a:fld>
             <a:endParaRPr kumimoji="1" lang="ja-JP" altLang="en-US"/>
           </a:p>
@@ -1212,7 +1213,7 @@
           <a:p>
             <a:fld id="{B7E48A73-9369-4B88-BBE6-B1D33CBD5F01}" type="datetimeFigureOut">
               <a:rPr kumimoji="1" lang="ja-JP" altLang="en-US" smtClean="0"/>
-              <a:t>2022/7/23</a:t>
+              <a:t>2022/10/31</a:t>
             </a:fld>
             <a:endParaRPr kumimoji="1" lang="ja-JP" altLang="en-US"/>
           </a:p>
@@ -1442,7 +1443,7 @@
           <a:p>
             <a:fld id="{B7E48A73-9369-4B88-BBE6-B1D33CBD5F01}" type="datetimeFigureOut">
               <a:rPr kumimoji="1" lang="ja-JP" altLang="en-US" smtClean="0"/>
-              <a:t>2022/7/23</a:t>
+              <a:t>2022/10/31</a:t>
             </a:fld>
             <a:endParaRPr kumimoji="1" lang="ja-JP" altLang="en-US"/>
           </a:p>
@@ -1717,7 +1718,7 @@
           <a:p>
             <a:fld id="{B7E48A73-9369-4B88-BBE6-B1D33CBD5F01}" type="datetimeFigureOut">
               <a:rPr kumimoji="1" lang="ja-JP" altLang="en-US" smtClean="0"/>
-              <a:t>2022/7/23</a:t>
+              <a:t>2022/10/31</a:t>
             </a:fld>
             <a:endParaRPr kumimoji="1" lang="ja-JP" altLang="en-US"/>
           </a:p>
@@ -2046,7 +2047,7 @@
           <a:p>
             <a:fld id="{B7E48A73-9369-4B88-BBE6-B1D33CBD5F01}" type="datetimeFigureOut">
               <a:rPr kumimoji="1" lang="ja-JP" altLang="en-US" smtClean="0"/>
-              <a:t>2022/7/23</a:t>
+              <a:t>2022/10/31</a:t>
             </a:fld>
             <a:endParaRPr kumimoji="1" lang="ja-JP" altLang="en-US"/>
           </a:p>
@@ -2522,7 +2523,7 @@
           <a:p>
             <a:fld id="{B7E48A73-9369-4B88-BBE6-B1D33CBD5F01}" type="datetimeFigureOut">
               <a:rPr kumimoji="1" lang="ja-JP" altLang="en-US" smtClean="0"/>
-              <a:t>2022/7/23</a:t>
+              <a:t>2022/10/31</a:t>
             </a:fld>
             <a:endParaRPr kumimoji="1" lang="ja-JP" altLang="en-US"/>
           </a:p>
@@ -2663,7 +2664,7 @@
           <a:p>
             <a:fld id="{B7E48A73-9369-4B88-BBE6-B1D33CBD5F01}" type="datetimeFigureOut">
               <a:rPr kumimoji="1" lang="ja-JP" altLang="en-US" smtClean="0"/>
-              <a:t>2022/7/23</a:t>
+              <a:t>2022/10/31</a:t>
             </a:fld>
             <a:endParaRPr kumimoji="1" lang="ja-JP" altLang="en-US"/>
           </a:p>
@@ -2776,7 +2777,7 @@
           <a:p>
             <a:fld id="{B7E48A73-9369-4B88-BBE6-B1D33CBD5F01}" type="datetimeFigureOut">
               <a:rPr kumimoji="1" lang="ja-JP" altLang="en-US" smtClean="0"/>
-              <a:t>2022/7/23</a:t>
+              <a:t>2022/10/31</a:t>
             </a:fld>
             <a:endParaRPr kumimoji="1" lang="ja-JP" altLang="en-US"/>
           </a:p>
@@ -3119,7 +3120,7 @@
           <a:p>
             <a:fld id="{B7E48A73-9369-4B88-BBE6-B1D33CBD5F01}" type="datetimeFigureOut">
               <a:rPr kumimoji="1" lang="ja-JP" altLang="en-US" smtClean="0"/>
-              <a:t>2022/7/23</a:t>
+              <a:t>2022/10/31</a:t>
             </a:fld>
             <a:endParaRPr kumimoji="1" lang="ja-JP" altLang="en-US"/>
           </a:p>
@@ -3407,7 +3408,7 @@
           <a:p>
             <a:fld id="{B7E48A73-9369-4B88-BBE6-B1D33CBD5F01}" type="datetimeFigureOut">
               <a:rPr kumimoji="1" lang="ja-JP" altLang="en-US" smtClean="0"/>
-              <a:t>2022/7/23</a:t>
+              <a:t>2022/10/31</a:t>
             </a:fld>
             <a:endParaRPr kumimoji="1" lang="ja-JP" altLang="en-US"/>
           </a:p>
@@ -3680,7 +3681,7 @@
           <a:p>
             <a:fld id="{B7E48A73-9369-4B88-BBE6-B1D33CBD5F01}" type="datetimeFigureOut">
               <a:rPr kumimoji="1" lang="ja-JP" altLang="en-US" smtClean="0"/>
-              <a:t>2022/7/23</a:t>
+              <a:t>2022/10/31</a:t>
             </a:fld>
             <a:endParaRPr kumimoji="1" lang="ja-JP" altLang="en-US"/>
           </a:p>
@@ -32813,6 +32814,896 @@
 </p:sld>
 </file>
 
+<file path=ppt/slides/slide17.xml><?xml version="1.0" encoding="utf-8"?>
+<p:sld xmlns:a="http://schemas.openxmlformats.org/drawingml/2006/main" xmlns:r="http://schemas.openxmlformats.org/officeDocument/2006/relationships" xmlns:p="http://schemas.openxmlformats.org/presentationml/2006/main">
+  <p:cSld>
+    <p:spTree>
+      <p:nvGrpSpPr>
+        <p:cNvPr id="1" name=""/>
+        <p:cNvGrpSpPr/>
+        <p:nvPr/>
+      </p:nvGrpSpPr>
+      <p:grpSpPr>
+        <a:xfrm>
+          <a:off x="0" y="0"/>
+          <a:ext cx="0" cy="0"/>
+          <a:chOff x="0" y="0"/>
+          <a:chExt cx="0" cy="0"/>
+        </a:xfrm>
+      </p:grpSpPr>
+      <p:sp>
+        <p:nvSpPr>
+          <p:cNvPr id="4" name="四角形: 角を丸くする 3">
+            <a:extLst>
+              <a:ext uri="{FF2B5EF4-FFF2-40B4-BE49-F238E27FC236}">
+                <a16:creationId xmlns:a16="http://schemas.microsoft.com/office/drawing/2014/main" id="{C7A0E99C-A6BB-571B-B6FE-D46B31F2FA0C}"/>
+              </a:ext>
+            </a:extLst>
+          </p:cNvPr>
+          <p:cNvSpPr/>
+          <p:nvPr/>
+        </p:nvSpPr>
+        <p:spPr>
+          <a:xfrm>
+            <a:off x="1394748" y="879676"/>
+            <a:ext cx="2789499" cy="3622876"/>
+          </a:xfrm>
+          <a:prstGeom prst="roundRect">
+            <a:avLst>
+              <a:gd name="adj" fmla="val 4687"/>
+            </a:avLst>
+          </a:prstGeom>
+          <a:solidFill>
+            <a:schemeClr val="bg1">
+              <a:lumMod val="75000"/>
+            </a:schemeClr>
+          </a:solidFill>
+          <a:ln>
+            <a:solidFill>
+              <a:schemeClr val="tx1"/>
+            </a:solidFill>
+          </a:ln>
+        </p:spPr>
+        <p:style>
+          <a:lnRef idx="2">
+            <a:schemeClr val="dk1">
+              <a:shade val="50000"/>
+            </a:schemeClr>
+          </a:lnRef>
+          <a:fillRef idx="1">
+            <a:schemeClr val="dk1"/>
+          </a:fillRef>
+          <a:effectRef idx="0">
+            <a:schemeClr val="dk1"/>
+          </a:effectRef>
+          <a:fontRef idx="minor">
+            <a:schemeClr val="lt1"/>
+          </a:fontRef>
+        </p:style>
+        <p:txBody>
+          <a:bodyPr wrap="none" rtlCol="0" anchor="ctr"/>
+          <a:lstStyle/>
+          <a:p>
+            <a:pPr algn="ctr"/>
+            <a:r>
+              <a:rPr lang="en-US" altLang="ja-JP" dirty="0">
+                <a:solidFill>
+                  <a:schemeClr val="tx1"/>
+                </a:solidFill>
+                <a:latin typeface="F910新コミック体" panose="02000600000000000000" pitchFamily="50" charset="-128"/>
+                <a:ea typeface="F910新コミック体" panose="02000600000000000000" pitchFamily="50" charset="-128"/>
+              </a:rPr>
+              <a:t>MIDI Delay Test Tool</a:t>
+            </a:r>
+          </a:p>
+          <a:p>
+            <a:pPr algn="ctr"/>
+            <a:endParaRPr kumimoji="1" lang="ja-JP" altLang="en-US" dirty="0">
+              <a:solidFill>
+                <a:sysClr val="windowText" lastClr="000000"/>
+              </a:solidFill>
+              <a:latin typeface="F910新コミック体" panose="02000600000000000000" pitchFamily="50" charset="-128"/>
+              <a:ea typeface="F910新コミック体" panose="02000600000000000000" pitchFamily="50" charset="-128"/>
+            </a:endParaRPr>
+          </a:p>
+          <a:p>
+            <a:pPr algn="ctr"/>
+            <a:r>
+              <a:rPr kumimoji="1" lang="en-US" altLang="ja-JP" dirty="0">
+                <a:solidFill>
+                  <a:schemeClr val="tx1"/>
+                </a:solidFill>
+              </a:rPr>
+              <a:t>PC</a:t>
+            </a:r>
+          </a:p>
+        </p:txBody>
+      </p:sp>
+      <p:sp>
+        <p:nvSpPr>
+          <p:cNvPr id="5" name="正方形/長方形 4">
+            <a:extLst>
+              <a:ext uri="{FF2B5EF4-FFF2-40B4-BE49-F238E27FC236}">
+                <a16:creationId xmlns:a16="http://schemas.microsoft.com/office/drawing/2014/main" id="{AE140F9A-7DDB-C3A7-8ACD-B91525F1688A}"/>
+              </a:ext>
+            </a:extLst>
+          </p:cNvPr>
+          <p:cNvSpPr/>
+          <p:nvPr/>
+        </p:nvSpPr>
+        <p:spPr>
+          <a:xfrm>
+            <a:off x="3308814" y="1319022"/>
+            <a:ext cx="1389927" cy="462504"/>
+          </a:xfrm>
+          <a:prstGeom prst="rect">
+            <a:avLst/>
+          </a:prstGeom>
+          <a:solidFill>
+            <a:schemeClr val="bg1"/>
+          </a:solidFill>
+          <a:ln>
+            <a:solidFill>
+              <a:schemeClr val="tx1"/>
+            </a:solidFill>
+          </a:ln>
+        </p:spPr>
+        <p:style>
+          <a:lnRef idx="2">
+            <a:schemeClr val="dk1">
+              <a:shade val="50000"/>
+            </a:schemeClr>
+          </a:lnRef>
+          <a:fillRef idx="1">
+            <a:schemeClr val="dk1"/>
+          </a:fillRef>
+          <a:effectRef idx="0">
+            <a:schemeClr val="dk1"/>
+          </a:effectRef>
+          <a:fontRef idx="minor">
+            <a:schemeClr val="lt1"/>
+          </a:fontRef>
+        </p:style>
+        <p:txBody>
+          <a:bodyPr rtlCol="0" anchor="ctr"/>
+          <a:lstStyle/>
+          <a:p>
+            <a:pPr algn="ctr"/>
+            <a:r>
+              <a:rPr kumimoji="1" lang="en-US" altLang="ja-JP" dirty="0">
+                <a:solidFill>
+                  <a:schemeClr val="tx1"/>
+                </a:solidFill>
+              </a:rPr>
+              <a:t>MIDI </a:t>
+            </a:r>
+            <a:r>
+              <a:rPr kumimoji="1" lang="en-US" altLang="ja-JP" b="1" dirty="0">
+                <a:solidFill>
+                  <a:srgbClr val="FF0000"/>
+                </a:solidFill>
+              </a:rPr>
+              <a:t>OUT</a:t>
+            </a:r>
+            <a:endParaRPr kumimoji="1" lang="ja-JP" altLang="en-US" b="1" dirty="0">
+              <a:solidFill>
+                <a:srgbClr val="FF0000"/>
+              </a:solidFill>
+            </a:endParaRPr>
+          </a:p>
+        </p:txBody>
+      </p:sp>
+      <p:sp>
+        <p:nvSpPr>
+          <p:cNvPr id="6" name="正方形/長方形 5">
+            <a:extLst>
+              <a:ext uri="{FF2B5EF4-FFF2-40B4-BE49-F238E27FC236}">
+                <a16:creationId xmlns:a16="http://schemas.microsoft.com/office/drawing/2014/main" id="{103E7ABB-86D3-60E5-6737-DABE64514FB2}"/>
+              </a:ext>
+            </a:extLst>
+          </p:cNvPr>
+          <p:cNvSpPr/>
+          <p:nvPr/>
+        </p:nvSpPr>
+        <p:spPr>
+          <a:xfrm>
+            <a:off x="3308814" y="3643131"/>
+            <a:ext cx="1389927" cy="462504"/>
+          </a:xfrm>
+          <a:prstGeom prst="rect">
+            <a:avLst/>
+          </a:prstGeom>
+          <a:solidFill>
+            <a:schemeClr val="bg1"/>
+          </a:solidFill>
+          <a:ln>
+            <a:solidFill>
+              <a:schemeClr val="tx1"/>
+            </a:solidFill>
+          </a:ln>
+        </p:spPr>
+        <p:style>
+          <a:lnRef idx="2">
+            <a:schemeClr val="dk1">
+              <a:shade val="50000"/>
+            </a:schemeClr>
+          </a:lnRef>
+          <a:fillRef idx="1">
+            <a:schemeClr val="dk1"/>
+          </a:fillRef>
+          <a:effectRef idx="0">
+            <a:schemeClr val="dk1"/>
+          </a:effectRef>
+          <a:fontRef idx="minor">
+            <a:schemeClr val="lt1"/>
+          </a:fontRef>
+        </p:style>
+        <p:txBody>
+          <a:bodyPr rtlCol="0" anchor="ctr"/>
+          <a:lstStyle/>
+          <a:p>
+            <a:pPr algn="ctr"/>
+            <a:r>
+              <a:rPr kumimoji="1" lang="en-US" altLang="ja-JP" dirty="0">
+                <a:solidFill>
+                  <a:schemeClr val="tx1"/>
+                </a:solidFill>
+              </a:rPr>
+              <a:t>MIDI </a:t>
+            </a:r>
+            <a:r>
+              <a:rPr kumimoji="1" lang="en-US" altLang="ja-JP" b="1" dirty="0">
+                <a:solidFill>
+                  <a:schemeClr val="accent5"/>
+                </a:solidFill>
+              </a:rPr>
+              <a:t>IN</a:t>
+            </a:r>
+            <a:endParaRPr kumimoji="1" lang="ja-JP" altLang="en-US" b="1" dirty="0">
+              <a:solidFill>
+                <a:schemeClr val="accent5"/>
+              </a:solidFill>
+            </a:endParaRPr>
+          </a:p>
+        </p:txBody>
+      </p:sp>
+      <p:sp>
+        <p:nvSpPr>
+          <p:cNvPr id="7" name="矢印: 折線 6">
+            <a:extLst>
+              <a:ext uri="{FF2B5EF4-FFF2-40B4-BE49-F238E27FC236}">
+                <a16:creationId xmlns:a16="http://schemas.microsoft.com/office/drawing/2014/main" id="{07CE11A7-A55D-26C1-37BF-A67E4941C41F}"/>
+              </a:ext>
+            </a:extLst>
+          </p:cNvPr>
+          <p:cNvSpPr/>
+          <p:nvPr/>
+        </p:nvSpPr>
+        <p:spPr>
+          <a:xfrm rot="5400000">
+            <a:off x="5688426" y="504124"/>
+            <a:ext cx="462506" cy="2441875"/>
+          </a:xfrm>
+          <a:prstGeom prst="bentArrow">
+            <a:avLst/>
+          </a:prstGeom>
+          <a:solidFill>
+            <a:srgbClr val="FF0000"/>
+          </a:solidFill>
+          <a:ln>
+            <a:noFill/>
+          </a:ln>
+        </p:spPr>
+        <p:style>
+          <a:lnRef idx="2">
+            <a:schemeClr val="dk1">
+              <a:shade val="50000"/>
+            </a:schemeClr>
+          </a:lnRef>
+          <a:fillRef idx="1">
+            <a:schemeClr val="dk1"/>
+          </a:fillRef>
+          <a:effectRef idx="0">
+            <a:schemeClr val="dk1"/>
+          </a:effectRef>
+          <a:fontRef idx="minor">
+            <a:schemeClr val="lt1"/>
+          </a:fontRef>
+        </p:style>
+        <p:txBody>
+          <a:bodyPr wrap="none" rtlCol="0" anchor="ctr"/>
+          <a:lstStyle/>
+          <a:p>
+            <a:pPr algn="ctr"/>
+            <a:endParaRPr kumimoji="1" lang="ja-JP" altLang="en-US" dirty="0">
+              <a:solidFill>
+                <a:sysClr val="windowText" lastClr="000000"/>
+              </a:solidFill>
+              <a:latin typeface="F910新コミック体" panose="02000600000000000000" pitchFamily="50" charset="-128"/>
+              <a:ea typeface="F910新コミック体" panose="02000600000000000000" pitchFamily="50" charset="-128"/>
+            </a:endParaRPr>
+          </a:p>
+        </p:txBody>
+      </p:sp>
+      <p:sp>
+        <p:nvSpPr>
+          <p:cNvPr id="8" name="矢印: 折線 7">
+            <a:extLst>
+              <a:ext uri="{FF2B5EF4-FFF2-40B4-BE49-F238E27FC236}">
+                <a16:creationId xmlns:a16="http://schemas.microsoft.com/office/drawing/2014/main" id="{754F5361-7FB3-E47F-7F63-4BD3551D27F5}"/>
+              </a:ext>
+            </a:extLst>
+          </p:cNvPr>
+          <p:cNvSpPr/>
+          <p:nvPr/>
+        </p:nvSpPr>
+        <p:spPr>
+          <a:xfrm rot="10800000">
+            <a:off x="4710895" y="3475367"/>
+            <a:ext cx="2404739" cy="529545"/>
+          </a:xfrm>
+          <a:prstGeom prst="bentArrow">
+            <a:avLst/>
+          </a:prstGeom>
+          <a:solidFill>
+            <a:schemeClr val="accent5"/>
+          </a:solidFill>
+          <a:ln>
+            <a:noFill/>
+          </a:ln>
+        </p:spPr>
+        <p:style>
+          <a:lnRef idx="2">
+            <a:schemeClr val="dk1">
+              <a:shade val="50000"/>
+            </a:schemeClr>
+          </a:lnRef>
+          <a:fillRef idx="1">
+            <a:schemeClr val="dk1"/>
+          </a:fillRef>
+          <a:effectRef idx="0">
+            <a:schemeClr val="dk1"/>
+          </a:effectRef>
+          <a:fontRef idx="minor">
+            <a:schemeClr val="lt1"/>
+          </a:fontRef>
+        </p:style>
+        <p:txBody>
+          <a:bodyPr wrap="none" rtlCol="0" anchor="ctr"/>
+          <a:lstStyle/>
+          <a:p>
+            <a:pPr algn="ctr"/>
+            <a:endParaRPr kumimoji="1" lang="ja-JP" altLang="en-US" dirty="0">
+              <a:solidFill>
+                <a:sysClr val="windowText" lastClr="000000"/>
+              </a:solidFill>
+              <a:latin typeface="F910新コミック体" panose="02000600000000000000" pitchFamily="50" charset="-128"/>
+              <a:ea typeface="F910新コミック体" panose="02000600000000000000" pitchFamily="50" charset="-128"/>
+            </a:endParaRPr>
+          </a:p>
+        </p:txBody>
+      </p:sp>
+      <p:sp>
+        <p:nvSpPr>
+          <p:cNvPr id="9" name="四角形: 角を丸くする 8">
+            <a:extLst>
+              <a:ext uri="{FF2B5EF4-FFF2-40B4-BE49-F238E27FC236}">
+                <a16:creationId xmlns:a16="http://schemas.microsoft.com/office/drawing/2014/main" id="{1F3AB68E-FF13-C537-66A5-DF84F7B4A766}"/>
+              </a:ext>
+            </a:extLst>
+          </p:cNvPr>
+          <p:cNvSpPr/>
+          <p:nvPr/>
+        </p:nvSpPr>
+        <p:spPr>
+          <a:xfrm>
+            <a:off x="5671595" y="2161832"/>
+            <a:ext cx="2487016" cy="1108018"/>
+          </a:xfrm>
+          <a:prstGeom prst="roundRect">
+            <a:avLst/>
+          </a:prstGeom>
+          <a:solidFill>
+            <a:schemeClr val="bg1">
+              <a:lumMod val="75000"/>
+            </a:schemeClr>
+          </a:solidFill>
+          <a:ln>
+            <a:solidFill>
+              <a:schemeClr val="tx1"/>
+            </a:solidFill>
+          </a:ln>
+        </p:spPr>
+        <p:style>
+          <a:lnRef idx="2">
+            <a:schemeClr val="dk1">
+              <a:shade val="50000"/>
+            </a:schemeClr>
+          </a:lnRef>
+          <a:fillRef idx="1">
+            <a:schemeClr val="dk1"/>
+          </a:fillRef>
+          <a:effectRef idx="0">
+            <a:schemeClr val="dk1"/>
+          </a:effectRef>
+          <a:fontRef idx="minor">
+            <a:schemeClr val="lt1"/>
+          </a:fontRef>
+        </p:style>
+        <p:txBody>
+          <a:bodyPr rtlCol="0" anchor="ctr"/>
+          <a:lstStyle/>
+          <a:p>
+            <a:pPr algn="ctr"/>
+            <a:r>
+              <a:rPr kumimoji="1" lang="en-US" altLang="ja-JP" sz="1400" dirty="0">
+                <a:solidFill>
+                  <a:schemeClr val="tx1"/>
+                </a:solidFill>
+              </a:rPr>
+              <a:t>[MIDI IN]</a:t>
+            </a:r>
+          </a:p>
+          <a:p>
+            <a:pPr algn="ctr"/>
+            <a:endParaRPr kumimoji="1" lang="en-US" altLang="ja-JP" sz="1200" dirty="0">
+              <a:solidFill>
+                <a:schemeClr val="tx1"/>
+              </a:solidFill>
+            </a:endParaRPr>
+          </a:p>
+          <a:p>
+            <a:pPr algn="ctr"/>
+            <a:r>
+              <a:rPr kumimoji="1" lang="en-US" altLang="ja-JP" b="1" dirty="0">
+                <a:solidFill>
+                  <a:schemeClr val="tx1"/>
+                </a:solidFill>
+              </a:rPr>
+              <a:t>MIDI Device</a:t>
+            </a:r>
+            <a:endParaRPr lang="en-US" altLang="ja-JP" b="1" dirty="0">
+              <a:solidFill>
+                <a:schemeClr val="tx1"/>
+              </a:solidFill>
+            </a:endParaRPr>
+          </a:p>
+          <a:p>
+            <a:pPr algn="ctr"/>
+            <a:endParaRPr kumimoji="1" lang="en-US" altLang="ja-JP" sz="1200" dirty="0">
+              <a:solidFill>
+                <a:schemeClr val="tx1"/>
+              </a:solidFill>
+            </a:endParaRPr>
+          </a:p>
+          <a:p>
+            <a:pPr algn="ctr"/>
+            <a:r>
+              <a:rPr kumimoji="1" lang="en-US" altLang="ja-JP" sz="1400" dirty="0">
+                <a:solidFill>
+                  <a:schemeClr val="tx1"/>
+                </a:solidFill>
+              </a:rPr>
+              <a:t>[MIDI THRU]</a:t>
+            </a:r>
+            <a:endParaRPr kumimoji="1" lang="ja-JP" altLang="en-US" sz="1400" dirty="0">
+              <a:solidFill>
+                <a:schemeClr val="tx1"/>
+              </a:solidFill>
+            </a:endParaRPr>
+          </a:p>
+        </p:txBody>
+      </p:sp>
+      <p:sp>
+        <p:nvSpPr>
+          <p:cNvPr id="10" name="正方形/長方形 9">
+            <a:extLst>
+              <a:ext uri="{FF2B5EF4-FFF2-40B4-BE49-F238E27FC236}">
+                <a16:creationId xmlns:a16="http://schemas.microsoft.com/office/drawing/2014/main" id="{C25F6D63-044A-6BDE-5E98-42E76FA8CA7C}"/>
+              </a:ext>
+            </a:extLst>
+          </p:cNvPr>
+          <p:cNvSpPr/>
+          <p:nvPr/>
+        </p:nvSpPr>
+        <p:spPr>
+          <a:xfrm>
+            <a:off x="6198243" y="1962540"/>
+            <a:ext cx="1437866" cy="462504"/>
+          </a:xfrm>
+          <a:prstGeom prst="rect">
+            <a:avLst/>
+          </a:prstGeom>
+          <a:solidFill>
+            <a:schemeClr val="bg1"/>
+          </a:solidFill>
+          <a:ln>
+            <a:solidFill>
+              <a:schemeClr val="tx1"/>
+            </a:solidFill>
+          </a:ln>
+        </p:spPr>
+        <p:style>
+          <a:lnRef idx="2">
+            <a:schemeClr val="dk1">
+              <a:shade val="50000"/>
+            </a:schemeClr>
+          </a:lnRef>
+          <a:fillRef idx="1">
+            <a:schemeClr val="dk1"/>
+          </a:fillRef>
+          <a:effectRef idx="0">
+            <a:schemeClr val="dk1"/>
+          </a:effectRef>
+          <a:fontRef idx="minor">
+            <a:schemeClr val="lt1"/>
+          </a:fontRef>
+        </p:style>
+        <p:txBody>
+          <a:bodyPr rtlCol="0" anchor="ctr"/>
+          <a:lstStyle/>
+          <a:p>
+            <a:pPr algn="ctr"/>
+            <a:r>
+              <a:rPr kumimoji="1" lang="en-US" altLang="ja-JP" dirty="0">
+                <a:solidFill>
+                  <a:schemeClr val="tx1"/>
+                </a:solidFill>
+              </a:rPr>
+              <a:t>MIDI </a:t>
+            </a:r>
+            <a:r>
+              <a:rPr kumimoji="1" lang="en-US" altLang="ja-JP" b="1" dirty="0">
+                <a:solidFill>
+                  <a:srgbClr val="FF0000"/>
+                </a:solidFill>
+              </a:rPr>
+              <a:t>IN</a:t>
+            </a:r>
+            <a:endParaRPr kumimoji="1" lang="ja-JP" altLang="en-US" b="1" dirty="0">
+              <a:solidFill>
+                <a:srgbClr val="FF0000"/>
+              </a:solidFill>
+            </a:endParaRPr>
+          </a:p>
+        </p:txBody>
+      </p:sp>
+      <p:sp>
+        <p:nvSpPr>
+          <p:cNvPr id="11" name="正方形/長方形 10">
+            <a:extLst>
+              <a:ext uri="{FF2B5EF4-FFF2-40B4-BE49-F238E27FC236}">
+                <a16:creationId xmlns:a16="http://schemas.microsoft.com/office/drawing/2014/main" id="{687A9985-4C03-504C-B848-ED708C463BE2}"/>
+              </a:ext>
+            </a:extLst>
+          </p:cNvPr>
+          <p:cNvSpPr/>
+          <p:nvPr/>
+        </p:nvSpPr>
+        <p:spPr>
+          <a:xfrm>
+            <a:off x="6198244" y="3005897"/>
+            <a:ext cx="1437866" cy="462504"/>
+          </a:xfrm>
+          <a:prstGeom prst="rect">
+            <a:avLst/>
+          </a:prstGeom>
+          <a:solidFill>
+            <a:schemeClr val="bg1"/>
+          </a:solidFill>
+          <a:ln>
+            <a:solidFill>
+              <a:schemeClr val="tx1"/>
+            </a:solidFill>
+          </a:ln>
+        </p:spPr>
+        <p:style>
+          <a:lnRef idx="2">
+            <a:schemeClr val="dk1">
+              <a:shade val="50000"/>
+            </a:schemeClr>
+          </a:lnRef>
+          <a:fillRef idx="1">
+            <a:schemeClr val="dk1"/>
+          </a:fillRef>
+          <a:effectRef idx="0">
+            <a:schemeClr val="dk1"/>
+          </a:effectRef>
+          <a:fontRef idx="minor">
+            <a:schemeClr val="lt1"/>
+          </a:fontRef>
+        </p:style>
+        <p:txBody>
+          <a:bodyPr rtlCol="0" anchor="ctr"/>
+          <a:lstStyle/>
+          <a:p>
+            <a:pPr algn="ctr"/>
+            <a:r>
+              <a:rPr kumimoji="1" lang="en-US" altLang="ja-JP" dirty="0">
+                <a:solidFill>
+                  <a:schemeClr val="tx1"/>
+                </a:solidFill>
+              </a:rPr>
+              <a:t>MIDI </a:t>
+            </a:r>
+            <a:r>
+              <a:rPr kumimoji="1" lang="en-US" altLang="ja-JP" b="1" dirty="0">
+                <a:solidFill>
+                  <a:schemeClr val="accent5"/>
+                </a:solidFill>
+              </a:rPr>
+              <a:t>THRU</a:t>
+            </a:r>
+            <a:endParaRPr kumimoji="1" lang="ja-JP" altLang="en-US" b="1" dirty="0">
+              <a:solidFill>
+                <a:schemeClr val="accent5"/>
+              </a:solidFill>
+            </a:endParaRPr>
+          </a:p>
+        </p:txBody>
+      </p:sp>
+      <p:sp>
+        <p:nvSpPr>
+          <p:cNvPr id="12" name="矢印: 環状 11">
+            <a:extLst>
+              <a:ext uri="{FF2B5EF4-FFF2-40B4-BE49-F238E27FC236}">
+                <a16:creationId xmlns:a16="http://schemas.microsoft.com/office/drawing/2014/main" id="{42C03E87-54DC-5651-DBE3-5B61C3FB040A}"/>
+              </a:ext>
+            </a:extLst>
+          </p:cNvPr>
+          <p:cNvSpPr/>
+          <p:nvPr/>
+        </p:nvSpPr>
+        <p:spPr>
+          <a:xfrm rot="5400000">
+            <a:off x="3541853" y="-1348450"/>
+            <a:ext cx="4218972" cy="8154364"/>
+          </a:xfrm>
+          <a:prstGeom prst="circularArrow">
+            <a:avLst>
+              <a:gd name="adj1" fmla="val 2340"/>
+              <a:gd name="adj2" fmla="val 356038"/>
+              <a:gd name="adj3" fmla="val 1203598"/>
+              <a:gd name="adj4" fmla="val 10853601"/>
+              <a:gd name="adj5" fmla="val 3675"/>
+            </a:avLst>
+          </a:prstGeom>
+          <a:gradFill flip="none" rotWithShape="1">
+            <a:gsLst>
+              <a:gs pos="0">
+                <a:schemeClr val="bg2">
+                  <a:lumMod val="75000"/>
+                  <a:shade val="30000"/>
+                  <a:satMod val="115000"/>
+                </a:schemeClr>
+              </a:gs>
+              <a:gs pos="50000">
+                <a:schemeClr val="bg2">
+                  <a:lumMod val="75000"/>
+                  <a:shade val="67500"/>
+                  <a:satMod val="115000"/>
+                </a:schemeClr>
+              </a:gs>
+              <a:gs pos="100000">
+                <a:schemeClr val="bg2">
+                  <a:lumMod val="75000"/>
+                  <a:shade val="100000"/>
+                  <a:satMod val="115000"/>
+                </a:schemeClr>
+              </a:gs>
+            </a:gsLst>
+            <a:lin ang="10800000" scaled="1"/>
+            <a:tileRect/>
+          </a:gradFill>
+          <a:ln>
+            <a:noFill/>
+          </a:ln>
+        </p:spPr>
+        <p:style>
+          <a:lnRef idx="2">
+            <a:schemeClr val="dk1">
+              <a:shade val="50000"/>
+            </a:schemeClr>
+          </a:lnRef>
+          <a:fillRef idx="1">
+            <a:schemeClr val="dk1"/>
+          </a:fillRef>
+          <a:effectRef idx="0">
+            <a:schemeClr val="dk1"/>
+          </a:effectRef>
+          <a:fontRef idx="minor">
+            <a:schemeClr val="lt1"/>
+          </a:fontRef>
+        </p:style>
+        <p:txBody>
+          <a:bodyPr wrap="none" rtlCol="0" anchor="ctr"/>
+          <a:lstStyle/>
+          <a:p>
+            <a:pPr algn="ctr"/>
+            <a:endParaRPr kumimoji="1" lang="ja-JP" altLang="en-US" dirty="0">
+              <a:solidFill>
+                <a:sysClr val="windowText" lastClr="000000"/>
+              </a:solidFill>
+              <a:latin typeface="F910新コミック体" panose="02000600000000000000" pitchFamily="50" charset="-128"/>
+              <a:ea typeface="F910新コミック体" panose="02000600000000000000" pitchFamily="50" charset="-128"/>
+            </a:endParaRPr>
+          </a:p>
+        </p:txBody>
+      </p:sp>
+      <p:pic>
+        <p:nvPicPr>
+          <p:cNvPr id="13" name="グラフィックス 12" descr="ストップウォッチ">
+            <a:extLst>
+              <a:ext uri="{FF2B5EF4-FFF2-40B4-BE49-F238E27FC236}">
+                <a16:creationId xmlns:a16="http://schemas.microsoft.com/office/drawing/2014/main" id="{BF8F6CB8-AB55-C500-9121-7B94D33EE6AB}"/>
+              </a:ext>
+            </a:extLst>
+          </p:cNvPr>
+          <p:cNvPicPr>
+            <a:picLocks noChangeAspect="1"/>
+          </p:cNvPicPr>
+          <p:nvPr/>
+        </p:nvPicPr>
+        <p:blipFill>
+          <a:blip r:embed="rId2">
+            <a:extLst>
+              <a:ext uri="{28A0092B-C50C-407E-A947-70E740481C1C}">
+                <a14:useLocalDpi xmlns:a14="http://schemas.microsoft.com/office/drawing/2010/main" val="0"/>
+              </a:ext>
+              <a:ext uri="{96DAC541-7B7A-43D3-8B79-37D633B846F1}">
+                <asvg:svgBlip xmlns:asvg="http://schemas.microsoft.com/office/drawing/2016/SVG/main" r:embed="rId3"/>
+              </a:ext>
+            </a:extLst>
+          </a:blip>
+          <a:stretch>
+            <a:fillRect/>
+          </a:stretch>
+        </p:blipFill>
+        <p:spPr>
+          <a:xfrm>
+            <a:off x="4710894" y="124900"/>
+            <a:ext cx="1194122" cy="1194122"/>
+          </a:xfrm>
+          <a:prstGeom prst="rect">
+            <a:avLst/>
+          </a:prstGeom>
+        </p:spPr>
+      </p:pic>
+      <p:sp>
+        <p:nvSpPr>
+          <p:cNvPr id="14" name="正方形/長方形 13">
+            <a:extLst>
+              <a:ext uri="{FF2B5EF4-FFF2-40B4-BE49-F238E27FC236}">
+                <a16:creationId xmlns:a16="http://schemas.microsoft.com/office/drawing/2014/main" id="{054EB5ED-FDE4-5031-1480-6B13A263ACBD}"/>
+              </a:ext>
+            </a:extLst>
+          </p:cNvPr>
+          <p:cNvSpPr/>
+          <p:nvPr/>
+        </p:nvSpPr>
+        <p:spPr>
+          <a:xfrm>
+            <a:off x="914401" y="86810"/>
+            <a:ext cx="9178724" cy="5822066"/>
+          </a:xfrm>
+          <a:prstGeom prst="rect">
+            <a:avLst/>
+          </a:prstGeom>
+          <a:noFill/>
+          <a:ln>
+            <a:solidFill>
+              <a:schemeClr val="tx1"/>
+            </a:solidFill>
+          </a:ln>
+        </p:spPr>
+        <p:style>
+          <a:lnRef idx="2">
+            <a:schemeClr val="dk1">
+              <a:shade val="50000"/>
+            </a:schemeClr>
+          </a:lnRef>
+          <a:fillRef idx="1">
+            <a:schemeClr val="dk1"/>
+          </a:fillRef>
+          <a:effectRef idx="0">
+            <a:schemeClr val="dk1"/>
+          </a:effectRef>
+          <a:fontRef idx="minor">
+            <a:schemeClr val="lt1"/>
+          </a:fontRef>
+        </p:style>
+        <p:txBody>
+          <a:bodyPr wrap="none" rtlCol="0" anchor="ctr"/>
+          <a:lstStyle/>
+          <a:p>
+            <a:pPr algn="ctr"/>
+            <a:endParaRPr kumimoji="1" lang="ja-JP" altLang="en-US" dirty="0">
+              <a:solidFill>
+                <a:sysClr val="windowText" lastClr="000000"/>
+              </a:solidFill>
+              <a:latin typeface="F910新コミック体" panose="02000600000000000000" pitchFamily="50" charset="-128"/>
+              <a:ea typeface="F910新コミック体" panose="02000600000000000000" pitchFamily="50" charset="-128"/>
+            </a:endParaRPr>
+          </a:p>
+        </p:txBody>
+      </p:sp>
+      <p:sp>
+        <p:nvSpPr>
+          <p:cNvPr id="15" name="正方形/長方形 14">
+            <a:extLst>
+              <a:ext uri="{FF2B5EF4-FFF2-40B4-BE49-F238E27FC236}">
+                <a16:creationId xmlns:a16="http://schemas.microsoft.com/office/drawing/2014/main" id="{EABA604B-785E-ADDF-E463-B1BAF2A77562}"/>
+              </a:ext>
+            </a:extLst>
+          </p:cNvPr>
+          <p:cNvSpPr/>
+          <p:nvPr/>
+        </p:nvSpPr>
+        <p:spPr>
+          <a:xfrm>
+            <a:off x="3009418" y="5391150"/>
+            <a:ext cx="5208606" cy="462504"/>
+          </a:xfrm>
+          <a:prstGeom prst="rect">
+            <a:avLst/>
+          </a:prstGeom>
+          <a:solidFill>
+            <a:schemeClr val="bg1"/>
+          </a:solidFill>
+          <a:ln>
+            <a:noFill/>
+          </a:ln>
+        </p:spPr>
+        <p:style>
+          <a:lnRef idx="2">
+            <a:schemeClr val="dk1">
+              <a:shade val="50000"/>
+            </a:schemeClr>
+          </a:lnRef>
+          <a:fillRef idx="1">
+            <a:schemeClr val="dk1"/>
+          </a:fillRef>
+          <a:effectRef idx="0">
+            <a:schemeClr val="dk1"/>
+          </a:effectRef>
+          <a:fontRef idx="minor">
+            <a:schemeClr val="lt1"/>
+          </a:fontRef>
+        </p:style>
+        <p:txBody>
+          <a:bodyPr rtlCol="0" anchor="ctr"/>
+          <a:lstStyle/>
+          <a:p>
+            <a:pPr algn="ctr"/>
+            <a:r>
+              <a:rPr kumimoji="1" lang="en-US" altLang="ja-JP" sz="3200" dirty="0">
+                <a:solidFill>
+                  <a:schemeClr val="tx1"/>
+                </a:solidFill>
+              </a:rPr>
+              <a:t>Connection diagram</a:t>
+            </a:r>
+            <a:endParaRPr kumimoji="1" lang="ja-JP" altLang="en-US" sz="3200" dirty="0">
+              <a:solidFill>
+                <a:schemeClr val="tx1"/>
+              </a:solidFill>
+            </a:endParaRPr>
+          </a:p>
+        </p:txBody>
+      </p:sp>
+    </p:spTree>
+    <p:extLst>
+      <p:ext uri="{BB962C8B-B14F-4D97-AF65-F5344CB8AC3E}">
+        <p14:creationId xmlns:p14="http://schemas.microsoft.com/office/powerpoint/2010/main" val="3858397556"/>
+      </p:ext>
+    </p:extLst>
+  </p:cSld>
+  <p:clrMapOvr>
+    <a:masterClrMapping/>
+  </p:clrMapOvr>
+</p:sld>
+</file>
+
 <file path=ppt/slides/slide2.xml><?xml version="1.0" encoding="utf-8"?>
 <p:sld xmlns:a="http://schemas.openxmlformats.org/drawingml/2006/main" xmlns:r="http://schemas.openxmlformats.org/officeDocument/2006/relationships" xmlns:p="http://schemas.openxmlformats.org/presentationml/2006/main">
   <p:cSld>

</xml_diff>

<commit_message>
4.9.0.0 Added MIDI THRU instrument.
</commit_message>
<xml_diff>
--- a/src/mamidimemo/Data/Images.pptx
+++ b/src/mamidimemo/Data/Images.pptx
@@ -5,7 +5,7 @@
     <p:sldMasterId id="2147483648" r:id="rId1"/>
   </p:sldMasterIdLst>
   <p:notesMasterIdLst>
-    <p:notesMasterId r:id="rId19"/>
+    <p:notesMasterId r:id="rId20"/>
   </p:notesMasterIdLst>
   <p:sldIdLst>
     <p:sldId id="256" r:id="rId2"/>
@@ -25,6 +25,7 @@
     <p:sldId id="270" r:id="rId16"/>
     <p:sldId id="271" r:id="rId17"/>
     <p:sldId id="272" r:id="rId18"/>
+    <p:sldId id="273" r:id="rId19"/>
   </p:sldIdLst>
   <p:sldSz cx="12192000" cy="6858000"/>
   <p:notesSz cx="6858000" cy="9144000"/>
@@ -213,7 +214,7 @@
           <a:p>
             <a:fld id="{FD0ADE19-EE5F-4EAE-BCEC-0B5F9244BB48}" type="datetimeFigureOut">
               <a:rPr kumimoji="1" lang="ja-JP" altLang="en-US" smtClean="0"/>
-              <a:t>2022/10/31</a:t>
+              <a:t>2023/7/26</a:t>
             </a:fld>
             <a:endParaRPr kumimoji="1" lang="ja-JP" altLang="en-US"/>
           </a:p>
@@ -743,7 +744,7 @@
           <a:p>
             <a:fld id="{B7E48A73-9369-4B88-BBE6-B1D33CBD5F01}" type="datetimeFigureOut">
               <a:rPr kumimoji="1" lang="ja-JP" altLang="en-US" smtClean="0"/>
-              <a:t>2022/10/31</a:t>
+              <a:t>2023/7/26</a:t>
             </a:fld>
             <a:endParaRPr kumimoji="1" lang="ja-JP" altLang="en-US"/>
           </a:p>
@@ -973,7 +974,7 @@
           <a:p>
             <a:fld id="{B7E48A73-9369-4B88-BBE6-B1D33CBD5F01}" type="datetimeFigureOut">
               <a:rPr kumimoji="1" lang="ja-JP" altLang="en-US" smtClean="0"/>
-              <a:t>2022/10/31</a:t>
+              <a:t>2023/7/26</a:t>
             </a:fld>
             <a:endParaRPr kumimoji="1" lang="ja-JP" altLang="en-US"/>
           </a:p>
@@ -1213,7 +1214,7 @@
           <a:p>
             <a:fld id="{B7E48A73-9369-4B88-BBE6-B1D33CBD5F01}" type="datetimeFigureOut">
               <a:rPr kumimoji="1" lang="ja-JP" altLang="en-US" smtClean="0"/>
-              <a:t>2022/10/31</a:t>
+              <a:t>2023/7/26</a:t>
             </a:fld>
             <a:endParaRPr kumimoji="1" lang="ja-JP" altLang="en-US"/>
           </a:p>
@@ -1443,7 +1444,7 @@
           <a:p>
             <a:fld id="{B7E48A73-9369-4B88-BBE6-B1D33CBD5F01}" type="datetimeFigureOut">
               <a:rPr kumimoji="1" lang="ja-JP" altLang="en-US" smtClean="0"/>
-              <a:t>2022/10/31</a:t>
+              <a:t>2023/7/26</a:t>
             </a:fld>
             <a:endParaRPr kumimoji="1" lang="ja-JP" altLang="en-US"/>
           </a:p>
@@ -1718,7 +1719,7 @@
           <a:p>
             <a:fld id="{B7E48A73-9369-4B88-BBE6-B1D33CBD5F01}" type="datetimeFigureOut">
               <a:rPr kumimoji="1" lang="ja-JP" altLang="en-US" smtClean="0"/>
-              <a:t>2022/10/31</a:t>
+              <a:t>2023/7/26</a:t>
             </a:fld>
             <a:endParaRPr kumimoji="1" lang="ja-JP" altLang="en-US"/>
           </a:p>
@@ -2047,7 +2048,7 @@
           <a:p>
             <a:fld id="{B7E48A73-9369-4B88-BBE6-B1D33CBD5F01}" type="datetimeFigureOut">
               <a:rPr kumimoji="1" lang="ja-JP" altLang="en-US" smtClean="0"/>
-              <a:t>2022/10/31</a:t>
+              <a:t>2023/7/26</a:t>
             </a:fld>
             <a:endParaRPr kumimoji="1" lang="ja-JP" altLang="en-US"/>
           </a:p>
@@ -2523,7 +2524,7 @@
           <a:p>
             <a:fld id="{B7E48A73-9369-4B88-BBE6-B1D33CBD5F01}" type="datetimeFigureOut">
               <a:rPr kumimoji="1" lang="ja-JP" altLang="en-US" smtClean="0"/>
-              <a:t>2022/10/31</a:t>
+              <a:t>2023/7/26</a:t>
             </a:fld>
             <a:endParaRPr kumimoji="1" lang="ja-JP" altLang="en-US"/>
           </a:p>
@@ -2664,7 +2665,7 @@
           <a:p>
             <a:fld id="{B7E48A73-9369-4B88-BBE6-B1D33CBD5F01}" type="datetimeFigureOut">
               <a:rPr kumimoji="1" lang="ja-JP" altLang="en-US" smtClean="0"/>
-              <a:t>2022/10/31</a:t>
+              <a:t>2023/7/26</a:t>
             </a:fld>
             <a:endParaRPr kumimoji="1" lang="ja-JP" altLang="en-US"/>
           </a:p>
@@ -2777,7 +2778,7 @@
           <a:p>
             <a:fld id="{B7E48A73-9369-4B88-BBE6-B1D33CBD5F01}" type="datetimeFigureOut">
               <a:rPr kumimoji="1" lang="ja-JP" altLang="en-US" smtClean="0"/>
-              <a:t>2022/10/31</a:t>
+              <a:t>2023/7/26</a:t>
             </a:fld>
             <a:endParaRPr kumimoji="1" lang="ja-JP" altLang="en-US"/>
           </a:p>
@@ -3120,7 +3121,7 @@
           <a:p>
             <a:fld id="{B7E48A73-9369-4B88-BBE6-B1D33CBD5F01}" type="datetimeFigureOut">
               <a:rPr kumimoji="1" lang="ja-JP" altLang="en-US" smtClean="0"/>
-              <a:t>2022/10/31</a:t>
+              <a:t>2023/7/26</a:t>
             </a:fld>
             <a:endParaRPr kumimoji="1" lang="ja-JP" altLang="en-US"/>
           </a:p>
@@ -3408,7 +3409,7 @@
           <a:p>
             <a:fld id="{B7E48A73-9369-4B88-BBE6-B1D33CBD5F01}" type="datetimeFigureOut">
               <a:rPr kumimoji="1" lang="ja-JP" altLang="en-US" smtClean="0"/>
-              <a:t>2022/10/31</a:t>
+              <a:t>2023/7/26</a:t>
             </a:fld>
             <a:endParaRPr kumimoji="1" lang="ja-JP" altLang="en-US"/>
           </a:p>
@@ -3681,7 +3682,7 @@
           <a:p>
             <a:fld id="{B7E48A73-9369-4B88-BBE6-B1D33CBD5F01}" type="datetimeFigureOut">
               <a:rPr kumimoji="1" lang="ja-JP" altLang="en-US" smtClean="0"/>
-              <a:t>2022/10/31</a:t>
+              <a:t>2023/7/26</a:t>
             </a:fld>
             <a:endParaRPr kumimoji="1" lang="ja-JP" altLang="en-US"/>
           </a:p>
@@ -33704,6 +33705,1549 @@
 </p:sld>
 </file>
 
+<file path=ppt/slides/slide18.xml><?xml version="1.0" encoding="utf-8"?>
+<p:sld xmlns:a="http://schemas.openxmlformats.org/drawingml/2006/main" xmlns:r="http://schemas.openxmlformats.org/officeDocument/2006/relationships" xmlns:p="http://schemas.openxmlformats.org/presentationml/2006/main">
+  <p:cSld>
+    <p:spTree>
+      <p:nvGrpSpPr>
+        <p:cNvPr id="1" name=""/>
+        <p:cNvGrpSpPr/>
+        <p:nvPr/>
+      </p:nvGrpSpPr>
+      <p:grpSpPr>
+        <a:xfrm>
+          <a:off x="0" y="0"/>
+          <a:ext cx="0" cy="0"/>
+          <a:chOff x="0" y="0"/>
+          <a:chExt cx="0" cy="0"/>
+        </a:xfrm>
+      </p:grpSpPr>
+      <p:sp>
+        <p:nvSpPr>
+          <p:cNvPr id="4" name="正方形/長方形 3">
+            <a:extLst>
+              <a:ext uri="{FF2B5EF4-FFF2-40B4-BE49-F238E27FC236}">
+                <a16:creationId xmlns:a16="http://schemas.microsoft.com/office/drawing/2014/main" id="{86A6675F-3190-699F-28AE-AE16B73FF6DF}"/>
+              </a:ext>
+            </a:extLst>
+          </p:cNvPr>
+          <p:cNvSpPr/>
+          <p:nvPr/>
+        </p:nvSpPr>
+        <p:spPr>
+          <a:xfrm>
+            <a:off x="1394012" y="2475087"/>
+            <a:ext cx="2086423" cy="895350"/>
+          </a:xfrm>
+          <a:prstGeom prst="rect">
+            <a:avLst/>
+          </a:prstGeom>
+          <a:solidFill>
+            <a:srgbClr val="050504"/>
+          </a:solidFill>
+          <a:ln>
+            <a:noFill/>
+          </a:ln>
+        </p:spPr>
+        <p:style>
+          <a:lnRef idx="2">
+            <a:schemeClr val="accent1">
+              <a:shade val="50000"/>
+            </a:schemeClr>
+          </a:lnRef>
+          <a:fillRef idx="1">
+            <a:schemeClr val="accent1"/>
+          </a:fillRef>
+          <a:effectRef idx="0">
+            <a:schemeClr val="accent1"/>
+          </a:effectRef>
+          <a:fontRef idx="minor">
+            <a:schemeClr val="lt1"/>
+          </a:fontRef>
+        </p:style>
+        <p:txBody>
+          <a:bodyPr rtlCol="0" anchor="ctr"/>
+          <a:lstStyle/>
+          <a:p>
+            <a:pPr algn="ctr"/>
+            <a:endParaRPr kumimoji="1" lang="ja-JP" altLang="en-US"/>
+          </a:p>
+        </p:txBody>
+      </p:sp>
+      <p:pic>
+        <p:nvPicPr>
+          <p:cNvPr id="8" name="グラフィックス 7">
+            <a:extLst>
+              <a:ext uri="{FF2B5EF4-FFF2-40B4-BE49-F238E27FC236}">
+                <a16:creationId xmlns:a16="http://schemas.microsoft.com/office/drawing/2014/main" id="{34F6E1BC-C4A7-A69C-9F4A-5399483A629B}"/>
+              </a:ext>
+            </a:extLst>
+          </p:cNvPr>
+          <p:cNvPicPr>
+            <a:picLocks noChangeAspect="1"/>
+          </p:cNvPicPr>
+          <p:nvPr/>
+        </p:nvPicPr>
+        <p:blipFill>
+          <a:blip r:embed="rId2">
+            <a:extLst>
+              <a:ext uri="{28A0092B-C50C-407E-A947-70E740481C1C}">
+                <a14:useLocalDpi xmlns:a14="http://schemas.microsoft.com/office/drawing/2010/main" val="0"/>
+              </a:ext>
+              <a:ext uri="{96DAC541-7B7A-43D3-8B79-37D633B846F1}">
+                <asvg:svgBlip xmlns:asvg="http://schemas.microsoft.com/office/drawing/2016/SVG/main" r:embed="rId3"/>
+              </a:ext>
+            </a:extLst>
+          </a:blip>
+          <a:stretch>
+            <a:fillRect/>
+          </a:stretch>
+        </p:blipFill>
+        <p:spPr>
+          <a:xfrm>
+            <a:off x="1313646" y="2411330"/>
+            <a:ext cx="1349348" cy="613953"/>
+          </a:xfrm>
+          <a:prstGeom prst="rect">
+            <a:avLst/>
+          </a:prstGeom>
+        </p:spPr>
+      </p:pic>
+      <p:sp>
+        <p:nvSpPr>
+          <p:cNvPr id="26" name="フリーフォーム: 図形 25">
+            <a:extLst>
+              <a:ext uri="{FF2B5EF4-FFF2-40B4-BE49-F238E27FC236}">
+                <a16:creationId xmlns:a16="http://schemas.microsoft.com/office/drawing/2014/main" id="{4F161C8E-6456-0345-F57E-ABD3C40FF9DE}"/>
+              </a:ext>
+            </a:extLst>
+          </p:cNvPr>
+          <p:cNvSpPr/>
+          <p:nvPr/>
+        </p:nvSpPr>
+        <p:spPr>
+          <a:xfrm>
+            <a:off x="2664403" y="3590035"/>
+            <a:ext cx="302253" cy="358926"/>
+          </a:xfrm>
+          <a:custGeom>
+            <a:avLst/>
+            <a:gdLst>
+              <a:gd name="connsiteX0" fmla="*/ 0 w 302253"/>
+              <a:gd name="connsiteY0" fmla="*/ 0 h 358926"/>
+              <a:gd name="connsiteX1" fmla="*/ 260424 w 302253"/>
+              <a:gd name="connsiteY1" fmla="*/ 0 h 358926"/>
+              <a:gd name="connsiteX2" fmla="*/ 302254 w 302253"/>
+              <a:gd name="connsiteY2" fmla="*/ 49926 h 358926"/>
+              <a:gd name="connsiteX3" fmla="*/ 302254 w 302253"/>
+              <a:gd name="connsiteY3" fmla="*/ 314398 h 358926"/>
+              <a:gd name="connsiteX4" fmla="*/ 257725 w 302253"/>
+              <a:gd name="connsiteY4" fmla="*/ 358926 h 358926"/>
+              <a:gd name="connsiteX5" fmla="*/ 0 w 302253"/>
+              <a:gd name="connsiteY5" fmla="*/ 358926 h 358926"/>
+              <a:gd name="connsiteX6" fmla="*/ 0 w 302253"/>
+              <a:gd name="connsiteY6" fmla="*/ 130887 h 358926"/>
+              <a:gd name="connsiteX7" fmla="*/ 89057 w 302253"/>
+              <a:gd name="connsiteY7" fmla="*/ 130887 h 358926"/>
+              <a:gd name="connsiteX8" fmla="*/ 89057 w 302253"/>
+              <a:gd name="connsiteY8" fmla="*/ 271219 h 358926"/>
+              <a:gd name="connsiteX9" fmla="*/ 214546 w 302253"/>
+              <a:gd name="connsiteY9" fmla="*/ 271219 h 358926"/>
+              <a:gd name="connsiteX10" fmla="*/ 214546 w 302253"/>
+              <a:gd name="connsiteY10" fmla="*/ 80961 h 358926"/>
+              <a:gd name="connsiteX11" fmla="*/ 0 w 302253"/>
+              <a:gd name="connsiteY11" fmla="*/ 80961 h 358926"/>
+              <a:gd name="connsiteX12" fmla="*/ 0 w 302253"/>
+              <a:gd name="connsiteY12" fmla="*/ 0 h 358926"/>
+            </a:gdLst>
+            <a:ahLst/>
+            <a:cxnLst>
+              <a:cxn ang="0">
+                <a:pos x="connsiteX0" y="connsiteY0"/>
+              </a:cxn>
+              <a:cxn ang="0">
+                <a:pos x="connsiteX1" y="connsiteY1"/>
+              </a:cxn>
+              <a:cxn ang="0">
+                <a:pos x="connsiteX2" y="connsiteY2"/>
+              </a:cxn>
+              <a:cxn ang="0">
+                <a:pos x="connsiteX3" y="connsiteY3"/>
+              </a:cxn>
+              <a:cxn ang="0">
+                <a:pos x="connsiteX4" y="connsiteY4"/>
+              </a:cxn>
+              <a:cxn ang="0">
+                <a:pos x="connsiteX5" y="connsiteY5"/>
+              </a:cxn>
+              <a:cxn ang="0">
+                <a:pos x="connsiteX6" y="connsiteY6"/>
+              </a:cxn>
+              <a:cxn ang="0">
+                <a:pos x="connsiteX7" y="connsiteY7"/>
+              </a:cxn>
+              <a:cxn ang="0">
+                <a:pos x="connsiteX8" y="connsiteY8"/>
+              </a:cxn>
+              <a:cxn ang="0">
+                <a:pos x="connsiteX9" y="connsiteY9"/>
+              </a:cxn>
+              <a:cxn ang="0">
+                <a:pos x="connsiteX10" y="connsiteY10"/>
+              </a:cxn>
+              <a:cxn ang="0">
+                <a:pos x="connsiteX11" y="connsiteY11"/>
+              </a:cxn>
+              <a:cxn ang="0">
+                <a:pos x="connsiteX12" y="connsiteY12"/>
+              </a:cxn>
+            </a:cxnLst>
+            <a:rect l="l" t="t" r="r" b="b"/>
+            <a:pathLst>
+              <a:path w="302253" h="358926">
+                <a:moveTo>
+                  <a:pt x="0" y="0"/>
+                </a:moveTo>
+                <a:lnTo>
+                  <a:pt x="260424" y="0"/>
+                </a:lnTo>
+                <a:cubicBezTo>
+                  <a:pt x="286871" y="0"/>
+                  <a:pt x="302254" y="22804"/>
+                  <a:pt x="302254" y="49926"/>
+                </a:cubicBezTo>
+                <a:lnTo>
+                  <a:pt x="302254" y="314398"/>
+                </a:lnTo>
+                <a:cubicBezTo>
+                  <a:pt x="302254" y="347997"/>
+                  <a:pt x="288221" y="358926"/>
+                  <a:pt x="257725" y="358926"/>
+                </a:cubicBezTo>
+                <a:lnTo>
+                  <a:pt x="0" y="358926"/>
+                </a:lnTo>
+                <a:lnTo>
+                  <a:pt x="0" y="130887"/>
+                </a:lnTo>
+                <a:lnTo>
+                  <a:pt x="89057" y="130887"/>
+                </a:lnTo>
+                <a:lnTo>
+                  <a:pt x="89057" y="271219"/>
+                </a:lnTo>
+                <a:lnTo>
+                  <a:pt x="214546" y="271219"/>
+                </a:lnTo>
+                <a:lnTo>
+                  <a:pt x="214546" y="80961"/>
+                </a:lnTo>
+                <a:lnTo>
+                  <a:pt x="0" y="80961"/>
+                </a:lnTo>
+                <a:lnTo>
+                  <a:pt x="0" y="0"/>
+                </a:lnTo>
+                <a:close/>
+              </a:path>
+            </a:pathLst>
+          </a:custGeom>
+          <a:solidFill>
+            <a:schemeClr val="bg1"/>
+          </a:solidFill>
+          <a:ln w="1343" cap="flat">
+            <a:noFill/>
+            <a:prstDash val="solid"/>
+            <a:miter/>
+          </a:ln>
+        </p:spPr>
+        <p:txBody>
+          <a:bodyPr rtlCol="0" anchor="ctr"/>
+          <a:lstStyle/>
+          <a:p>
+            <a:endParaRPr lang="ja-JP" altLang="en-US"/>
+          </a:p>
+        </p:txBody>
+      </p:sp>
+      <p:grpSp>
+        <p:nvGrpSpPr>
+          <p:cNvPr id="85" name="グループ化 84">
+            <a:extLst>
+              <a:ext uri="{FF2B5EF4-FFF2-40B4-BE49-F238E27FC236}">
+                <a16:creationId xmlns:a16="http://schemas.microsoft.com/office/drawing/2014/main" id="{FEA1602E-5FAB-A10F-75A7-9B627554EA6D}"/>
+              </a:ext>
+            </a:extLst>
+          </p:cNvPr>
+          <p:cNvGrpSpPr/>
+          <p:nvPr/>
+        </p:nvGrpSpPr>
+        <p:grpSpPr>
+          <a:xfrm>
+            <a:off x="2028161" y="2962208"/>
+            <a:ext cx="302254" cy="358926"/>
+            <a:chOff x="1978827" y="2944584"/>
+            <a:chExt cx="302254" cy="358926"/>
+          </a:xfrm>
+        </p:grpSpPr>
+        <p:sp>
+          <p:nvSpPr>
+            <p:cNvPr id="25" name="フリーフォーム: 図形 24">
+              <a:extLst>
+                <a:ext uri="{FF2B5EF4-FFF2-40B4-BE49-F238E27FC236}">
+                  <a16:creationId xmlns:a16="http://schemas.microsoft.com/office/drawing/2014/main" id="{16C66FD9-CC77-2FB8-E909-C67ED7D4BC93}"/>
+                </a:ext>
+              </a:extLst>
+            </p:cNvPr>
+            <p:cNvSpPr/>
+            <p:nvPr/>
+          </p:nvSpPr>
+          <p:spPr>
+            <a:xfrm>
+              <a:off x="2086101" y="2944584"/>
+              <a:ext cx="87707" cy="358926"/>
+            </a:xfrm>
+            <a:custGeom>
+              <a:avLst/>
+              <a:gdLst>
+                <a:gd name="connsiteX0" fmla="*/ 0 w 87707"/>
+                <a:gd name="connsiteY0" fmla="*/ 0 h 358926"/>
+                <a:gd name="connsiteX1" fmla="*/ 87708 w 87707"/>
+                <a:gd name="connsiteY1" fmla="*/ 0 h 358926"/>
+                <a:gd name="connsiteX2" fmla="*/ 87708 w 87707"/>
+                <a:gd name="connsiteY2" fmla="*/ 358926 h 358926"/>
+                <a:gd name="connsiteX3" fmla="*/ 0 w 87707"/>
+                <a:gd name="connsiteY3" fmla="*/ 358926 h 358926"/>
+              </a:gdLst>
+              <a:ahLst/>
+              <a:cxnLst>
+                <a:cxn ang="0">
+                  <a:pos x="connsiteX0" y="connsiteY0"/>
+                </a:cxn>
+                <a:cxn ang="0">
+                  <a:pos x="connsiteX1" y="connsiteY1"/>
+                </a:cxn>
+                <a:cxn ang="0">
+                  <a:pos x="connsiteX2" y="connsiteY2"/>
+                </a:cxn>
+                <a:cxn ang="0">
+                  <a:pos x="connsiteX3" y="connsiteY3"/>
+                </a:cxn>
+              </a:cxnLst>
+              <a:rect l="l" t="t" r="r" b="b"/>
+              <a:pathLst>
+                <a:path w="87707" h="358926">
+                  <a:moveTo>
+                    <a:pt x="0" y="0"/>
+                  </a:moveTo>
+                  <a:lnTo>
+                    <a:pt x="87708" y="0"/>
+                  </a:lnTo>
+                  <a:lnTo>
+                    <a:pt x="87708" y="358926"/>
+                  </a:lnTo>
+                  <a:lnTo>
+                    <a:pt x="0" y="358926"/>
+                  </a:lnTo>
+                  <a:close/>
+                </a:path>
+              </a:pathLst>
+            </a:custGeom>
+            <a:solidFill>
+              <a:schemeClr val="bg1"/>
+            </a:solidFill>
+            <a:ln w="1343" cap="flat">
+              <a:noFill/>
+              <a:prstDash val="solid"/>
+              <a:miter/>
+            </a:ln>
+          </p:spPr>
+          <p:txBody>
+            <a:bodyPr rtlCol="0" anchor="ctr"/>
+            <a:lstStyle/>
+            <a:p>
+              <a:endParaRPr lang="ja-JP" altLang="en-US"/>
+            </a:p>
+          </p:txBody>
+        </p:sp>
+        <p:sp>
+          <p:nvSpPr>
+            <p:cNvPr id="28" name="フリーフォーム: 図形 27">
+              <a:extLst>
+                <a:ext uri="{FF2B5EF4-FFF2-40B4-BE49-F238E27FC236}">
+                  <a16:creationId xmlns:a16="http://schemas.microsoft.com/office/drawing/2014/main" id="{F4EA7593-F811-8FC2-C6DF-B3B83BD3B7E7}"/>
+                </a:ext>
+              </a:extLst>
+            </p:cNvPr>
+            <p:cNvSpPr/>
+            <p:nvPr/>
+          </p:nvSpPr>
+          <p:spPr>
+            <a:xfrm rot="5400000">
+              <a:off x="2085426" y="2837985"/>
+              <a:ext cx="89056" cy="302254"/>
+            </a:xfrm>
+            <a:custGeom>
+              <a:avLst/>
+              <a:gdLst>
+                <a:gd name="connsiteX0" fmla="*/ 0 w 89056"/>
+                <a:gd name="connsiteY0" fmla="*/ 0 h 358926"/>
+                <a:gd name="connsiteX1" fmla="*/ 89057 w 89056"/>
+                <a:gd name="connsiteY1" fmla="*/ 0 h 358926"/>
+                <a:gd name="connsiteX2" fmla="*/ 89057 w 89056"/>
+                <a:gd name="connsiteY2" fmla="*/ 358926 h 358926"/>
+                <a:gd name="connsiteX3" fmla="*/ 0 w 89056"/>
+                <a:gd name="connsiteY3" fmla="*/ 358926 h 358926"/>
+              </a:gdLst>
+              <a:ahLst/>
+              <a:cxnLst>
+                <a:cxn ang="0">
+                  <a:pos x="connsiteX0" y="connsiteY0"/>
+                </a:cxn>
+                <a:cxn ang="0">
+                  <a:pos x="connsiteX1" y="connsiteY1"/>
+                </a:cxn>
+                <a:cxn ang="0">
+                  <a:pos x="connsiteX2" y="connsiteY2"/>
+                </a:cxn>
+                <a:cxn ang="0">
+                  <a:pos x="connsiteX3" y="connsiteY3"/>
+                </a:cxn>
+              </a:cxnLst>
+              <a:rect l="l" t="t" r="r" b="b"/>
+              <a:pathLst>
+                <a:path w="89056" h="358926">
+                  <a:moveTo>
+                    <a:pt x="0" y="0"/>
+                  </a:moveTo>
+                  <a:lnTo>
+                    <a:pt x="89057" y="0"/>
+                  </a:lnTo>
+                  <a:lnTo>
+                    <a:pt x="89057" y="358926"/>
+                  </a:lnTo>
+                  <a:lnTo>
+                    <a:pt x="0" y="358926"/>
+                  </a:lnTo>
+                  <a:close/>
+                </a:path>
+              </a:pathLst>
+            </a:custGeom>
+            <a:solidFill>
+              <a:schemeClr val="bg1"/>
+            </a:solidFill>
+            <a:ln w="1343" cap="flat">
+              <a:noFill/>
+              <a:prstDash val="solid"/>
+              <a:miter/>
+            </a:ln>
+          </p:spPr>
+          <p:txBody>
+            <a:bodyPr rtlCol="0" anchor="ctr"/>
+            <a:lstStyle/>
+            <a:p>
+              <a:endParaRPr lang="ja-JP" altLang="en-US"/>
+            </a:p>
+          </p:txBody>
+        </p:sp>
+      </p:grpSp>
+      <p:grpSp>
+        <p:nvGrpSpPr>
+          <p:cNvPr id="84" name="グループ化 83">
+            <a:extLst>
+              <a:ext uri="{FF2B5EF4-FFF2-40B4-BE49-F238E27FC236}">
+                <a16:creationId xmlns:a16="http://schemas.microsoft.com/office/drawing/2014/main" id="{07FFC650-1930-45A3-B664-EEA995D7FE3C}"/>
+              </a:ext>
+            </a:extLst>
+          </p:cNvPr>
+          <p:cNvGrpSpPr/>
+          <p:nvPr/>
+        </p:nvGrpSpPr>
+        <p:grpSpPr>
+          <a:xfrm>
+            <a:off x="2369918" y="2959959"/>
+            <a:ext cx="302254" cy="361175"/>
+            <a:chOff x="2320584" y="2942335"/>
+            <a:chExt cx="302254" cy="361175"/>
+          </a:xfrm>
+        </p:grpSpPr>
+        <p:sp>
+          <p:nvSpPr>
+            <p:cNvPr id="27" name="フリーフォーム: 図形 26">
+              <a:extLst>
+                <a:ext uri="{FF2B5EF4-FFF2-40B4-BE49-F238E27FC236}">
+                  <a16:creationId xmlns:a16="http://schemas.microsoft.com/office/drawing/2014/main" id="{9DF33B5F-A89C-3CC7-EA4E-E8C711EC040A}"/>
+                </a:ext>
+              </a:extLst>
+            </p:cNvPr>
+            <p:cNvSpPr/>
+            <p:nvPr/>
+          </p:nvSpPr>
+          <p:spPr>
+            <a:xfrm>
+              <a:off x="2533712" y="2944584"/>
+              <a:ext cx="89056" cy="358926"/>
+            </a:xfrm>
+            <a:custGeom>
+              <a:avLst/>
+              <a:gdLst>
+                <a:gd name="connsiteX0" fmla="*/ 0 w 89056"/>
+                <a:gd name="connsiteY0" fmla="*/ 0 h 358926"/>
+                <a:gd name="connsiteX1" fmla="*/ 89057 w 89056"/>
+                <a:gd name="connsiteY1" fmla="*/ 0 h 358926"/>
+                <a:gd name="connsiteX2" fmla="*/ 89057 w 89056"/>
+                <a:gd name="connsiteY2" fmla="*/ 358926 h 358926"/>
+                <a:gd name="connsiteX3" fmla="*/ 0 w 89056"/>
+                <a:gd name="connsiteY3" fmla="*/ 358926 h 358926"/>
+              </a:gdLst>
+              <a:ahLst/>
+              <a:cxnLst>
+                <a:cxn ang="0">
+                  <a:pos x="connsiteX0" y="connsiteY0"/>
+                </a:cxn>
+                <a:cxn ang="0">
+                  <a:pos x="connsiteX1" y="connsiteY1"/>
+                </a:cxn>
+                <a:cxn ang="0">
+                  <a:pos x="connsiteX2" y="connsiteY2"/>
+                </a:cxn>
+                <a:cxn ang="0">
+                  <a:pos x="connsiteX3" y="connsiteY3"/>
+                </a:cxn>
+              </a:cxnLst>
+              <a:rect l="l" t="t" r="r" b="b"/>
+              <a:pathLst>
+                <a:path w="89056" h="358926">
+                  <a:moveTo>
+                    <a:pt x="0" y="0"/>
+                  </a:moveTo>
+                  <a:lnTo>
+                    <a:pt x="89057" y="0"/>
+                  </a:lnTo>
+                  <a:lnTo>
+                    <a:pt x="89057" y="358926"/>
+                  </a:lnTo>
+                  <a:lnTo>
+                    <a:pt x="0" y="358926"/>
+                  </a:lnTo>
+                  <a:close/>
+                </a:path>
+              </a:pathLst>
+            </a:custGeom>
+            <a:solidFill>
+              <a:schemeClr val="bg1"/>
+            </a:solidFill>
+            <a:ln w="1343" cap="flat">
+              <a:noFill/>
+              <a:prstDash val="solid"/>
+              <a:miter/>
+            </a:ln>
+          </p:spPr>
+          <p:txBody>
+            <a:bodyPr rtlCol="0" anchor="ctr"/>
+            <a:lstStyle/>
+            <a:p>
+              <a:endParaRPr lang="ja-JP" altLang="en-US"/>
+            </a:p>
+          </p:txBody>
+        </p:sp>
+        <p:sp>
+          <p:nvSpPr>
+            <p:cNvPr id="29" name="フリーフォーム: 図形 28">
+              <a:extLst>
+                <a:ext uri="{FF2B5EF4-FFF2-40B4-BE49-F238E27FC236}">
+                  <a16:creationId xmlns:a16="http://schemas.microsoft.com/office/drawing/2014/main" id="{6E642FEB-B754-CC6D-377F-039137046754}"/>
+                </a:ext>
+              </a:extLst>
+            </p:cNvPr>
+            <p:cNvSpPr/>
+            <p:nvPr/>
+          </p:nvSpPr>
+          <p:spPr>
+            <a:xfrm rot="5400000">
+              <a:off x="2427183" y="2964563"/>
+              <a:ext cx="89056" cy="302254"/>
+            </a:xfrm>
+            <a:custGeom>
+              <a:avLst/>
+              <a:gdLst>
+                <a:gd name="connsiteX0" fmla="*/ 0 w 89056"/>
+                <a:gd name="connsiteY0" fmla="*/ 0 h 358926"/>
+                <a:gd name="connsiteX1" fmla="*/ 89057 w 89056"/>
+                <a:gd name="connsiteY1" fmla="*/ 0 h 358926"/>
+                <a:gd name="connsiteX2" fmla="*/ 89057 w 89056"/>
+                <a:gd name="connsiteY2" fmla="*/ 358926 h 358926"/>
+                <a:gd name="connsiteX3" fmla="*/ 0 w 89056"/>
+                <a:gd name="connsiteY3" fmla="*/ 358926 h 358926"/>
+              </a:gdLst>
+              <a:ahLst/>
+              <a:cxnLst>
+                <a:cxn ang="0">
+                  <a:pos x="connsiteX0" y="connsiteY0"/>
+                </a:cxn>
+                <a:cxn ang="0">
+                  <a:pos x="connsiteX1" y="connsiteY1"/>
+                </a:cxn>
+                <a:cxn ang="0">
+                  <a:pos x="connsiteX2" y="connsiteY2"/>
+                </a:cxn>
+                <a:cxn ang="0">
+                  <a:pos x="connsiteX3" y="connsiteY3"/>
+                </a:cxn>
+              </a:cxnLst>
+              <a:rect l="l" t="t" r="r" b="b"/>
+              <a:pathLst>
+                <a:path w="89056" h="358926">
+                  <a:moveTo>
+                    <a:pt x="0" y="0"/>
+                  </a:moveTo>
+                  <a:lnTo>
+                    <a:pt x="89057" y="0"/>
+                  </a:lnTo>
+                  <a:lnTo>
+                    <a:pt x="89057" y="358926"/>
+                  </a:lnTo>
+                  <a:lnTo>
+                    <a:pt x="0" y="358926"/>
+                  </a:lnTo>
+                  <a:close/>
+                </a:path>
+              </a:pathLst>
+            </a:custGeom>
+            <a:solidFill>
+              <a:schemeClr val="bg1"/>
+            </a:solidFill>
+            <a:ln w="1343" cap="flat">
+              <a:noFill/>
+              <a:prstDash val="solid"/>
+              <a:miter/>
+            </a:ln>
+          </p:spPr>
+          <p:txBody>
+            <a:bodyPr rtlCol="0" anchor="ctr"/>
+            <a:lstStyle/>
+            <a:p>
+              <a:endParaRPr lang="ja-JP" altLang="en-US"/>
+            </a:p>
+          </p:txBody>
+        </p:sp>
+        <p:sp>
+          <p:nvSpPr>
+            <p:cNvPr id="30" name="フリーフォーム: 図形 29">
+              <a:extLst>
+                <a:ext uri="{FF2B5EF4-FFF2-40B4-BE49-F238E27FC236}">
+                  <a16:creationId xmlns:a16="http://schemas.microsoft.com/office/drawing/2014/main" id="{0058C6CB-0285-E7C1-982E-1A83DC8EAAE2}"/>
+                </a:ext>
+              </a:extLst>
+            </p:cNvPr>
+            <p:cNvSpPr/>
+            <p:nvPr/>
+          </p:nvSpPr>
+          <p:spPr>
+            <a:xfrm>
+              <a:off x="2320584" y="2942335"/>
+              <a:ext cx="87707" cy="358926"/>
+            </a:xfrm>
+            <a:custGeom>
+              <a:avLst/>
+              <a:gdLst>
+                <a:gd name="connsiteX0" fmla="*/ 0 w 87707"/>
+                <a:gd name="connsiteY0" fmla="*/ 0 h 358926"/>
+                <a:gd name="connsiteX1" fmla="*/ 87708 w 87707"/>
+                <a:gd name="connsiteY1" fmla="*/ 0 h 358926"/>
+                <a:gd name="connsiteX2" fmla="*/ 87708 w 87707"/>
+                <a:gd name="connsiteY2" fmla="*/ 358926 h 358926"/>
+                <a:gd name="connsiteX3" fmla="*/ 0 w 87707"/>
+                <a:gd name="connsiteY3" fmla="*/ 358926 h 358926"/>
+              </a:gdLst>
+              <a:ahLst/>
+              <a:cxnLst>
+                <a:cxn ang="0">
+                  <a:pos x="connsiteX0" y="connsiteY0"/>
+                </a:cxn>
+                <a:cxn ang="0">
+                  <a:pos x="connsiteX1" y="connsiteY1"/>
+                </a:cxn>
+                <a:cxn ang="0">
+                  <a:pos x="connsiteX2" y="connsiteY2"/>
+                </a:cxn>
+                <a:cxn ang="0">
+                  <a:pos x="connsiteX3" y="connsiteY3"/>
+                </a:cxn>
+              </a:cxnLst>
+              <a:rect l="l" t="t" r="r" b="b"/>
+              <a:pathLst>
+                <a:path w="87707" h="358926">
+                  <a:moveTo>
+                    <a:pt x="0" y="0"/>
+                  </a:moveTo>
+                  <a:lnTo>
+                    <a:pt x="87708" y="0"/>
+                  </a:lnTo>
+                  <a:lnTo>
+                    <a:pt x="87708" y="358926"/>
+                  </a:lnTo>
+                  <a:lnTo>
+                    <a:pt x="0" y="358926"/>
+                  </a:lnTo>
+                  <a:close/>
+                </a:path>
+              </a:pathLst>
+            </a:custGeom>
+            <a:solidFill>
+              <a:schemeClr val="bg1"/>
+            </a:solidFill>
+            <a:ln w="1343" cap="flat">
+              <a:noFill/>
+              <a:prstDash val="solid"/>
+              <a:miter/>
+            </a:ln>
+          </p:spPr>
+          <p:txBody>
+            <a:bodyPr rtlCol="0" anchor="ctr"/>
+            <a:lstStyle/>
+            <a:p>
+              <a:endParaRPr lang="ja-JP" altLang="en-US"/>
+            </a:p>
+          </p:txBody>
+        </p:sp>
+      </p:grpSp>
+      <p:pic>
+        <p:nvPicPr>
+          <p:cNvPr id="31" name="グラフィックス 30">
+            <a:extLst>
+              <a:ext uri="{FF2B5EF4-FFF2-40B4-BE49-F238E27FC236}">
+                <a16:creationId xmlns:a16="http://schemas.microsoft.com/office/drawing/2014/main" id="{CC5BC29F-C3CA-6AC4-B286-80D86CC96E28}"/>
+              </a:ext>
+            </a:extLst>
+          </p:cNvPr>
+          <p:cNvPicPr>
+            <a:picLocks noChangeAspect="1"/>
+          </p:cNvPicPr>
+          <p:nvPr/>
+        </p:nvPicPr>
+        <p:blipFill>
+          <a:blip r:embed="rId4">
+            <a:extLst>
+              <a:ext uri="{28A0092B-C50C-407E-A947-70E740481C1C}">
+                <a14:useLocalDpi xmlns:a14="http://schemas.microsoft.com/office/drawing/2010/main" val="0"/>
+              </a:ext>
+              <a:ext uri="{96DAC541-7B7A-43D3-8B79-37D633B846F1}">
+                <asvg:svgBlip xmlns:asvg="http://schemas.microsoft.com/office/drawing/2016/SVG/main" r:embed="rId5"/>
+              </a:ext>
+            </a:extLst>
+          </a:blip>
+          <a:stretch>
+            <a:fillRect/>
+          </a:stretch>
+        </p:blipFill>
+        <p:spPr>
+          <a:xfrm>
+            <a:off x="1372897" y="3390806"/>
+            <a:ext cx="1349348" cy="613953"/>
+          </a:xfrm>
+          <a:prstGeom prst="rect">
+            <a:avLst/>
+          </a:prstGeom>
+        </p:spPr>
+      </p:pic>
+      <p:sp>
+        <p:nvSpPr>
+          <p:cNvPr id="52" name="フリーフォーム: 図形 51">
+            <a:extLst>
+              <a:ext uri="{FF2B5EF4-FFF2-40B4-BE49-F238E27FC236}">
+                <a16:creationId xmlns:a16="http://schemas.microsoft.com/office/drawing/2014/main" id="{39871FCE-87F7-6CA5-61ED-5F8DE4C91982}"/>
+              </a:ext>
+            </a:extLst>
+          </p:cNvPr>
+          <p:cNvSpPr/>
+          <p:nvPr/>
+        </p:nvSpPr>
+        <p:spPr>
+          <a:xfrm>
+            <a:off x="3071225" y="2959959"/>
+            <a:ext cx="302379" cy="358929"/>
+          </a:xfrm>
+          <a:custGeom>
+            <a:avLst/>
+            <a:gdLst>
+              <a:gd name="connsiteX0" fmla="*/ 0 w 302379"/>
+              <a:gd name="connsiteY0" fmla="*/ 0 h 358929"/>
+              <a:gd name="connsiteX1" fmla="*/ 87708 w 302379"/>
+              <a:gd name="connsiteY1" fmla="*/ 0 h 358929"/>
+              <a:gd name="connsiteX2" fmla="*/ 87708 w 302379"/>
+              <a:gd name="connsiteY2" fmla="*/ 267621 h 358929"/>
+              <a:gd name="connsiteX3" fmla="*/ 213322 w 302379"/>
+              <a:gd name="connsiteY3" fmla="*/ 267621 h 358929"/>
+              <a:gd name="connsiteX4" fmla="*/ 213322 w 302379"/>
+              <a:gd name="connsiteY4" fmla="*/ 0 h 358929"/>
+              <a:gd name="connsiteX5" fmla="*/ 302379 w 302379"/>
+              <a:gd name="connsiteY5" fmla="*/ 0 h 358929"/>
+              <a:gd name="connsiteX6" fmla="*/ 302379 w 302379"/>
+              <a:gd name="connsiteY6" fmla="*/ 358926 h 358929"/>
+              <a:gd name="connsiteX7" fmla="*/ 302377 w 302379"/>
+              <a:gd name="connsiteY7" fmla="*/ 358926 h 358929"/>
+              <a:gd name="connsiteX8" fmla="*/ 302377 w 302379"/>
+              <a:gd name="connsiteY8" fmla="*/ 358929 h 358929"/>
+              <a:gd name="connsiteX9" fmla="*/ 66575 w 302379"/>
+              <a:gd name="connsiteY9" fmla="*/ 358929 h 358929"/>
+              <a:gd name="connsiteX10" fmla="*/ 66575 w 302379"/>
+              <a:gd name="connsiteY10" fmla="*/ 358926 h 358929"/>
+              <a:gd name="connsiteX11" fmla="*/ 41830 w 302379"/>
+              <a:gd name="connsiteY11" fmla="*/ 358926 h 358929"/>
+              <a:gd name="connsiteX12" fmla="*/ 0 w 302379"/>
+              <a:gd name="connsiteY12" fmla="*/ 309000 h 358929"/>
+            </a:gdLst>
+            <a:ahLst/>
+            <a:cxnLst>
+              <a:cxn ang="0">
+                <a:pos x="connsiteX0" y="connsiteY0"/>
+              </a:cxn>
+              <a:cxn ang="0">
+                <a:pos x="connsiteX1" y="connsiteY1"/>
+              </a:cxn>
+              <a:cxn ang="0">
+                <a:pos x="connsiteX2" y="connsiteY2"/>
+              </a:cxn>
+              <a:cxn ang="0">
+                <a:pos x="connsiteX3" y="connsiteY3"/>
+              </a:cxn>
+              <a:cxn ang="0">
+                <a:pos x="connsiteX4" y="connsiteY4"/>
+              </a:cxn>
+              <a:cxn ang="0">
+                <a:pos x="connsiteX5" y="connsiteY5"/>
+              </a:cxn>
+              <a:cxn ang="0">
+                <a:pos x="connsiteX6" y="connsiteY6"/>
+              </a:cxn>
+              <a:cxn ang="0">
+                <a:pos x="connsiteX7" y="connsiteY7"/>
+              </a:cxn>
+              <a:cxn ang="0">
+                <a:pos x="connsiteX8" y="connsiteY8"/>
+              </a:cxn>
+              <a:cxn ang="0">
+                <a:pos x="connsiteX9" y="connsiteY9"/>
+              </a:cxn>
+              <a:cxn ang="0">
+                <a:pos x="connsiteX10" y="connsiteY10"/>
+              </a:cxn>
+              <a:cxn ang="0">
+                <a:pos x="connsiteX11" y="connsiteY11"/>
+              </a:cxn>
+              <a:cxn ang="0">
+                <a:pos x="connsiteX12" y="connsiteY12"/>
+              </a:cxn>
+            </a:cxnLst>
+            <a:rect l="l" t="t" r="r" b="b"/>
+            <a:pathLst>
+              <a:path w="302379" h="358929">
+                <a:moveTo>
+                  <a:pt x="0" y="0"/>
+                </a:moveTo>
+                <a:lnTo>
+                  <a:pt x="87708" y="0"/>
+                </a:lnTo>
+                <a:lnTo>
+                  <a:pt x="87708" y="267621"/>
+                </a:lnTo>
+                <a:lnTo>
+                  <a:pt x="213322" y="267621"/>
+                </a:lnTo>
+                <a:lnTo>
+                  <a:pt x="213322" y="0"/>
+                </a:lnTo>
+                <a:lnTo>
+                  <a:pt x="302379" y="0"/>
+                </a:lnTo>
+                <a:lnTo>
+                  <a:pt x="302379" y="358926"/>
+                </a:lnTo>
+                <a:lnTo>
+                  <a:pt x="302377" y="358926"/>
+                </a:lnTo>
+                <a:lnTo>
+                  <a:pt x="302377" y="358929"/>
+                </a:lnTo>
+                <a:lnTo>
+                  <a:pt x="66575" y="358929"/>
+                </a:lnTo>
+                <a:lnTo>
+                  <a:pt x="66575" y="358926"/>
+                </a:lnTo>
+                <a:lnTo>
+                  <a:pt x="41830" y="358926"/>
+                </a:lnTo>
+                <a:cubicBezTo>
+                  <a:pt x="15383" y="358926"/>
+                  <a:pt x="0" y="336122"/>
+                  <a:pt x="0" y="309000"/>
+                </a:cubicBezTo>
+                <a:close/>
+              </a:path>
+            </a:pathLst>
+          </a:custGeom>
+          <a:solidFill>
+            <a:schemeClr val="bg1"/>
+          </a:solidFill>
+          <a:ln>
+            <a:noFill/>
+          </a:ln>
+        </p:spPr>
+        <p:style>
+          <a:lnRef idx="2">
+            <a:schemeClr val="accent1">
+              <a:shade val="50000"/>
+            </a:schemeClr>
+          </a:lnRef>
+          <a:fillRef idx="1">
+            <a:schemeClr val="accent1"/>
+          </a:fillRef>
+          <a:effectRef idx="0">
+            <a:schemeClr val="accent1"/>
+          </a:effectRef>
+          <a:fontRef idx="minor">
+            <a:schemeClr val="lt1"/>
+          </a:fontRef>
+        </p:style>
+        <p:txBody>
+          <a:bodyPr wrap="square" rtlCol="0" anchor="ctr">
+            <a:noAutofit/>
+          </a:bodyPr>
+          <a:lstStyle/>
+          <a:p>
+            <a:pPr algn="ctr"/>
+            <a:endParaRPr kumimoji="1" lang="ja-JP" altLang="en-US"/>
+          </a:p>
+        </p:txBody>
+      </p:sp>
+      <p:sp>
+        <p:nvSpPr>
+          <p:cNvPr id="53" name="正方形/長方形 52">
+            <a:extLst>
+              <a:ext uri="{FF2B5EF4-FFF2-40B4-BE49-F238E27FC236}">
+                <a16:creationId xmlns:a16="http://schemas.microsoft.com/office/drawing/2014/main" id="{CDEEF6A7-EF7B-C570-BAB6-7DDE9BE52B25}"/>
+              </a:ext>
+            </a:extLst>
+          </p:cNvPr>
+          <p:cNvSpPr/>
+          <p:nvPr/>
+        </p:nvSpPr>
+        <p:spPr>
+          <a:xfrm>
+            <a:off x="2662994" y="3712451"/>
+            <a:ext cx="216114" cy="250468"/>
+          </a:xfrm>
+          <a:prstGeom prst="rect">
+            <a:avLst/>
+          </a:prstGeom>
+          <a:solidFill>
+            <a:srgbClr val="050504"/>
+          </a:solidFill>
+          <a:ln>
+            <a:noFill/>
+          </a:ln>
+        </p:spPr>
+        <p:style>
+          <a:lnRef idx="2">
+            <a:schemeClr val="accent1">
+              <a:shade val="50000"/>
+            </a:schemeClr>
+          </a:lnRef>
+          <a:fillRef idx="1">
+            <a:schemeClr val="accent1"/>
+          </a:fillRef>
+          <a:effectRef idx="0">
+            <a:schemeClr val="accent1"/>
+          </a:effectRef>
+          <a:fontRef idx="minor">
+            <a:schemeClr val="lt1"/>
+          </a:fontRef>
+        </p:style>
+        <p:txBody>
+          <a:bodyPr rtlCol="0" anchor="ctr"/>
+          <a:lstStyle/>
+          <a:p>
+            <a:pPr algn="ctr"/>
+            <a:endParaRPr kumimoji="1" lang="ja-JP" altLang="en-US"/>
+          </a:p>
+        </p:txBody>
+      </p:sp>
+      <p:sp>
+        <p:nvSpPr>
+          <p:cNvPr id="59" name="フリーフォーム: 図形 58">
+            <a:extLst>
+              <a:ext uri="{FF2B5EF4-FFF2-40B4-BE49-F238E27FC236}">
+                <a16:creationId xmlns:a16="http://schemas.microsoft.com/office/drawing/2014/main" id="{197F0D27-45F6-EB21-F543-C7C0A2481876}"/>
+              </a:ext>
+            </a:extLst>
+          </p:cNvPr>
+          <p:cNvSpPr/>
+          <p:nvPr/>
+        </p:nvSpPr>
+        <p:spPr>
+          <a:xfrm>
+            <a:off x="2720180" y="2959785"/>
+            <a:ext cx="87707" cy="358926"/>
+          </a:xfrm>
+          <a:custGeom>
+            <a:avLst/>
+            <a:gdLst>
+              <a:gd name="connsiteX0" fmla="*/ 0 w 87707"/>
+              <a:gd name="connsiteY0" fmla="*/ 0 h 358926"/>
+              <a:gd name="connsiteX1" fmla="*/ 87708 w 87707"/>
+              <a:gd name="connsiteY1" fmla="*/ 0 h 358926"/>
+              <a:gd name="connsiteX2" fmla="*/ 87708 w 87707"/>
+              <a:gd name="connsiteY2" fmla="*/ 358926 h 358926"/>
+              <a:gd name="connsiteX3" fmla="*/ 0 w 87707"/>
+              <a:gd name="connsiteY3" fmla="*/ 358926 h 358926"/>
+            </a:gdLst>
+            <a:ahLst/>
+            <a:cxnLst>
+              <a:cxn ang="0">
+                <a:pos x="connsiteX0" y="connsiteY0"/>
+              </a:cxn>
+              <a:cxn ang="0">
+                <a:pos x="connsiteX1" y="connsiteY1"/>
+              </a:cxn>
+              <a:cxn ang="0">
+                <a:pos x="connsiteX2" y="connsiteY2"/>
+              </a:cxn>
+              <a:cxn ang="0">
+                <a:pos x="connsiteX3" y="connsiteY3"/>
+              </a:cxn>
+            </a:cxnLst>
+            <a:rect l="l" t="t" r="r" b="b"/>
+            <a:pathLst>
+              <a:path w="87707" h="358926">
+                <a:moveTo>
+                  <a:pt x="0" y="0"/>
+                </a:moveTo>
+                <a:lnTo>
+                  <a:pt x="87708" y="0"/>
+                </a:lnTo>
+                <a:lnTo>
+                  <a:pt x="87708" y="358926"/>
+                </a:lnTo>
+                <a:lnTo>
+                  <a:pt x="0" y="358926"/>
+                </a:lnTo>
+                <a:close/>
+              </a:path>
+            </a:pathLst>
+          </a:custGeom>
+          <a:solidFill>
+            <a:schemeClr val="bg1"/>
+          </a:solidFill>
+          <a:ln w="1343" cap="flat">
+            <a:noFill/>
+            <a:prstDash val="solid"/>
+            <a:miter/>
+          </a:ln>
+        </p:spPr>
+        <p:txBody>
+          <a:bodyPr rtlCol="0" anchor="ctr"/>
+          <a:lstStyle/>
+          <a:p>
+            <a:endParaRPr lang="ja-JP" altLang="en-US"/>
+          </a:p>
+        </p:txBody>
+      </p:sp>
+      <p:sp>
+        <p:nvSpPr>
+          <p:cNvPr id="60" name="フリーフォーム: 図形 59">
+            <a:extLst>
+              <a:ext uri="{FF2B5EF4-FFF2-40B4-BE49-F238E27FC236}">
+                <a16:creationId xmlns:a16="http://schemas.microsoft.com/office/drawing/2014/main" id="{65FEF8CF-B3DD-2507-FE05-13AA03669156}"/>
+              </a:ext>
+            </a:extLst>
+          </p:cNvPr>
+          <p:cNvSpPr/>
+          <p:nvPr/>
+        </p:nvSpPr>
+        <p:spPr>
+          <a:xfrm>
+            <a:off x="3022016" y="3532988"/>
+            <a:ext cx="302254" cy="358926"/>
+          </a:xfrm>
+          <a:custGeom>
+            <a:avLst/>
+            <a:gdLst>
+              <a:gd name="connsiteX0" fmla="*/ 0 w 302254"/>
+              <a:gd name="connsiteY0" fmla="*/ 0 h 358926"/>
+              <a:gd name="connsiteX1" fmla="*/ 260424 w 302254"/>
+              <a:gd name="connsiteY1" fmla="*/ 0 h 358926"/>
+              <a:gd name="connsiteX2" fmla="*/ 302254 w 302254"/>
+              <a:gd name="connsiteY2" fmla="*/ 49926 h 358926"/>
+              <a:gd name="connsiteX3" fmla="*/ 302254 w 302254"/>
+              <a:gd name="connsiteY3" fmla="*/ 314398 h 358926"/>
+              <a:gd name="connsiteX4" fmla="*/ 257725 w 302254"/>
+              <a:gd name="connsiteY4" fmla="*/ 358926 h 358926"/>
+              <a:gd name="connsiteX5" fmla="*/ 214053 w 302254"/>
+              <a:gd name="connsiteY5" fmla="*/ 358926 h 358926"/>
+              <a:gd name="connsiteX6" fmla="*/ 214053 w 302254"/>
+              <a:gd name="connsiteY6" fmla="*/ 271219 h 358926"/>
+              <a:gd name="connsiteX7" fmla="*/ 214546 w 302254"/>
+              <a:gd name="connsiteY7" fmla="*/ 271219 h 358926"/>
+              <a:gd name="connsiteX8" fmla="*/ 214546 w 302254"/>
+              <a:gd name="connsiteY8" fmla="*/ 80961 h 358926"/>
+              <a:gd name="connsiteX9" fmla="*/ 0 w 302254"/>
+              <a:gd name="connsiteY9" fmla="*/ 80961 h 358926"/>
+              <a:gd name="connsiteX10" fmla="*/ 0 w 302254"/>
+              <a:gd name="connsiteY10" fmla="*/ 0 h 358926"/>
+            </a:gdLst>
+            <a:ahLst/>
+            <a:cxnLst>
+              <a:cxn ang="0">
+                <a:pos x="connsiteX0" y="connsiteY0"/>
+              </a:cxn>
+              <a:cxn ang="0">
+                <a:pos x="connsiteX1" y="connsiteY1"/>
+              </a:cxn>
+              <a:cxn ang="0">
+                <a:pos x="connsiteX2" y="connsiteY2"/>
+              </a:cxn>
+              <a:cxn ang="0">
+                <a:pos x="connsiteX3" y="connsiteY3"/>
+              </a:cxn>
+              <a:cxn ang="0">
+                <a:pos x="connsiteX4" y="connsiteY4"/>
+              </a:cxn>
+              <a:cxn ang="0">
+                <a:pos x="connsiteX5" y="connsiteY5"/>
+              </a:cxn>
+              <a:cxn ang="0">
+                <a:pos x="connsiteX6" y="connsiteY6"/>
+              </a:cxn>
+              <a:cxn ang="0">
+                <a:pos x="connsiteX7" y="connsiteY7"/>
+              </a:cxn>
+              <a:cxn ang="0">
+                <a:pos x="connsiteX8" y="connsiteY8"/>
+              </a:cxn>
+              <a:cxn ang="0">
+                <a:pos x="connsiteX9" y="connsiteY9"/>
+              </a:cxn>
+              <a:cxn ang="0">
+                <a:pos x="connsiteX10" y="connsiteY10"/>
+              </a:cxn>
+            </a:cxnLst>
+            <a:rect l="l" t="t" r="r" b="b"/>
+            <a:pathLst>
+              <a:path w="302254" h="358926">
+                <a:moveTo>
+                  <a:pt x="0" y="0"/>
+                </a:moveTo>
+                <a:lnTo>
+                  <a:pt x="260424" y="0"/>
+                </a:lnTo>
+                <a:cubicBezTo>
+                  <a:pt x="286871" y="0"/>
+                  <a:pt x="302254" y="22804"/>
+                  <a:pt x="302254" y="49926"/>
+                </a:cubicBezTo>
+                <a:lnTo>
+                  <a:pt x="302254" y="314398"/>
+                </a:lnTo>
+                <a:cubicBezTo>
+                  <a:pt x="302254" y="347997"/>
+                  <a:pt x="288221" y="358926"/>
+                  <a:pt x="257725" y="358926"/>
+                </a:cubicBezTo>
+                <a:lnTo>
+                  <a:pt x="214053" y="358926"/>
+                </a:lnTo>
+                <a:lnTo>
+                  <a:pt x="214053" y="271219"/>
+                </a:lnTo>
+                <a:lnTo>
+                  <a:pt x="214546" y="271219"/>
+                </a:lnTo>
+                <a:lnTo>
+                  <a:pt x="214546" y="80961"/>
+                </a:lnTo>
+                <a:lnTo>
+                  <a:pt x="0" y="80961"/>
+                </a:lnTo>
+                <a:lnTo>
+                  <a:pt x="0" y="0"/>
+                </a:lnTo>
+                <a:close/>
+              </a:path>
+            </a:pathLst>
+          </a:custGeom>
+          <a:solidFill>
+            <a:schemeClr val="bg1"/>
+          </a:solidFill>
+          <a:ln w="1343" cap="flat">
+            <a:noFill/>
+            <a:prstDash val="solid"/>
+            <a:miter/>
+          </a:ln>
+        </p:spPr>
+        <p:txBody>
+          <a:bodyPr rtlCol="0" anchor="ctr"/>
+          <a:lstStyle/>
+          <a:p>
+            <a:endParaRPr lang="ja-JP" altLang="en-US"/>
+          </a:p>
+        </p:txBody>
+      </p:sp>
+      <p:sp>
+        <p:nvSpPr>
+          <p:cNvPr id="69" name="フリーフォーム: 図形 68">
+            <a:extLst>
+              <a:ext uri="{FF2B5EF4-FFF2-40B4-BE49-F238E27FC236}">
+                <a16:creationId xmlns:a16="http://schemas.microsoft.com/office/drawing/2014/main" id="{852C7BAB-6A1E-DBE8-A2FB-0C50DB5B8969}"/>
+              </a:ext>
+            </a:extLst>
+          </p:cNvPr>
+          <p:cNvSpPr/>
+          <p:nvPr/>
+        </p:nvSpPr>
+        <p:spPr>
+          <a:xfrm>
+            <a:off x="2770268" y="3018194"/>
+            <a:ext cx="250869" cy="159648"/>
+          </a:xfrm>
+          <a:custGeom>
+            <a:avLst/>
+            <a:gdLst>
+              <a:gd name="connsiteX0" fmla="*/ 169908 w 250869"/>
+              <a:gd name="connsiteY0" fmla="*/ 0 h 159648"/>
+              <a:gd name="connsiteX1" fmla="*/ 250869 w 250869"/>
+              <a:gd name="connsiteY1" fmla="*/ 0 h 159648"/>
+              <a:gd name="connsiteX2" fmla="*/ 250869 w 250869"/>
+              <a:gd name="connsiteY2" fmla="*/ 117818 h 159648"/>
+              <a:gd name="connsiteX3" fmla="*/ 200943 w 250869"/>
+              <a:gd name="connsiteY3" fmla="*/ 159648 h 159648"/>
+              <a:gd name="connsiteX4" fmla="*/ 0 w 250869"/>
+              <a:gd name="connsiteY4" fmla="*/ 159648 h 159648"/>
+              <a:gd name="connsiteX5" fmla="*/ 0 w 250869"/>
+              <a:gd name="connsiteY5" fmla="*/ 71940 h 159648"/>
+              <a:gd name="connsiteX6" fmla="*/ 169908 w 250869"/>
+              <a:gd name="connsiteY6" fmla="*/ 71940 h 159648"/>
+              <a:gd name="connsiteX7" fmla="*/ 169908 w 250869"/>
+              <a:gd name="connsiteY7" fmla="*/ 0 h 159648"/>
+            </a:gdLst>
+            <a:ahLst/>
+            <a:cxnLst>
+              <a:cxn ang="0">
+                <a:pos x="connsiteX0" y="connsiteY0"/>
+              </a:cxn>
+              <a:cxn ang="0">
+                <a:pos x="connsiteX1" y="connsiteY1"/>
+              </a:cxn>
+              <a:cxn ang="0">
+                <a:pos x="connsiteX2" y="connsiteY2"/>
+              </a:cxn>
+              <a:cxn ang="0">
+                <a:pos x="connsiteX3" y="connsiteY3"/>
+              </a:cxn>
+              <a:cxn ang="0">
+                <a:pos x="connsiteX4" y="connsiteY4"/>
+              </a:cxn>
+              <a:cxn ang="0">
+                <a:pos x="connsiteX5" y="connsiteY5"/>
+              </a:cxn>
+              <a:cxn ang="0">
+                <a:pos x="connsiteX6" y="connsiteY6"/>
+              </a:cxn>
+              <a:cxn ang="0">
+                <a:pos x="connsiteX7" y="connsiteY7"/>
+              </a:cxn>
+            </a:cxnLst>
+            <a:rect l="l" t="t" r="r" b="b"/>
+            <a:pathLst>
+              <a:path w="250869" h="159648">
+                <a:moveTo>
+                  <a:pt x="169908" y="0"/>
+                </a:moveTo>
+                <a:lnTo>
+                  <a:pt x="250869" y="0"/>
+                </a:lnTo>
+                <a:lnTo>
+                  <a:pt x="250869" y="117818"/>
+                </a:lnTo>
+                <a:cubicBezTo>
+                  <a:pt x="250869" y="144265"/>
+                  <a:pt x="228065" y="159648"/>
+                  <a:pt x="200943" y="159648"/>
+                </a:cubicBezTo>
+                <a:lnTo>
+                  <a:pt x="0" y="159648"/>
+                </a:lnTo>
+                <a:lnTo>
+                  <a:pt x="0" y="71940"/>
+                </a:lnTo>
+                <a:lnTo>
+                  <a:pt x="169908" y="71940"/>
+                </a:lnTo>
+                <a:lnTo>
+                  <a:pt x="169908" y="0"/>
+                </a:lnTo>
+                <a:close/>
+              </a:path>
+            </a:pathLst>
+          </a:custGeom>
+          <a:solidFill>
+            <a:schemeClr val="bg1"/>
+          </a:solidFill>
+          <a:ln>
+            <a:noFill/>
+          </a:ln>
+        </p:spPr>
+        <p:style>
+          <a:lnRef idx="2">
+            <a:schemeClr val="accent1">
+              <a:shade val="50000"/>
+            </a:schemeClr>
+          </a:lnRef>
+          <a:fillRef idx="1">
+            <a:schemeClr val="accent1"/>
+          </a:fillRef>
+          <a:effectRef idx="0">
+            <a:schemeClr val="accent1"/>
+          </a:effectRef>
+          <a:fontRef idx="minor">
+            <a:schemeClr val="lt1"/>
+          </a:fontRef>
+        </p:style>
+        <p:txBody>
+          <a:bodyPr wrap="square" rtlCol="0" anchor="ctr">
+            <a:noAutofit/>
+          </a:bodyPr>
+          <a:lstStyle/>
+          <a:p>
+            <a:pPr algn="ctr"/>
+            <a:endParaRPr kumimoji="1" lang="ja-JP" altLang="en-US"/>
+          </a:p>
+        </p:txBody>
+      </p:sp>
+      <p:sp>
+        <p:nvSpPr>
+          <p:cNvPr id="81" name="フリーフォーム: 図形 80">
+            <a:extLst>
+              <a:ext uri="{FF2B5EF4-FFF2-40B4-BE49-F238E27FC236}">
+                <a16:creationId xmlns:a16="http://schemas.microsoft.com/office/drawing/2014/main" id="{ACE80EC2-F072-3934-D187-64C6A7FCA4A2}"/>
+              </a:ext>
+            </a:extLst>
+          </p:cNvPr>
+          <p:cNvSpPr/>
+          <p:nvPr/>
+        </p:nvSpPr>
+        <p:spPr>
+          <a:xfrm>
+            <a:off x="2762090" y="2959785"/>
+            <a:ext cx="259047" cy="129378"/>
+          </a:xfrm>
+          <a:custGeom>
+            <a:avLst/>
+            <a:gdLst>
+              <a:gd name="connsiteX0" fmla="*/ 0 w 259047"/>
+              <a:gd name="connsiteY0" fmla="*/ 0 h 129378"/>
+              <a:gd name="connsiteX1" fmla="*/ 217217 w 259047"/>
+              <a:gd name="connsiteY1" fmla="*/ 0 h 129378"/>
+              <a:gd name="connsiteX2" fmla="*/ 259047 w 259047"/>
+              <a:gd name="connsiteY2" fmla="*/ 49926 h 129378"/>
+              <a:gd name="connsiteX3" fmla="*/ 259047 w 259047"/>
+              <a:gd name="connsiteY3" fmla="*/ 129378 h 129378"/>
+              <a:gd name="connsiteX4" fmla="*/ 171339 w 259047"/>
+              <a:gd name="connsiteY4" fmla="*/ 129378 h 129378"/>
+              <a:gd name="connsiteX5" fmla="*/ 171339 w 259047"/>
+              <a:gd name="connsiteY5" fmla="*/ 80961 h 129378"/>
+              <a:gd name="connsiteX6" fmla="*/ 0 w 259047"/>
+              <a:gd name="connsiteY6" fmla="*/ 80961 h 129378"/>
+              <a:gd name="connsiteX7" fmla="*/ 0 w 259047"/>
+              <a:gd name="connsiteY7" fmla="*/ 0 h 129378"/>
+            </a:gdLst>
+            <a:ahLst/>
+            <a:cxnLst>
+              <a:cxn ang="0">
+                <a:pos x="connsiteX0" y="connsiteY0"/>
+              </a:cxn>
+              <a:cxn ang="0">
+                <a:pos x="connsiteX1" y="connsiteY1"/>
+              </a:cxn>
+              <a:cxn ang="0">
+                <a:pos x="connsiteX2" y="connsiteY2"/>
+              </a:cxn>
+              <a:cxn ang="0">
+                <a:pos x="connsiteX3" y="connsiteY3"/>
+              </a:cxn>
+              <a:cxn ang="0">
+                <a:pos x="connsiteX4" y="connsiteY4"/>
+              </a:cxn>
+              <a:cxn ang="0">
+                <a:pos x="connsiteX5" y="connsiteY5"/>
+              </a:cxn>
+              <a:cxn ang="0">
+                <a:pos x="connsiteX6" y="connsiteY6"/>
+              </a:cxn>
+              <a:cxn ang="0">
+                <a:pos x="connsiteX7" y="connsiteY7"/>
+              </a:cxn>
+            </a:cxnLst>
+            <a:rect l="l" t="t" r="r" b="b"/>
+            <a:pathLst>
+              <a:path w="259047" h="129378">
+                <a:moveTo>
+                  <a:pt x="0" y="0"/>
+                </a:moveTo>
+                <a:lnTo>
+                  <a:pt x="217217" y="0"/>
+                </a:lnTo>
+                <a:cubicBezTo>
+                  <a:pt x="243664" y="0"/>
+                  <a:pt x="259047" y="22804"/>
+                  <a:pt x="259047" y="49926"/>
+                </a:cubicBezTo>
+                <a:lnTo>
+                  <a:pt x="259047" y="129378"/>
+                </a:lnTo>
+                <a:lnTo>
+                  <a:pt x="171339" y="129378"/>
+                </a:lnTo>
+                <a:lnTo>
+                  <a:pt x="171339" y="80961"/>
+                </a:lnTo>
+                <a:lnTo>
+                  <a:pt x="0" y="80961"/>
+                </a:lnTo>
+                <a:lnTo>
+                  <a:pt x="0" y="0"/>
+                </a:lnTo>
+                <a:close/>
+              </a:path>
+            </a:pathLst>
+          </a:custGeom>
+          <a:solidFill>
+            <a:schemeClr val="bg1"/>
+          </a:solidFill>
+          <a:ln>
+            <a:noFill/>
+          </a:ln>
+        </p:spPr>
+        <p:style>
+          <a:lnRef idx="2">
+            <a:schemeClr val="accent1">
+              <a:shade val="50000"/>
+            </a:schemeClr>
+          </a:lnRef>
+          <a:fillRef idx="1">
+            <a:schemeClr val="accent1"/>
+          </a:fillRef>
+          <a:effectRef idx="0">
+            <a:schemeClr val="accent1"/>
+          </a:effectRef>
+          <a:fontRef idx="minor">
+            <a:schemeClr val="lt1"/>
+          </a:fontRef>
+        </p:style>
+        <p:txBody>
+          <a:bodyPr wrap="square" rtlCol="0" anchor="ctr">
+            <a:noAutofit/>
+          </a:bodyPr>
+          <a:lstStyle/>
+          <a:p>
+            <a:pPr algn="ctr"/>
+            <a:endParaRPr kumimoji="1" lang="ja-JP" altLang="en-US" dirty="0"/>
+          </a:p>
+        </p:txBody>
+      </p:sp>
+      <p:sp>
+        <p:nvSpPr>
+          <p:cNvPr id="86" name="フリーフォーム: 図形 85">
+            <a:extLst>
+              <a:ext uri="{FF2B5EF4-FFF2-40B4-BE49-F238E27FC236}">
+                <a16:creationId xmlns:a16="http://schemas.microsoft.com/office/drawing/2014/main" id="{387BA751-9247-50D9-743C-6220ED4D23D9}"/>
+              </a:ext>
+            </a:extLst>
+          </p:cNvPr>
+          <p:cNvSpPr/>
+          <p:nvPr/>
+        </p:nvSpPr>
+        <p:spPr>
+          <a:xfrm rot="19415123">
+            <a:off x="2880108" y="3081131"/>
+            <a:ext cx="89056" cy="358926"/>
+          </a:xfrm>
+          <a:custGeom>
+            <a:avLst/>
+            <a:gdLst>
+              <a:gd name="connsiteX0" fmla="*/ 0 w 89056"/>
+              <a:gd name="connsiteY0" fmla="*/ 0 h 358926"/>
+              <a:gd name="connsiteX1" fmla="*/ 89057 w 89056"/>
+              <a:gd name="connsiteY1" fmla="*/ 0 h 358926"/>
+              <a:gd name="connsiteX2" fmla="*/ 89057 w 89056"/>
+              <a:gd name="connsiteY2" fmla="*/ 358926 h 358926"/>
+              <a:gd name="connsiteX3" fmla="*/ 0 w 89056"/>
+              <a:gd name="connsiteY3" fmla="*/ 358926 h 358926"/>
+            </a:gdLst>
+            <a:ahLst/>
+            <a:cxnLst>
+              <a:cxn ang="0">
+                <a:pos x="connsiteX0" y="connsiteY0"/>
+              </a:cxn>
+              <a:cxn ang="0">
+                <a:pos x="connsiteX1" y="connsiteY1"/>
+              </a:cxn>
+              <a:cxn ang="0">
+                <a:pos x="connsiteX2" y="connsiteY2"/>
+              </a:cxn>
+              <a:cxn ang="0">
+                <a:pos x="connsiteX3" y="connsiteY3"/>
+              </a:cxn>
+            </a:cxnLst>
+            <a:rect l="l" t="t" r="r" b="b"/>
+            <a:pathLst>
+              <a:path w="89056" h="358926">
+                <a:moveTo>
+                  <a:pt x="0" y="0"/>
+                </a:moveTo>
+                <a:lnTo>
+                  <a:pt x="89057" y="0"/>
+                </a:lnTo>
+                <a:lnTo>
+                  <a:pt x="89057" y="358926"/>
+                </a:lnTo>
+                <a:lnTo>
+                  <a:pt x="0" y="358926"/>
+                </a:lnTo>
+                <a:close/>
+              </a:path>
+            </a:pathLst>
+          </a:custGeom>
+          <a:solidFill>
+            <a:schemeClr val="bg1"/>
+          </a:solidFill>
+          <a:ln w="1343" cap="flat">
+            <a:noFill/>
+            <a:prstDash val="solid"/>
+            <a:miter/>
+          </a:ln>
+        </p:spPr>
+        <p:txBody>
+          <a:bodyPr rtlCol="0" anchor="ctr"/>
+          <a:lstStyle/>
+          <a:p>
+            <a:endParaRPr lang="ja-JP" altLang="en-US"/>
+          </a:p>
+        </p:txBody>
+      </p:sp>
+    </p:spTree>
+    <p:extLst>
+      <p:ext uri="{BB962C8B-B14F-4D97-AF65-F5344CB8AC3E}">
+        <p14:creationId xmlns:p14="http://schemas.microsoft.com/office/powerpoint/2010/main" val="3100633611"/>
+      </p:ext>
+    </p:extLst>
+  </p:cSld>
+  <p:clrMapOvr>
+    <a:masterClrMapping/>
+  </p:clrMapOvr>
+</p:sld>
+</file>
+
 <file path=ppt/slides/slide2.xml><?xml version="1.0" encoding="utf-8"?>
 <p:sld xmlns:a="http://schemas.openxmlformats.org/drawingml/2006/main" xmlns:r="http://schemas.openxmlformats.org/officeDocument/2006/relationships" xmlns:p="http://schemas.openxmlformats.org/presentationml/2006/main">
   <p:cSld>

</xml_diff>

<commit_message>
5.0.0.0 Supported SEGA MultiPCM.
</commit_message>
<xml_diff>
--- a/src/mamidimemo/Data/Images.pptx
+++ b/src/mamidimemo/Data/Images.pptx
@@ -214,7 +214,7 @@
           <a:p>
             <a:fld id="{FD0ADE19-EE5F-4EAE-BCEC-0B5F9244BB48}" type="datetimeFigureOut">
               <a:rPr kumimoji="1" lang="ja-JP" altLang="en-US" smtClean="0"/>
-              <a:t>2023/7/26</a:t>
+              <a:t>2023/10/8</a:t>
             </a:fld>
             <a:endParaRPr kumimoji="1" lang="ja-JP" altLang="en-US"/>
           </a:p>
@@ -744,7 +744,7 @@
           <a:p>
             <a:fld id="{B7E48A73-9369-4B88-BBE6-B1D33CBD5F01}" type="datetimeFigureOut">
               <a:rPr kumimoji="1" lang="ja-JP" altLang="en-US" smtClean="0"/>
-              <a:t>2023/7/26</a:t>
+              <a:t>2023/10/8</a:t>
             </a:fld>
             <a:endParaRPr kumimoji="1" lang="ja-JP" altLang="en-US"/>
           </a:p>
@@ -974,7 +974,7 @@
           <a:p>
             <a:fld id="{B7E48A73-9369-4B88-BBE6-B1D33CBD5F01}" type="datetimeFigureOut">
               <a:rPr kumimoji="1" lang="ja-JP" altLang="en-US" smtClean="0"/>
-              <a:t>2023/7/26</a:t>
+              <a:t>2023/10/8</a:t>
             </a:fld>
             <a:endParaRPr kumimoji="1" lang="ja-JP" altLang="en-US"/>
           </a:p>
@@ -1214,7 +1214,7 @@
           <a:p>
             <a:fld id="{B7E48A73-9369-4B88-BBE6-B1D33CBD5F01}" type="datetimeFigureOut">
               <a:rPr kumimoji="1" lang="ja-JP" altLang="en-US" smtClean="0"/>
-              <a:t>2023/7/26</a:t>
+              <a:t>2023/10/8</a:t>
             </a:fld>
             <a:endParaRPr kumimoji="1" lang="ja-JP" altLang="en-US"/>
           </a:p>
@@ -1444,7 +1444,7 @@
           <a:p>
             <a:fld id="{B7E48A73-9369-4B88-BBE6-B1D33CBD5F01}" type="datetimeFigureOut">
               <a:rPr kumimoji="1" lang="ja-JP" altLang="en-US" smtClean="0"/>
-              <a:t>2023/7/26</a:t>
+              <a:t>2023/10/8</a:t>
             </a:fld>
             <a:endParaRPr kumimoji="1" lang="ja-JP" altLang="en-US"/>
           </a:p>
@@ -1719,7 +1719,7 @@
           <a:p>
             <a:fld id="{B7E48A73-9369-4B88-BBE6-B1D33CBD5F01}" type="datetimeFigureOut">
               <a:rPr kumimoji="1" lang="ja-JP" altLang="en-US" smtClean="0"/>
-              <a:t>2023/7/26</a:t>
+              <a:t>2023/10/8</a:t>
             </a:fld>
             <a:endParaRPr kumimoji="1" lang="ja-JP" altLang="en-US"/>
           </a:p>
@@ -2048,7 +2048,7 @@
           <a:p>
             <a:fld id="{B7E48A73-9369-4B88-BBE6-B1D33CBD5F01}" type="datetimeFigureOut">
               <a:rPr kumimoji="1" lang="ja-JP" altLang="en-US" smtClean="0"/>
-              <a:t>2023/7/26</a:t>
+              <a:t>2023/10/8</a:t>
             </a:fld>
             <a:endParaRPr kumimoji="1" lang="ja-JP" altLang="en-US"/>
           </a:p>
@@ -2524,7 +2524,7 @@
           <a:p>
             <a:fld id="{B7E48A73-9369-4B88-BBE6-B1D33CBD5F01}" type="datetimeFigureOut">
               <a:rPr kumimoji="1" lang="ja-JP" altLang="en-US" smtClean="0"/>
-              <a:t>2023/7/26</a:t>
+              <a:t>2023/10/8</a:t>
             </a:fld>
             <a:endParaRPr kumimoji="1" lang="ja-JP" altLang="en-US"/>
           </a:p>
@@ -2665,7 +2665,7 @@
           <a:p>
             <a:fld id="{B7E48A73-9369-4B88-BBE6-B1D33CBD5F01}" type="datetimeFigureOut">
               <a:rPr kumimoji="1" lang="ja-JP" altLang="en-US" smtClean="0"/>
-              <a:t>2023/7/26</a:t>
+              <a:t>2023/10/8</a:t>
             </a:fld>
             <a:endParaRPr kumimoji="1" lang="ja-JP" altLang="en-US"/>
           </a:p>
@@ -2778,7 +2778,7 @@
           <a:p>
             <a:fld id="{B7E48A73-9369-4B88-BBE6-B1D33CBD5F01}" type="datetimeFigureOut">
               <a:rPr kumimoji="1" lang="ja-JP" altLang="en-US" smtClean="0"/>
-              <a:t>2023/7/26</a:t>
+              <a:t>2023/10/8</a:t>
             </a:fld>
             <a:endParaRPr kumimoji="1" lang="ja-JP" altLang="en-US"/>
           </a:p>
@@ -3121,7 +3121,7 @@
           <a:p>
             <a:fld id="{B7E48A73-9369-4B88-BBE6-B1D33CBD5F01}" type="datetimeFigureOut">
               <a:rPr kumimoji="1" lang="ja-JP" altLang="en-US" smtClean="0"/>
-              <a:t>2023/7/26</a:t>
+              <a:t>2023/10/8</a:t>
             </a:fld>
             <a:endParaRPr kumimoji="1" lang="ja-JP" altLang="en-US"/>
           </a:p>
@@ -3409,7 +3409,7 @@
           <a:p>
             <a:fld id="{B7E48A73-9369-4B88-BBE6-B1D33CBD5F01}" type="datetimeFigureOut">
               <a:rPr kumimoji="1" lang="ja-JP" altLang="en-US" smtClean="0"/>
-              <a:t>2023/7/26</a:t>
+              <a:t>2023/10/8</a:t>
             </a:fld>
             <a:endParaRPr kumimoji="1" lang="ja-JP" altLang="en-US"/>
           </a:p>
@@ -3682,7 +3682,7 @@
           <a:p>
             <a:fld id="{B7E48A73-9369-4B88-BBE6-B1D33CBD5F01}" type="datetimeFigureOut">
               <a:rPr kumimoji="1" lang="ja-JP" altLang="en-US" smtClean="0"/>
-              <a:t>2023/7/26</a:t>
+              <a:t>2023/10/8</a:t>
             </a:fld>
             <a:endParaRPr kumimoji="1" lang="ja-JP" altLang="en-US"/>
           </a:p>
@@ -35235,6 +35235,243 @@
           </a:p>
         </p:txBody>
       </p:sp>
+      <p:sp>
+        <p:nvSpPr>
+          <p:cNvPr id="6" name="正方形/長方形 5">
+            <a:extLst>
+              <a:ext uri="{FF2B5EF4-FFF2-40B4-BE49-F238E27FC236}">
+                <a16:creationId xmlns:a16="http://schemas.microsoft.com/office/drawing/2014/main" id="{547D93F0-76BF-DB63-A405-3A711319B525}"/>
+              </a:ext>
+            </a:extLst>
+          </p:cNvPr>
+          <p:cNvSpPr/>
+          <p:nvPr/>
+        </p:nvSpPr>
+        <p:spPr>
+          <a:xfrm>
+            <a:off x="4514985" y="3891914"/>
+            <a:ext cx="2449418" cy="1224714"/>
+          </a:xfrm>
+          <a:prstGeom prst="rect">
+            <a:avLst/>
+          </a:prstGeom>
+          <a:solidFill>
+            <a:srgbClr val="0000FF"/>
+          </a:solidFill>
+          <a:ln>
+            <a:noFill/>
+          </a:ln>
+        </p:spPr>
+        <p:style>
+          <a:lnRef idx="2">
+            <a:schemeClr val="accent1">
+              <a:shade val="50000"/>
+            </a:schemeClr>
+          </a:lnRef>
+          <a:fillRef idx="1">
+            <a:schemeClr val="accent1"/>
+          </a:fillRef>
+          <a:effectRef idx="0">
+            <a:schemeClr val="accent1"/>
+          </a:effectRef>
+          <a:fontRef idx="minor">
+            <a:schemeClr val="lt1"/>
+          </a:fontRef>
+        </p:style>
+        <p:txBody>
+          <a:bodyPr rtlCol="0" anchor="ctr"/>
+          <a:lstStyle/>
+          <a:p>
+            <a:pPr algn="ctr"/>
+            <a:endParaRPr kumimoji="1" lang="ja-JP" altLang="en-US"/>
+          </a:p>
+        </p:txBody>
+      </p:sp>
+      <p:sp>
+        <p:nvSpPr>
+          <p:cNvPr id="14" name="テキスト ボックス 13">
+            <a:extLst>
+              <a:ext uri="{FF2B5EF4-FFF2-40B4-BE49-F238E27FC236}">
+                <a16:creationId xmlns:a16="http://schemas.microsoft.com/office/drawing/2014/main" id="{E799FFB3-C315-8F1A-2168-CF181E92C4B0}"/>
+              </a:ext>
+            </a:extLst>
+          </p:cNvPr>
+          <p:cNvSpPr txBox="1"/>
+          <p:nvPr/>
+        </p:nvSpPr>
+        <p:spPr>
+          <a:xfrm>
+            <a:off x="4580930" y="3842551"/>
+            <a:ext cx="2383473" cy="1323439"/>
+          </a:xfrm>
+          <a:prstGeom prst="rect">
+            <a:avLst/>
+          </a:prstGeom>
+          <a:noFill/>
+          <a:effectLst/>
+        </p:spPr>
+        <p:txBody>
+          <a:bodyPr wrap="none" rtlCol="0">
+            <a:spAutoFit/>
+          </a:bodyPr>
+          <a:lstStyle/>
+          <a:p>
+            <a:r>
+              <a:rPr kumimoji="1" lang="en-US" altLang="ja-JP" sz="8000" dirty="0">
+                <a:solidFill>
+                  <a:schemeClr val="bg1"/>
+                </a:solidFill>
+                <a:latin typeface="Arial Black" panose="020B0A04020102020204" pitchFamily="34" charset="0"/>
+                <a:cs typeface="Arial" panose="020B0604020202020204" pitchFamily="34" charset="0"/>
+              </a:rPr>
+              <a:t>M.P.</a:t>
+            </a:r>
+            <a:endParaRPr kumimoji="1" lang="ja-JP" altLang="en-US" sz="8000" dirty="0">
+              <a:solidFill>
+                <a:schemeClr val="bg1"/>
+              </a:solidFill>
+              <a:latin typeface="Arial Black" panose="020B0A04020102020204" pitchFamily="34" charset="0"/>
+              <a:cs typeface="Arial" panose="020B0604020202020204" pitchFamily="34" charset="0"/>
+            </a:endParaRPr>
+          </a:p>
+        </p:txBody>
+      </p:sp>
+      <p:pic>
+        <p:nvPicPr>
+          <p:cNvPr id="11" name="図 10">
+            <a:extLst>
+              <a:ext uri="{FF2B5EF4-FFF2-40B4-BE49-F238E27FC236}">
+                <a16:creationId xmlns:a16="http://schemas.microsoft.com/office/drawing/2014/main" id="{0D2AFFF8-7B88-7452-A5A8-F32DABB5C196}"/>
+              </a:ext>
+            </a:extLst>
+          </p:cNvPr>
+          <p:cNvPicPr>
+            <a:picLocks noChangeAspect="1"/>
+          </p:cNvPicPr>
+          <p:nvPr/>
+        </p:nvPicPr>
+        <p:blipFill>
+          <a:blip r:embed="rId6"/>
+          <a:stretch>
+            <a:fillRect/>
+          </a:stretch>
+        </p:blipFill>
+        <p:spPr>
+          <a:xfrm>
+            <a:off x="6281967" y="665860"/>
+            <a:ext cx="4695825" cy="2924175"/>
+          </a:xfrm>
+          <a:prstGeom prst="rect">
+            <a:avLst/>
+          </a:prstGeom>
+        </p:spPr>
+      </p:pic>
+      <p:sp>
+        <p:nvSpPr>
+          <p:cNvPr id="12" name="テキスト ボックス 11">
+            <a:extLst>
+              <a:ext uri="{FF2B5EF4-FFF2-40B4-BE49-F238E27FC236}">
+                <a16:creationId xmlns:a16="http://schemas.microsoft.com/office/drawing/2014/main" id="{AE150782-F7FA-1ED2-ED00-2FA1A48F52F0}"/>
+              </a:ext>
+            </a:extLst>
+          </p:cNvPr>
+          <p:cNvSpPr txBox="1"/>
+          <p:nvPr/>
+        </p:nvSpPr>
+        <p:spPr>
+          <a:xfrm>
+            <a:off x="4525926" y="3837685"/>
+            <a:ext cx="1375698" cy="769441"/>
+          </a:xfrm>
+          <a:prstGeom prst="rect">
+            <a:avLst/>
+          </a:prstGeom>
+          <a:noFill/>
+          <a:effectLst>
+            <a:outerShdw dist="50800" dir="2700000" algn="tl" rotWithShape="0">
+              <a:schemeClr val="tx1"/>
+            </a:outerShdw>
+          </a:effectLst>
+        </p:spPr>
+        <p:txBody>
+          <a:bodyPr wrap="none" rtlCol="0">
+            <a:spAutoFit/>
+          </a:bodyPr>
+          <a:lstStyle/>
+          <a:p>
+            <a:r>
+              <a:rPr kumimoji="1" lang="en-US" altLang="ja-JP" sz="4400" dirty="0">
+                <a:solidFill>
+                  <a:srgbClr val="FF0000"/>
+                </a:solidFill>
+                <a:latin typeface="Arial" panose="020B0604020202020204" pitchFamily="34" charset="0"/>
+                <a:cs typeface="Arial" panose="020B0604020202020204" pitchFamily="34" charset="0"/>
+              </a:rPr>
+              <a:t>Multi</a:t>
+            </a:r>
+            <a:endParaRPr lang="en-US" altLang="ja-JP" sz="4400" dirty="0">
+              <a:solidFill>
+                <a:srgbClr val="FF0000"/>
+              </a:solidFill>
+              <a:latin typeface="Arial" panose="020B0604020202020204" pitchFamily="34" charset="0"/>
+              <a:cs typeface="Arial" panose="020B0604020202020204" pitchFamily="34" charset="0"/>
+            </a:endParaRPr>
+          </a:p>
+        </p:txBody>
+      </p:sp>
+      <p:sp>
+        <p:nvSpPr>
+          <p:cNvPr id="13" name="テキスト ボックス 12">
+            <a:extLst>
+              <a:ext uri="{FF2B5EF4-FFF2-40B4-BE49-F238E27FC236}">
+                <a16:creationId xmlns:a16="http://schemas.microsoft.com/office/drawing/2014/main" id="{728313EF-CEBE-5620-A179-420B4B225CE0}"/>
+              </a:ext>
+            </a:extLst>
+          </p:cNvPr>
+          <p:cNvSpPr txBox="1"/>
+          <p:nvPr/>
+        </p:nvSpPr>
+        <p:spPr>
+          <a:xfrm>
+            <a:off x="5446182" y="4347187"/>
+            <a:ext cx="1438214" cy="769441"/>
+          </a:xfrm>
+          <a:prstGeom prst="rect">
+            <a:avLst/>
+          </a:prstGeom>
+          <a:noFill/>
+          <a:effectLst>
+            <a:outerShdw dist="50800" dir="2700000" algn="tl" rotWithShape="0">
+              <a:schemeClr val="tx1"/>
+            </a:outerShdw>
+          </a:effectLst>
+        </p:spPr>
+        <p:txBody>
+          <a:bodyPr wrap="none" rtlCol="0">
+            <a:spAutoFit/>
+          </a:bodyPr>
+          <a:lstStyle/>
+          <a:p>
+            <a:r>
+              <a:rPr kumimoji="1" lang="en-US" altLang="ja-JP" sz="4400" dirty="0">
+                <a:solidFill>
+                  <a:srgbClr val="FF0000"/>
+                </a:solidFill>
+                <a:latin typeface="Arial" panose="020B0604020202020204" pitchFamily="34" charset="0"/>
+                <a:cs typeface="Arial" panose="020B0604020202020204" pitchFamily="34" charset="0"/>
+              </a:rPr>
+              <a:t>PCM</a:t>
+            </a:r>
+            <a:endParaRPr kumimoji="1" lang="ja-JP" altLang="en-US" sz="4400" dirty="0">
+              <a:solidFill>
+                <a:srgbClr val="FF0000"/>
+              </a:solidFill>
+              <a:latin typeface="Arial" panose="020B0604020202020204" pitchFamily="34" charset="0"/>
+              <a:cs typeface="Arial" panose="020B0604020202020204" pitchFamily="34" charset="0"/>
+            </a:endParaRPr>
+          </a:p>
+        </p:txBody>
+      </p:sp>
     </p:spTree>
     <p:extLst>
       <p:ext uri="{BB962C8B-B14F-4D97-AF65-F5344CB8AC3E}">

</xml_diff>

<commit_message>
- 5.2.0.0 Supported RF5C164 ans MEGA CD(VSIF Genesis(FTDI)).
</commit_message>
<xml_diff>
--- a/src/mamidimemo/Data/Images.pptx
+++ b/src/mamidimemo/Data/Images.pptx
@@ -5,7 +5,7 @@
     <p:sldMasterId id="2147483648" r:id="rId1"/>
   </p:sldMasterIdLst>
   <p:notesMasterIdLst>
-    <p:notesMasterId r:id="rId20"/>
+    <p:notesMasterId r:id="rId21"/>
   </p:notesMasterIdLst>
   <p:sldIdLst>
     <p:sldId id="256" r:id="rId2"/>
@@ -26,6 +26,7 @@
     <p:sldId id="271" r:id="rId17"/>
     <p:sldId id="272" r:id="rId18"/>
     <p:sldId id="273" r:id="rId19"/>
+    <p:sldId id="274" r:id="rId20"/>
   </p:sldIdLst>
   <p:sldSz cx="12192000" cy="6858000"/>
   <p:notesSz cx="6858000" cy="9144000"/>
@@ -214,7 +215,7 @@
           <a:p>
             <a:fld id="{FD0ADE19-EE5F-4EAE-BCEC-0B5F9244BB48}" type="datetimeFigureOut">
               <a:rPr kumimoji="1" lang="ja-JP" altLang="en-US" smtClean="0"/>
-              <a:t>2023/10/8</a:t>
+              <a:t>2023/11/2</a:t>
             </a:fld>
             <a:endParaRPr kumimoji="1" lang="ja-JP" altLang="en-US"/>
           </a:p>
@@ -744,7 +745,7 @@
           <a:p>
             <a:fld id="{B7E48A73-9369-4B88-BBE6-B1D33CBD5F01}" type="datetimeFigureOut">
               <a:rPr kumimoji="1" lang="ja-JP" altLang="en-US" smtClean="0"/>
-              <a:t>2023/10/8</a:t>
+              <a:t>2023/11/2</a:t>
             </a:fld>
             <a:endParaRPr kumimoji="1" lang="ja-JP" altLang="en-US"/>
           </a:p>
@@ -974,7 +975,7 @@
           <a:p>
             <a:fld id="{B7E48A73-9369-4B88-BBE6-B1D33CBD5F01}" type="datetimeFigureOut">
               <a:rPr kumimoji="1" lang="ja-JP" altLang="en-US" smtClean="0"/>
-              <a:t>2023/10/8</a:t>
+              <a:t>2023/11/2</a:t>
             </a:fld>
             <a:endParaRPr kumimoji="1" lang="ja-JP" altLang="en-US"/>
           </a:p>
@@ -1214,7 +1215,7 @@
           <a:p>
             <a:fld id="{B7E48A73-9369-4B88-BBE6-B1D33CBD5F01}" type="datetimeFigureOut">
               <a:rPr kumimoji="1" lang="ja-JP" altLang="en-US" smtClean="0"/>
-              <a:t>2023/10/8</a:t>
+              <a:t>2023/11/2</a:t>
             </a:fld>
             <a:endParaRPr kumimoji="1" lang="ja-JP" altLang="en-US"/>
           </a:p>
@@ -1444,7 +1445,7 @@
           <a:p>
             <a:fld id="{B7E48A73-9369-4B88-BBE6-B1D33CBD5F01}" type="datetimeFigureOut">
               <a:rPr kumimoji="1" lang="ja-JP" altLang="en-US" smtClean="0"/>
-              <a:t>2023/10/8</a:t>
+              <a:t>2023/11/2</a:t>
             </a:fld>
             <a:endParaRPr kumimoji="1" lang="ja-JP" altLang="en-US"/>
           </a:p>
@@ -1719,7 +1720,7 @@
           <a:p>
             <a:fld id="{B7E48A73-9369-4B88-BBE6-B1D33CBD5F01}" type="datetimeFigureOut">
               <a:rPr kumimoji="1" lang="ja-JP" altLang="en-US" smtClean="0"/>
-              <a:t>2023/10/8</a:t>
+              <a:t>2023/11/2</a:t>
             </a:fld>
             <a:endParaRPr kumimoji="1" lang="ja-JP" altLang="en-US"/>
           </a:p>
@@ -2048,7 +2049,7 @@
           <a:p>
             <a:fld id="{B7E48A73-9369-4B88-BBE6-B1D33CBD5F01}" type="datetimeFigureOut">
               <a:rPr kumimoji="1" lang="ja-JP" altLang="en-US" smtClean="0"/>
-              <a:t>2023/10/8</a:t>
+              <a:t>2023/11/2</a:t>
             </a:fld>
             <a:endParaRPr kumimoji="1" lang="ja-JP" altLang="en-US"/>
           </a:p>
@@ -2524,7 +2525,7 @@
           <a:p>
             <a:fld id="{B7E48A73-9369-4B88-BBE6-B1D33CBD5F01}" type="datetimeFigureOut">
               <a:rPr kumimoji="1" lang="ja-JP" altLang="en-US" smtClean="0"/>
-              <a:t>2023/10/8</a:t>
+              <a:t>2023/11/2</a:t>
             </a:fld>
             <a:endParaRPr kumimoji="1" lang="ja-JP" altLang="en-US"/>
           </a:p>
@@ -2665,7 +2666,7 @@
           <a:p>
             <a:fld id="{B7E48A73-9369-4B88-BBE6-B1D33CBD5F01}" type="datetimeFigureOut">
               <a:rPr kumimoji="1" lang="ja-JP" altLang="en-US" smtClean="0"/>
-              <a:t>2023/10/8</a:t>
+              <a:t>2023/11/2</a:t>
             </a:fld>
             <a:endParaRPr kumimoji="1" lang="ja-JP" altLang="en-US"/>
           </a:p>
@@ -2778,7 +2779,7 @@
           <a:p>
             <a:fld id="{B7E48A73-9369-4B88-BBE6-B1D33CBD5F01}" type="datetimeFigureOut">
               <a:rPr kumimoji="1" lang="ja-JP" altLang="en-US" smtClean="0"/>
-              <a:t>2023/10/8</a:t>
+              <a:t>2023/11/2</a:t>
             </a:fld>
             <a:endParaRPr kumimoji="1" lang="ja-JP" altLang="en-US"/>
           </a:p>
@@ -3121,7 +3122,7 @@
           <a:p>
             <a:fld id="{B7E48A73-9369-4B88-BBE6-B1D33CBD5F01}" type="datetimeFigureOut">
               <a:rPr kumimoji="1" lang="ja-JP" altLang="en-US" smtClean="0"/>
-              <a:t>2023/10/8</a:t>
+              <a:t>2023/11/2</a:t>
             </a:fld>
             <a:endParaRPr kumimoji="1" lang="ja-JP" altLang="en-US"/>
           </a:p>
@@ -3409,7 +3410,7 @@
           <a:p>
             <a:fld id="{B7E48A73-9369-4B88-BBE6-B1D33CBD5F01}" type="datetimeFigureOut">
               <a:rPr kumimoji="1" lang="ja-JP" altLang="en-US" smtClean="0"/>
-              <a:t>2023/10/8</a:t>
+              <a:t>2023/11/2</a:t>
             </a:fld>
             <a:endParaRPr kumimoji="1" lang="ja-JP" altLang="en-US"/>
           </a:p>
@@ -3682,7 +3683,7 @@
           <a:p>
             <a:fld id="{B7E48A73-9369-4B88-BBE6-B1D33CBD5F01}" type="datetimeFigureOut">
               <a:rPr kumimoji="1" lang="ja-JP" altLang="en-US" smtClean="0"/>
-              <a:t>2023/10/8</a:t>
+              <a:t>2023/11/2</a:t>
             </a:fld>
             <a:endParaRPr kumimoji="1" lang="ja-JP" altLang="en-US"/>
           </a:p>
@@ -35485,6 +35486,241 @@
 </p:sld>
 </file>
 
+<file path=ppt/slides/slide19.xml><?xml version="1.0" encoding="utf-8"?>
+<p:sld xmlns:a="http://schemas.openxmlformats.org/drawingml/2006/main" xmlns:r="http://schemas.openxmlformats.org/officeDocument/2006/relationships" xmlns:p="http://schemas.openxmlformats.org/presentationml/2006/main">
+  <p:cSld>
+    <p:spTree>
+      <p:nvGrpSpPr>
+        <p:cNvPr id="1" name=""/>
+        <p:cNvGrpSpPr/>
+        <p:nvPr/>
+      </p:nvGrpSpPr>
+      <p:grpSpPr>
+        <a:xfrm>
+          <a:off x="0" y="0"/>
+          <a:ext cx="0" cy="0"/>
+          <a:chOff x="0" y="0"/>
+          <a:chExt cx="0" cy="0"/>
+        </a:xfrm>
+      </p:grpSpPr>
+      <p:sp>
+        <p:nvSpPr>
+          <p:cNvPr id="10" name="正方形/長方形 9">
+            <a:extLst>
+              <a:ext uri="{FF2B5EF4-FFF2-40B4-BE49-F238E27FC236}">
+                <a16:creationId xmlns:a16="http://schemas.microsoft.com/office/drawing/2014/main" id="{5016C91F-8254-3A27-11AE-3D8C1932DCD1}"/>
+              </a:ext>
+            </a:extLst>
+          </p:cNvPr>
+          <p:cNvSpPr/>
+          <p:nvPr/>
+        </p:nvSpPr>
+        <p:spPr>
+          <a:xfrm>
+            <a:off x="2662994" y="5830509"/>
+            <a:ext cx="1718628" cy="818985"/>
+          </a:xfrm>
+          <a:prstGeom prst="rect">
+            <a:avLst/>
+          </a:prstGeom>
+        </p:spPr>
+        <p:style>
+          <a:lnRef idx="2">
+            <a:schemeClr val="dk1">
+              <a:shade val="15000"/>
+            </a:schemeClr>
+          </a:lnRef>
+          <a:fillRef idx="1">
+            <a:schemeClr val="dk1"/>
+          </a:fillRef>
+          <a:effectRef idx="0">
+            <a:schemeClr val="dk1"/>
+          </a:effectRef>
+          <a:fontRef idx="minor">
+            <a:schemeClr val="lt1"/>
+          </a:fontRef>
+        </p:style>
+        <p:txBody>
+          <a:bodyPr rtlCol="0" anchor="ctr"/>
+          <a:lstStyle/>
+          <a:p>
+            <a:pPr algn="ctr"/>
+            <a:endParaRPr kumimoji="1" lang="ja-JP" altLang="en-US"/>
+          </a:p>
+        </p:txBody>
+      </p:sp>
+      <p:pic>
+        <p:nvPicPr>
+          <p:cNvPr id="3" name="図 2">
+            <a:extLst>
+              <a:ext uri="{FF2B5EF4-FFF2-40B4-BE49-F238E27FC236}">
+                <a16:creationId xmlns:a16="http://schemas.microsoft.com/office/drawing/2014/main" id="{39DC2193-3B7B-32F8-88ED-8C05E208C092}"/>
+              </a:ext>
+            </a:extLst>
+          </p:cNvPr>
+          <p:cNvPicPr>
+            <a:picLocks noChangeAspect="1"/>
+          </p:cNvPicPr>
+          <p:nvPr/>
+        </p:nvPicPr>
+        <p:blipFill>
+          <a:blip r:embed="rId2">
+            <a:extLst>
+              <a:ext uri="{28A0092B-C50C-407E-A947-70E740481C1C}">
+                <a14:useLocalDpi xmlns:a14="http://schemas.microsoft.com/office/drawing/2010/main" val="0"/>
+              </a:ext>
+            </a:extLst>
+          </a:blip>
+          <a:stretch>
+            <a:fillRect/>
+          </a:stretch>
+        </p:blipFill>
+        <p:spPr>
+          <a:xfrm>
+            <a:off x="3324781" y="6054845"/>
+            <a:ext cx="1056841" cy="594649"/>
+          </a:xfrm>
+          <a:prstGeom prst="rect">
+            <a:avLst/>
+          </a:prstGeom>
+        </p:spPr>
+      </p:pic>
+      <p:sp>
+        <p:nvSpPr>
+          <p:cNvPr id="15" name="正方形/長方形 14">
+            <a:extLst>
+              <a:ext uri="{FF2B5EF4-FFF2-40B4-BE49-F238E27FC236}">
+                <a16:creationId xmlns:a16="http://schemas.microsoft.com/office/drawing/2014/main" id="{77495B60-FB23-BA89-148F-CF7C5AA70A15}"/>
+              </a:ext>
+            </a:extLst>
+          </p:cNvPr>
+          <p:cNvSpPr/>
+          <p:nvPr/>
+        </p:nvSpPr>
+        <p:spPr>
+          <a:xfrm>
+            <a:off x="3353730" y="6082896"/>
+            <a:ext cx="686302" cy="134087"/>
+          </a:xfrm>
+          <a:prstGeom prst="rect">
+            <a:avLst/>
+          </a:prstGeom>
+        </p:spPr>
+        <p:style>
+          <a:lnRef idx="2">
+            <a:schemeClr val="dk1">
+              <a:shade val="15000"/>
+            </a:schemeClr>
+          </a:lnRef>
+          <a:fillRef idx="1">
+            <a:schemeClr val="dk1"/>
+          </a:fillRef>
+          <a:effectRef idx="0">
+            <a:schemeClr val="dk1"/>
+          </a:effectRef>
+          <a:fontRef idx="minor">
+            <a:schemeClr val="lt1"/>
+          </a:fontRef>
+        </p:style>
+        <p:txBody>
+          <a:bodyPr rtlCol="0" anchor="ctr"/>
+          <a:lstStyle/>
+          <a:p>
+            <a:pPr algn="ctr"/>
+            <a:endParaRPr kumimoji="1" lang="ja-JP" altLang="en-US"/>
+          </a:p>
+        </p:txBody>
+      </p:sp>
+      <p:sp>
+        <p:nvSpPr>
+          <p:cNvPr id="16" name="テキスト ボックス 15">
+            <a:extLst>
+              <a:ext uri="{FF2B5EF4-FFF2-40B4-BE49-F238E27FC236}">
+                <a16:creationId xmlns:a16="http://schemas.microsoft.com/office/drawing/2014/main" id="{E331FB01-428A-8A66-EA22-676EFF71421F}"/>
+              </a:ext>
+            </a:extLst>
+          </p:cNvPr>
+          <p:cNvSpPr txBox="1"/>
+          <p:nvPr/>
+        </p:nvSpPr>
+        <p:spPr>
+          <a:xfrm>
+            <a:off x="2621204" y="5749632"/>
+            <a:ext cx="1760418" cy="461665"/>
+          </a:xfrm>
+          <a:prstGeom prst="rect">
+            <a:avLst/>
+          </a:prstGeom>
+          <a:noFill/>
+        </p:spPr>
+        <p:txBody>
+          <a:bodyPr wrap="none" rtlCol="0">
+            <a:spAutoFit/>
+          </a:bodyPr>
+          <a:lstStyle/>
+          <a:p>
+            <a:r>
+              <a:rPr lang="en-US" altLang="ja-JP" sz="2400" dirty="0">
+                <a:solidFill>
+                  <a:schemeClr val="bg1"/>
+                </a:solidFill>
+                <a:latin typeface="Mission GT-R Condensed" panose="02000500000000000000" pitchFamily="2" charset="0"/>
+                <a:ea typeface="ＭＳ ゴシック" panose="020B0609070205080204" pitchFamily="49" charset="-128"/>
+              </a:rPr>
+              <a:t>RF5C164</a:t>
+            </a:r>
+            <a:endParaRPr kumimoji="1" lang="ja-JP" altLang="en-US" sz="2400" dirty="0">
+              <a:solidFill>
+                <a:schemeClr val="bg1"/>
+              </a:solidFill>
+              <a:latin typeface="Mission GT-R Condensed" panose="02000500000000000000" pitchFamily="2" charset="0"/>
+            </a:endParaRPr>
+          </a:p>
+        </p:txBody>
+      </p:sp>
+      <p:pic>
+        <p:nvPicPr>
+          <p:cNvPr id="21" name="図 20">
+            <a:extLst>
+              <a:ext uri="{FF2B5EF4-FFF2-40B4-BE49-F238E27FC236}">
+                <a16:creationId xmlns:a16="http://schemas.microsoft.com/office/drawing/2014/main" id="{41229396-87E2-9F9D-5AD3-B0DA46EE7527}"/>
+              </a:ext>
+            </a:extLst>
+          </p:cNvPr>
+          <p:cNvPicPr>
+            <a:picLocks noChangeAspect="1"/>
+          </p:cNvPicPr>
+          <p:nvPr/>
+        </p:nvPicPr>
+        <p:blipFill>
+          <a:blip r:embed="rId3"/>
+          <a:stretch>
+            <a:fillRect/>
+          </a:stretch>
+        </p:blipFill>
+        <p:spPr>
+          <a:xfrm>
+            <a:off x="3801861" y="2575735"/>
+            <a:ext cx="1128280" cy="555242"/>
+          </a:xfrm>
+          <a:prstGeom prst="rect">
+            <a:avLst/>
+          </a:prstGeom>
+        </p:spPr>
+      </p:pic>
+    </p:spTree>
+    <p:extLst>
+      <p:ext uri="{BB962C8B-B14F-4D97-AF65-F5344CB8AC3E}">
+        <p14:creationId xmlns:p14="http://schemas.microsoft.com/office/powerpoint/2010/main" val="1989899459"/>
+      </p:ext>
+    </p:extLst>
+  </p:cSld>
+  <p:clrMapOvr>
+    <a:masterClrMapping/>
+  </p:clrMapOvr>
+</p:sld>
+</file>
+
 <file path=ppt/slides/slide2.xml><?xml version="1.0" encoding="utf-8"?>
 <p:sld xmlns:a="http://schemas.openxmlformats.org/drawingml/2006/main" xmlns:r="http://schemas.openxmlformats.org/officeDocument/2006/relationships" xmlns:p="http://schemas.openxmlformats.org/presentationml/2006/main">
   <p:cSld>

</xml_diff>